<commit_message>
Slides: finished tp kickoff
</commit_message>
<xml_diff>
--- a/Slides/pptx/kickoff - TP.pptx
+++ b/Slides/pptx/kickoff - TP.pptx
@@ -5,30 +5,30 @@
     <p:sldMasterId id="2147483659" r:id="rId1"/>
   </p:sldMasterIdLst>
   <p:notesMasterIdLst>
-    <p:notesMasterId r:id="rId39"/>
+    <p:notesMasterId r:id="rId40"/>
   </p:notesMasterIdLst>
   <p:sldIdLst>
     <p:sldId id="256" r:id="rId2"/>
-    <p:sldId id="257" r:id="rId3"/>
-    <p:sldId id="258" r:id="rId4"/>
-    <p:sldId id="259" r:id="rId5"/>
-    <p:sldId id="260" r:id="rId6"/>
-    <p:sldId id="261" r:id="rId7"/>
-    <p:sldId id="262" r:id="rId8"/>
-    <p:sldId id="263" r:id="rId9"/>
-    <p:sldId id="264" r:id="rId10"/>
-    <p:sldId id="265" r:id="rId11"/>
-    <p:sldId id="266" r:id="rId12"/>
-    <p:sldId id="268" r:id="rId13"/>
-    <p:sldId id="267" r:id="rId14"/>
-    <p:sldId id="270" r:id="rId15"/>
-    <p:sldId id="269" r:id="rId16"/>
-    <p:sldId id="271" r:id="rId17"/>
-    <p:sldId id="272" r:id="rId18"/>
-    <p:sldId id="273" r:id="rId19"/>
-    <p:sldId id="274" r:id="rId20"/>
-    <p:sldId id="275" r:id="rId21"/>
-    <p:sldId id="276" r:id="rId22"/>
+    <p:sldId id="298" r:id="rId3"/>
+    <p:sldId id="257" r:id="rId4"/>
+    <p:sldId id="258" r:id="rId5"/>
+    <p:sldId id="259" r:id="rId6"/>
+    <p:sldId id="260" r:id="rId7"/>
+    <p:sldId id="261" r:id="rId8"/>
+    <p:sldId id="262" r:id="rId9"/>
+    <p:sldId id="293" r:id="rId10"/>
+    <p:sldId id="294" r:id="rId11"/>
+    <p:sldId id="264" r:id="rId12"/>
+    <p:sldId id="265" r:id="rId13"/>
+    <p:sldId id="266" r:id="rId14"/>
+    <p:sldId id="268" r:id="rId15"/>
+    <p:sldId id="267" r:id="rId16"/>
+    <p:sldId id="270" r:id="rId17"/>
+    <p:sldId id="269" r:id="rId18"/>
+    <p:sldId id="271" r:id="rId19"/>
+    <p:sldId id="272" r:id="rId20"/>
+    <p:sldId id="273" r:id="rId21"/>
+    <p:sldId id="297" r:id="rId22"/>
     <p:sldId id="278" r:id="rId23"/>
     <p:sldId id="279" r:id="rId24"/>
     <p:sldId id="277" r:id="rId25"/>
@@ -39,29 +39,30 @@
     <p:sldId id="285" r:id="rId30"/>
     <p:sldId id="284" r:id="rId31"/>
     <p:sldId id="286" r:id="rId32"/>
-    <p:sldId id="287" r:id="rId33"/>
-    <p:sldId id="288" r:id="rId34"/>
-    <p:sldId id="289" r:id="rId35"/>
-    <p:sldId id="290" r:id="rId36"/>
-    <p:sldId id="291" r:id="rId37"/>
-    <p:sldId id="292" r:id="rId38"/>
+    <p:sldId id="295" r:id="rId33"/>
+    <p:sldId id="287" r:id="rId34"/>
+    <p:sldId id="288" r:id="rId35"/>
+    <p:sldId id="289" r:id="rId36"/>
+    <p:sldId id="290" r:id="rId37"/>
+    <p:sldId id="296" r:id="rId38"/>
+    <p:sldId id="292" r:id="rId39"/>
   </p:sldIdLst>
   <p:sldSz cx="9144000" cy="5143500" type="screen16x9"/>
   <p:notesSz cx="6858000" cy="9144000"/>
   <p:embeddedFontLst>
     <p:embeddedFont>
       <p:font typeface="Fira Sans" panose="020B0604020202020204" charset="0"/>
-      <p:regular r:id="rId40"/>
-      <p:bold r:id="rId41"/>
-      <p:italic r:id="rId42"/>
-      <p:boldItalic r:id="rId43"/>
+      <p:regular r:id="rId41"/>
+      <p:bold r:id="rId42"/>
+      <p:italic r:id="rId43"/>
+      <p:boldItalic r:id="rId44"/>
     </p:embeddedFont>
     <p:embeddedFont>
       <p:font typeface="Fira Sans Extra Condensed Medium" panose="020B0604020202020204" charset="0"/>
-      <p:regular r:id="rId44"/>
-      <p:bold r:id="rId45"/>
-      <p:italic r:id="rId46"/>
-      <p:boldItalic r:id="rId47"/>
+      <p:regular r:id="rId45"/>
+      <p:bold r:id="rId46"/>
+      <p:italic r:id="rId47"/>
+      <p:boldItalic r:id="rId48"/>
     </p:embeddedFont>
   </p:embeddedFontLst>
   <p:defaultTextStyle>
@@ -293,7 +294,94 @@
       </a:defRPr>
     </a:lvl9pPr>
   </p:defaultTextStyle>
+  <p:extLst>
+    <p:ext uri="{EFAFB233-063F-42B5-8137-9DF3F51BA10A}">
+      <p15:sldGuideLst xmlns:p15="http://schemas.microsoft.com/office/powerpoint/2012/main"/>
+    </p:ext>
+  </p:extLst>
 </p:presentation>
+</file>
+
+<file path=ppt/commentAuthors.xml><?xml version="1.0" encoding="utf-8"?>
+<p:cmAuthorLst xmlns:a="http://schemas.openxmlformats.org/drawingml/2006/main" xmlns:r="http://schemas.openxmlformats.org/officeDocument/2006/relationships" xmlns:p="http://schemas.openxmlformats.org/presentationml/2006/main">
+  <p:cmAuthor id="1" name="jgfxkfh kyrkyd" initials="jk" lastIdx="6" clrIdx="0">
+    <p:extLst>
+      <p:ext uri="{19B8F6BF-5375-455C-9EA6-DF929625EA0E}">
+        <p15:presenceInfo xmlns:p15="http://schemas.microsoft.com/office/powerpoint/2012/main" userId="55754c1abc38eacd" providerId="Windows Live"/>
+      </p:ext>
+    </p:extLst>
+  </p:cmAuthor>
+</p:cmAuthorLst>
+</file>
+
+<file path=ppt/comments/comment1.xml><?xml version="1.0" encoding="utf-8"?>
+<p:cmLst xmlns:a="http://schemas.openxmlformats.org/drawingml/2006/main" xmlns:r="http://schemas.openxmlformats.org/officeDocument/2006/relationships" xmlns:p="http://schemas.openxmlformats.org/presentationml/2006/main">
+  <p:cm authorId="1" dt="2020-10-13T11:30:02.446" idx="2">
+    <p:pos x="10" y="10"/>
+    <p:text>mettre B =0</p:text>
+    <p:extLst>
+      <p:ext uri="{C676402C-5697-4E1C-873F-D02D1690AC5C}">
+        <p15:threadingInfo xmlns:p15="http://schemas.microsoft.com/office/powerpoint/2012/main" timeZoneBias="-120"/>
+      </p:ext>
+    </p:extLst>
+  </p:cm>
+</p:cmLst>
+</file>
+
+<file path=ppt/comments/comment2.xml><?xml version="1.0" encoding="utf-8"?>
+<p:cmLst xmlns:a="http://schemas.openxmlformats.org/drawingml/2006/main" xmlns:r="http://schemas.openxmlformats.org/officeDocument/2006/relationships" xmlns:p="http://schemas.openxmlformats.org/presentationml/2006/main">
+  <p:cm authorId="1" dt="2020-10-13T11:29:54.771" idx="1">
+    <p:pos x="10" y="10"/>
+    <p:text>changer ça</p:text>
+    <p:extLst>
+      <p:ext uri="{C676402C-5697-4E1C-873F-D02D1690AC5C}">
+        <p15:threadingInfo xmlns:p15="http://schemas.microsoft.com/office/powerpoint/2012/main" timeZoneBias="-120"/>
+      </p:ext>
+    </p:extLst>
+  </p:cm>
+</p:cmLst>
+</file>
+
+<file path=ppt/comments/comment3.xml><?xml version="1.0" encoding="utf-8"?>
+<p:cmLst xmlns:a="http://schemas.openxmlformats.org/drawingml/2006/main" xmlns:r="http://schemas.openxmlformats.org/officeDocument/2006/relationships" xmlns:p="http://schemas.openxmlformats.org/presentationml/2006/main">
+  <p:cm authorId="1" dt="2020-10-14T18:17:23.770" idx="5">
+    <p:pos x="10" y="10"/>
+    <p:text/>
+    <p:extLst>
+      <p:ext uri="{C676402C-5697-4E1C-873F-D02D1690AC5C}">
+        <p15:threadingInfo xmlns:p15="http://schemas.microsoft.com/office/powerpoint/2012/main" timeZoneBias="-120"/>
+      </p:ext>
+    </p:extLst>
+  </p:cm>
+</p:cmLst>
+</file>
+
+<file path=ppt/comments/comment4.xml><?xml version="1.0" encoding="utf-8"?>
+<p:cmLst xmlns:a="http://schemas.openxmlformats.org/drawingml/2006/main" xmlns:r="http://schemas.openxmlformats.org/officeDocument/2006/relationships" xmlns:p="http://schemas.openxmlformats.org/presentationml/2006/main">
+  <p:cm authorId="1" dt="2020-10-13T11:39:00.587" idx="3">
+    <p:pos x="10" y="10"/>
+    <p:text>détailler le calcul</p:text>
+    <p:extLst>
+      <p:ext uri="{C676402C-5697-4E1C-873F-D02D1690AC5C}">
+        <p15:threadingInfo xmlns:p15="http://schemas.microsoft.com/office/powerpoint/2012/main" timeZoneBias="-120"/>
+      </p:ext>
+    </p:extLst>
+  </p:cm>
+</p:cmLst>
+</file>
+
+<file path=ppt/comments/comment5.xml><?xml version="1.0" encoding="utf-8"?>
+<p:cmLst xmlns:a="http://schemas.openxmlformats.org/drawingml/2006/main" xmlns:r="http://schemas.openxmlformats.org/officeDocument/2006/relationships" xmlns:p="http://schemas.openxmlformats.org/presentationml/2006/main">
+  <p:cm authorId="1" dt="2020-10-13T11:39:51.740" idx="4">
+    <p:pos x="10" y="10"/>
+    <p:text>spéciifer les balance et les pas balances</p:text>
+    <p:extLst>
+      <p:ext uri="{C676402C-5697-4E1C-873F-D02D1690AC5C}">
+        <p15:threadingInfo xmlns:p15="http://schemas.microsoft.com/office/powerpoint/2012/main" timeZoneBias="-120"/>
+      </p:ext>
+    </p:extLst>
+  </p:cm>
+</p:cmLst>
 </file>
 
 <file path=ppt/notesMasters/notesMaster1.xml><?xml version="1.0" encoding="utf-8"?>
@@ -841,6 +929,72 @@
 </p:notes>
 </file>
 
+<file path=ppt/notesSlides/notesSlide2.xml><?xml version="1.0" encoding="utf-8"?>
+<p:notes xmlns:a="http://schemas.openxmlformats.org/drawingml/2006/main" xmlns:r="http://schemas.openxmlformats.org/officeDocument/2006/relationships" xmlns:p="http://schemas.openxmlformats.org/presentationml/2006/main">
+  <p:cSld>
+    <p:spTree>
+      <p:nvGrpSpPr>
+        <p:cNvPr id="1" name=""/>
+        <p:cNvGrpSpPr/>
+        <p:nvPr/>
+      </p:nvGrpSpPr>
+      <p:grpSpPr>
+        <a:xfrm>
+          <a:off x="0" y="0"/>
+          <a:ext cx="0" cy="0"/>
+          <a:chOff x="0" y="0"/>
+          <a:chExt cx="0" cy="0"/>
+        </a:xfrm>
+      </p:grpSpPr>
+      <p:sp>
+        <p:nvSpPr>
+          <p:cNvPr id="2" name="Espace réservé de l'image des diapositives 1"/>
+          <p:cNvSpPr>
+            <a:spLocks noGrp="1" noRot="1" noChangeAspect="1"/>
+          </p:cNvSpPr>
+          <p:nvPr>
+            <p:ph type="sldImg"/>
+          </p:nvPr>
+        </p:nvSpPr>
+        <p:spPr>
+          <a:xfrm>
+            <a:off x="381000" y="685800"/>
+            <a:ext cx="6096000" cy="3429000"/>
+          </a:xfrm>
+        </p:spPr>
+      </p:sp>
+      <p:sp>
+        <p:nvSpPr>
+          <p:cNvPr id="3" name="Espace réservé des notes 2"/>
+          <p:cNvSpPr>
+            <a:spLocks noGrp="1"/>
+          </p:cNvSpPr>
+          <p:nvPr>
+            <p:ph type="body" idx="1"/>
+          </p:nvPr>
+        </p:nvSpPr>
+        <p:spPr/>
+        <p:txBody>
+          <a:bodyPr/>
+          <a:lstStyle/>
+          <a:p>
+            <a:endParaRPr lang="fr-FR" dirty="0"/>
+          </a:p>
+        </p:txBody>
+      </p:sp>
+    </p:spTree>
+    <p:extLst>
+      <p:ext uri="{BB962C8B-B14F-4D97-AF65-F5344CB8AC3E}">
+        <p14:creationId xmlns:p14="http://schemas.microsoft.com/office/powerpoint/2010/main" val="3509240708"/>
+      </p:ext>
+    </p:extLst>
+  </p:cSld>
+  <p:clrMapOvr>
+    <a:masterClrMapping/>
+  </p:clrMapOvr>
+</p:notes>
+</file>
+
 <file path=ppt/slideLayouts/slideLayout1.xml><?xml version="1.0" encoding="utf-8"?>
 <p:sldLayout xmlns:a="http://schemas.openxmlformats.org/drawingml/2006/main" xmlns:r="http://schemas.openxmlformats.org/officeDocument/2006/relationships" xmlns:p="http://schemas.openxmlformats.org/presentationml/2006/main" matchingName="Title slide" type="title">
   <p:cSld name="TITLE">
@@ -4591,7 +4745,7 @@
     <p:sldLayoutId id="2147483657" r:id="rId9"/>
     <p:sldLayoutId id="2147483658" r:id="rId10"/>
   </p:sldLayoutIdLst>
-  <p:hf sldNum="0" hdr="0" ftr="0" dt="0"/>
+  <p:hf hdr="0" dt="0"/>
   <p:txStyles>
     <p:titleStyle>
       <a:defPPr marR="0" lvl="0" algn="l" rtl="0">
@@ -5872,7 +6026,7 @@
           <p:cNvPr id="2" name="Titre 1">
             <a:extLst>
               <a:ext uri="{FF2B5EF4-FFF2-40B4-BE49-F238E27FC236}">
-                <a16:creationId xmlns:a16="http://schemas.microsoft.com/office/drawing/2014/main" id="{1EAD44B7-D3A8-42B5-8FD7-7AC74F842984}"/>
+                <a16:creationId xmlns:a16="http://schemas.microsoft.com/office/drawing/2014/main" id="{DB51B128-5110-4419-9E65-128611C03584}"/>
               </a:ext>
             </a:extLst>
           </p:cNvPr>
@@ -5897,7 +6051,7 @@
           <p:cNvPr id="3" name="Image 2">
             <a:extLst>
               <a:ext uri="{FF2B5EF4-FFF2-40B4-BE49-F238E27FC236}">
-                <a16:creationId xmlns:a16="http://schemas.microsoft.com/office/drawing/2014/main" id="{7C62CBF9-3FEB-431D-974D-D0373482B52E}"/>
+                <a16:creationId xmlns:a16="http://schemas.microsoft.com/office/drawing/2014/main" id="{DA1F7A3C-F846-4863-93DA-196E38D11D42}"/>
               </a:ext>
             </a:extLst>
           </p:cNvPr>
@@ -5914,18 +6068,133 @@
         </p:blipFill>
         <p:spPr>
           <a:xfrm>
-            <a:off x="1105106" y="360679"/>
-            <a:ext cx="6933787" cy="4422142"/>
+            <a:off x="323631" y="1212780"/>
+            <a:ext cx="8496737" cy="2717940"/>
           </a:xfrm>
           <a:prstGeom prst="rect">
             <a:avLst/>
           </a:prstGeom>
         </p:spPr>
       </p:pic>
+      <p:pic>
+        <p:nvPicPr>
+          <p:cNvPr id="5" name="Image 4">
+            <a:extLst>
+              <a:ext uri="{FF2B5EF4-FFF2-40B4-BE49-F238E27FC236}">
+                <a16:creationId xmlns:a16="http://schemas.microsoft.com/office/drawing/2014/main" id="{4E449D74-1331-4F25-9190-50E4845F4608}"/>
+              </a:ext>
+            </a:extLst>
+          </p:cNvPr>
+          <p:cNvPicPr>
+            <a:picLocks noChangeAspect="1"/>
+          </p:cNvPicPr>
+          <p:nvPr/>
+        </p:nvPicPr>
+        <p:blipFill>
+          <a:blip r:embed="rId3"/>
+          <a:stretch>
+            <a:fillRect/>
+          </a:stretch>
+        </p:blipFill>
+        <p:spPr>
+          <a:xfrm>
+            <a:off x="4632869" y="1036724"/>
+            <a:ext cx="2489328" cy="3283119"/>
+          </a:xfrm>
+          <a:prstGeom prst="rect">
+            <a:avLst/>
+          </a:prstGeom>
+        </p:spPr>
+      </p:pic>
+      <p:sp>
+        <p:nvSpPr>
+          <p:cNvPr id="6" name="Rectangle 5">
+            <a:extLst>
+              <a:ext uri="{FF2B5EF4-FFF2-40B4-BE49-F238E27FC236}">
+                <a16:creationId xmlns:a16="http://schemas.microsoft.com/office/drawing/2014/main" id="{206C6591-3A5B-4E02-AD9E-E6250FCD417B}"/>
+              </a:ext>
+            </a:extLst>
+          </p:cNvPr>
+          <p:cNvSpPr/>
+          <p:nvPr/>
+        </p:nvSpPr>
+        <p:spPr>
+          <a:xfrm>
+            <a:off x="706931" y="1836484"/>
+            <a:ext cx="2166898" cy="841800"/>
+          </a:xfrm>
+          <a:prstGeom prst="rect">
+            <a:avLst/>
+          </a:prstGeom>
+          <a:ln>
+            <a:noFill/>
+          </a:ln>
+        </p:spPr>
+        <p:style>
+          <a:lnRef idx="2">
+            <a:schemeClr val="accent5"/>
+          </a:lnRef>
+          <a:fillRef idx="1">
+            <a:schemeClr val="lt1"/>
+          </a:fillRef>
+          <a:effectRef idx="0">
+            <a:schemeClr val="accent5"/>
+          </a:effectRef>
+          <a:fontRef idx="minor">
+            <a:schemeClr val="dk1"/>
+          </a:fontRef>
+        </p:style>
+        <p:txBody>
+          <a:bodyPr rtlCol="0" anchor="ctr"/>
+          <a:lstStyle/>
+          <a:p>
+            <a:pPr algn="ctr"/>
+            <a:endParaRPr lang="fr-FR"/>
+          </a:p>
+        </p:txBody>
+      </p:sp>
+      <p:sp>
+        <p:nvSpPr>
+          <p:cNvPr id="4" name="Espace réservé du numéro de diapositive 3">
+            <a:extLst>
+              <a:ext uri="{FF2B5EF4-FFF2-40B4-BE49-F238E27FC236}">
+                <a16:creationId xmlns:a16="http://schemas.microsoft.com/office/drawing/2014/main" id="{D0E4F5CD-E8ED-4A7C-9B13-8581DD93EF04}"/>
+              </a:ext>
+            </a:extLst>
+          </p:cNvPr>
+          <p:cNvSpPr>
+            <a:spLocks noGrp="1"/>
+          </p:cNvSpPr>
+          <p:nvPr>
+            <p:ph type="sldNum" idx="12"/>
+          </p:nvPr>
+        </p:nvSpPr>
+        <p:spPr/>
+        <p:txBody>
+          <a:bodyPr/>
+          <a:lstStyle/>
+          <a:p>
+            <a:pPr marL="0" lvl="0" indent="0" algn="l" rtl="0">
+              <a:spcBef>
+                <a:spcPts val="0"/>
+              </a:spcBef>
+              <a:spcAft>
+                <a:spcPts val="0"/>
+              </a:spcAft>
+              <a:buNone/>
+            </a:pPr>
+            <a:fld id="{00000000-1234-1234-1234-123412341234}" type="slidenum">
+              <a:rPr lang="fr-FR" smtClean="0"/>
+              <a:t>10</a:t>
+            </a:fld>
+            <a:endParaRPr lang="fr-FR"/>
+          </a:p>
+        </p:txBody>
+      </p:sp>
     </p:spTree>
     <p:extLst>
       <p:ext uri="{BB962C8B-B14F-4D97-AF65-F5344CB8AC3E}">
-        <p14:creationId xmlns:p14="http://schemas.microsoft.com/office/powerpoint/2010/main" val="2439565548"/>
+        <p14:creationId xmlns:p14="http://schemas.microsoft.com/office/powerpoint/2010/main" val="2217439703"/>
       </p:ext>
     </p:extLst>
   </p:cSld>
@@ -5957,7 +6226,7 @@
           <p:cNvPr id="2" name="Titre 1">
             <a:extLst>
               <a:ext uri="{FF2B5EF4-FFF2-40B4-BE49-F238E27FC236}">
-                <a16:creationId xmlns:a16="http://schemas.microsoft.com/office/drawing/2014/main" id="{5DFF09F4-D54B-4BF6-8FA9-DC253D7B4EDA}"/>
+                <a16:creationId xmlns:a16="http://schemas.microsoft.com/office/drawing/2014/main" id="{1EAD44B7-D3A8-42B5-8FD7-7AC74F842984}"/>
               </a:ext>
             </a:extLst>
           </p:cNvPr>
@@ -5982,7 +6251,7 @@
           <p:cNvPr id="3" name="Image 2">
             <a:extLst>
               <a:ext uri="{FF2B5EF4-FFF2-40B4-BE49-F238E27FC236}">
-                <a16:creationId xmlns:a16="http://schemas.microsoft.com/office/drawing/2014/main" id="{FDD254F8-03D0-4407-BFF5-DED1403AD835}"/>
+                <a16:creationId xmlns:a16="http://schemas.microsoft.com/office/drawing/2014/main" id="{7C62CBF9-3FEB-431D-974D-D0373482B52E}"/>
               </a:ext>
             </a:extLst>
           </p:cNvPr>
@@ -5999,18 +6268,148 @@
         </p:blipFill>
         <p:spPr>
           <a:xfrm>
-            <a:off x="1222203" y="241180"/>
-            <a:ext cx="6699594" cy="4661140"/>
+            <a:off x="1105106" y="360679"/>
+            <a:ext cx="6933787" cy="4422142"/>
           </a:xfrm>
           <a:prstGeom prst="rect">
             <a:avLst/>
           </a:prstGeom>
         </p:spPr>
       </p:pic>
+      <p:sp>
+        <p:nvSpPr>
+          <p:cNvPr id="4" name="Rectangle 3">
+            <a:extLst>
+              <a:ext uri="{FF2B5EF4-FFF2-40B4-BE49-F238E27FC236}">
+                <a16:creationId xmlns:a16="http://schemas.microsoft.com/office/drawing/2014/main" id="{51DB2349-728C-4451-89EF-817A7FE53F11}"/>
+              </a:ext>
+            </a:extLst>
+          </p:cNvPr>
+          <p:cNvSpPr/>
+          <p:nvPr/>
+        </p:nvSpPr>
+        <p:spPr>
+          <a:xfrm>
+            <a:off x="6823881" y="1596788"/>
+            <a:ext cx="232012" cy="841800"/>
+          </a:xfrm>
+          <a:prstGeom prst="rect">
+            <a:avLst/>
+          </a:prstGeom>
+        </p:spPr>
+        <p:style>
+          <a:lnRef idx="2">
+            <a:schemeClr val="accent1">
+              <a:shade val="50000"/>
+            </a:schemeClr>
+          </a:lnRef>
+          <a:fillRef idx="1">
+            <a:schemeClr val="accent1"/>
+          </a:fillRef>
+          <a:effectRef idx="0">
+            <a:schemeClr val="accent1"/>
+          </a:effectRef>
+          <a:fontRef idx="minor">
+            <a:schemeClr val="lt1"/>
+          </a:fontRef>
+        </p:style>
+        <p:txBody>
+          <a:bodyPr rtlCol="0" anchor="ctr"/>
+          <a:lstStyle/>
+          <a:p>
+            <a:pPr algn="ctr"/>
+            <a:endParaRPr lang="fr-FR"/>
+          </a:p>
+        </p:txBody>
+      </p:sp>
+      <p:sp>
+        <p:nvSpPr>
+          <p:cNvPr id="5" name="Rectangle 4">
+            <a:extLst>
+              <a:ext uri="{FF2B5EF4-FFF2-40B4-BE49-F238E27FC236}">
+                <a16:creationId xmlns:a16="http://schemas.microsoft.com/office/drawing/2014/main" id="{38E16FAA-E18C-41C0-91E3-ED3BB291D4F2}"/>
+              </a:ext>
+            </a:extLst>
+          </p:cNvPr>
+          <p:cNvSpPr/>
+          <p:nvPr/>
+        </p:nvSpPr>
+        <p:spPr>
+          <a:xfrm>
+            <a:off x="6578222" y="3546712"/>
+            <a:ext cx="352776" cy="1155917"/>
+          </a:xfrm>
+          <a:prstGeom prst="rect">
+            <a:avLst/>
+          </a:prstGeom>
+        </p:spPr>
+        <p:style>
+          <a:lnRef idx="2">
+            <a:schemeClr val="accent1">
+              <a:shade val="50000"/>
+            </a:schemeClr>
+          </a:lnRef>
+          <a:fillRef idx="1">
+            <a:schemeClr val="accent1"/>
+          </a:fillRef>
+          <a:effectRef idx="0">
+            <a:schemeClr val="accent1"/>
+          </a:effectRef>
+          <a:fontRef idx="minor">
+            <a:schemeClr val="lt1"/>
+          </a:fontRef>
+        </p:style>
+        <p:txBody>
+          <a:bodyPr rtlCol="0" anchor="ctr"/>
+          <a:lstStyle/>
+          <a:p>
+            <a:pPr algn="ctr"/>
+            <a:endParaRPr lang="fr-FR"/>
+          </a:p>
+        </p:txBody>
+      </p:sp>
+      <p:sp>
+        <p:nvSpPr>
+          <p:cNvPr id="6" name="Espace réservé du numéro de diapositive 5">
+            <a:extLst>
+              <a:ext uri="{FF2B5EF4-FFF2-40B4-BE49-F238E27FC236}">
+                <a16:creationId xmlns:a16="http://schemas.microsoft.com/office/drawing/2014/main" id="{8F557E6B-DB18-4E57-9133-131D751514B4}"/>
+              </a:ext>
+            </a:extLst>
+          </p:cNvPr>
+          <p:cNvSpPr>
+            <a:spLocks noGrp="1"/>
+          </p:cNvSpPr>
+          <p:nvPr>
+            <p:ph type="sldNum" idx="12"/>
+          </p:nvPr>
+        </p:nvSpPr>
+        <p:spPr/>
+        <p:txBody>
+          <a:bodyPr/>
+          <a:lstStyle/>
+          <a:p>
+            <a:pPr marL="0" lvl="0" indent="0" algn="l" rtl="0">
+              <a:spcBef>
+                <a:spcPts val="0"/>
+              </a:spcBef>
+              <a:spcAft>
+                <a:spcPts val="0"/>
+              </a:spcAft>
+              <a:buNone/>
+            </a:pPr>
+            <a:fld id="{00000000-1234-1234-1234-123412341234}" type="slidenum">
+              <a:rPr lang="fr-FR" smtClean="0"/>
+              <a:t>11</a:t>
+            </a:fld>
+            <a:endParaRPr lang="fr-FR"/>
+          </a:p>
+        </p:txBody>
+      </p:sp>
     </p:spTree>
     <p:extLst>
       <p:ext uri="{BB962C8B-B14F-4D97-AF65-F5344CB8AC3E}">
-        <p14:creationId xmlns:p14="http://schemas.microsoft.com/office/powerpoint/2010/main" val="3831152574"/>
+        <p14:creationId xmlns:p14="http://schemas.microsoft.com/office/powerpoint/2010/main" val="1477212218"/>
       </p:ext>
     </p:extLst>
   </p:cSld>
@@ -6042,7 +6441,7 @@
           <p:cNvPr id="2" name="Titre 1">
             <a:extLst>
               <a:ext uri="{FF2B5EF4-FFF2-40B4-BE49-F238E27FC236}">
-                <a16:creationId xmlns:a16="http://schemas.microsoft.com/office/drawing/2014/main" id="{5DFF09F4-D54B-4BF6-8FA9-DC253D7B4EDA}"/>
+                <a16:creationId xmlns:a16="http://schemas.microsoft.com/office/drawing/2014/main" id="{1EAD44B7-D3A8-42B5-8FD7-7AC74F842984}"/>
               </a:ext>
             </a:extLst>
           </p:cNvPr>
@@ -6067,7 +6466,7 @@
           <p:cNvPr id="3" name="Image 2">
             <a:extLst>
               <a:ext uri="{FF2B5EF4-FFF2-40B4-BE49-F238E27FC236}">
-                <a16:creationId xmlns:a16="http://schemas.microsoft.com/office/drawing/2014/main" id="{FDD254F8-03D0-4407-BFF5-DED1403AD835}"/>
+                <a16:creationId xmlns:a16="http://schemas.microsoft.com/office/drawing/2014/main" id="{7C62CBF9-3FEB-431D-974D-D0373482B52E}"/>
               </a:ext>
             </a:extLst>
           </p:cNvPr>
@@ -6084,18 +6483,56 @@
         </p:blipFill>
         <p:spPr>
           <a:xfrm>
-            <a:off x="1222203" y="241180"/>
-            <a:ext cx="6699594" cy="4661140"/>
+            <a:off x="1105106" y="360679"/>
+            <a:ext cx="6933787" cy="4422142"/>
           </a:xfrm>
           <a:prstGeom prst="rect">
             <a:avLst/>
           </a:prstGeom>
         </p:spPr>
       </p:pic>
+      <p:sp>
+        <p:nvSpPr>
+          <p:cNvPr id="4" name="Espace réservé du numéro de diapositive 3">
+            <a:extLst>
+              <a:ext uri="{FF2B5EF4-FFF2-40B4-BE49-F238E27FC236}">
+                <a16:creationId xmlns:a16="http://schemas.microsoft.com/office/drawing/2014/main" id="{C18382F2-B0D6-4B7F-8F08-FD43125A5770}"/>
+              </a:ext>
+            </a:extLst>
+          </p:cNvPr>
+          <p:cNvSpPr>
+            <a:spLocks noGrp="1"/>
+          </p:cNvSpPr>
+          <p:nvPr>
+            <p:ph type="sldNum" idx="12"/>
+          </p:nvPr>
+        </p:nvSpPr>
+        <p:spPr/>
+        <p:txBody>
+          <a:bodyPr/>
+          <a:lstStyle/>
+          <a:p>
+            <a:pPr marL="0" lvl="0" indent="0" algn="l" rtl="0">
+              <a:spcBef>
+                <a:spcPts val="0"/>
+              </a:spcBef>
+              <a:spcAft>
+                <a:spcPts val="0"/>
+              </a:spcAft>
+              <a:buNone/>
+            </a:pPr>
+            <a:fld id="{00000000-1234-1234-1234-123412341234}" type="slidenum">
+              <a:rPr lang="fr-FR" smtClean="0"/>
+              <a:t>12</a:t>
+            </a:fld>
+            <a:endParaRPr lang="fr-FR"/>
+          </a:p>
+        </p:txBody>
+      </p:sp>
     </p:spTree>
     <p:extLst>
       <p:ext uri="{BB962C8B-B14F-4D97-AF65-F5344CB8AC3E}">
-        <p14:creationId xmlns:p14="http://schemas.microsoft.com/office/powerpoint/2010/main" val="933252074"/>
+        <p14:creationId xmlns:p14="http://schemas.microsoft.com/office/powerpoint/2010/main" val="2439565548"/>
       </p:ext>
     </p:extLst>
   </p:cSld>
@@ -6127,7 +6564,7 @@
           <p:cNvPr id="2" name="Titre 1">
             <a:extLst>
               <a:ext uri="{FF2B5EF4-FFF2-40B4-BE49-F238E27FC236}">
-                <a16:creationId xmlns:a16="http://schemas.microsoft.com/office/drawing/2014/main" id="{D9DA2074-7AB9-40BC-A73B-4DB3F1469453}"/>
+                <a16:creationId xmlns:a16="http://schemas.microsoft.com/office/drawing/2014/main" id="{5DFF09F4-D54B-4BF6-8FA9-DC253D7B4EDA}"/>
               </a:ext>
             </a:extLst>
           </p:cNvPr>
@@ -6152,7 +6589,7 @@
           <p:cNvPr id="3" name="Image 2">
             <a:extLst>
               <a:ext uri="{FF2B5EF4-FFF2-40B4-BE49-F238E27FC236}">
-                <a16:creationId xmlns:a16="http://schemas.microsoft.com/office/drawing/2014/main" id="{9E31F377-43DC-483D-AEAA-355FB7C105EF}"/>
+                <a16:creationId xmlns:a16="http://schemas.microsoft.com/office/drawing/2014/main" id="{FDD254F8-03D0-4407-BFF5-DED1403AD835}"/>
               </a:ext>
             </a:extLst>
           </p:cNvPr>
@@ -6169,18 +6606,102 @@
         </p:blipFill>
         <p:spPr>
           <a:xfrm>
-            <a:off x="720527" y="1308035"/>
-            <a:ext cx="7702946" cy="2527430"/>
+            <a:off x="1222203" y="241180"/>
+            <a:ext cx="6699594" cy="4661140"/>
           </a:xfrm>
           <a:prstGeom prst="rect">
             <a:avLst/>
           </a:prstGeom>
         </p:spPr>
       </p:pic>
+      <p:sp>
+        <p:nvSpPr>
+          <p:cNvPr id="4" name="Rectangle 3">
+            <a:extLst>
+              <a:ext uri="{FF2B5EF4-FFF2-40B4-BE49-F238E27FC236}">
+                <a16:creationId xmlns:a16="http://schemas.microsoft.com/office/drawing/2014/main" id="{2F9FB665-9221-4C65-8D26-6E918B53B31B}"/>
+              </a:ext>
+            </a:extLst>
+          </p:cNvPr>
+          <p:cNvSpPr/>
+          <p:nvPr/>
+        </p:nvSpPr>
+        <p:spPr>
+          <a:xfrm>
+            <a:off x="5268036" y="1473958"/>
+            <a:ext cx="900752" cy="841800"/>
+          </a:xfrm>
+          <a:prstGeom prst="rect">
+            <a:avLst/>
+          </a:prstGeom>
+        </p:spPr>
+        <p:style>
+          <a:lnRef idx="2">
+            <a:schemeClr val="accent1">
+              <a:shade val="50000"/>
+            </a:schemeClr>
+          </a:lnRef>
+          <a:fillRef idx="1">
+            <a:schemeClr val="accent1"/>
+          </a:fillRef>
+          <a:effectRef idx="0">
+            <a:schemeClr val="accent1"/>
+          </a:effectRef>
+          <a:fontRef idx="minor">
+            <a:schemeClr val="lt1"/>
+          </a:fontRef>
+        </p:style>
+        <p:txBody>
+          <a:bodyPr rtlCol="0" anchor="ctr"/>
+          <a:lstStyle/>
+          <a:p>
+            <a:pPr algn="ctr"/>
+            <a:endParaRPr lang="fr-FR"/>
+          </a:p>
+        </p:txBody>
+      </p:sp>
+      <p:sp>
+        <p:nvSpPr>
+          <p:cNvPr id="5" name="Espace réservé du numéro de diapositive 4">
+            <a:extLst>
+              <a:ext uri="{FF2B5EF4-FFF2-40B4-BE49-F238E27FC236}">
+                <a16:creationId xmlns:a16="http://schemas.microsoft.com/office/drawing/2014/main" id="{67FD30A0-8E14-4FE2-B881-8AAB9073E1D7}"/>
+              </a:ext>
+            </a:extLst>
+          </p:cNvPr>
+          <p:cNvSpPr>
+            <a:spLocks noGrp="1"/>
+          </p:cNvSpPr>
+          <p:nvPr>
+            <p:ph type="sldNum" idx="12"/>
+          </p:nvPr>
+        </p:nvSpPr>
+        <p:spPr/>
+        <p:txBody>
+          <a:bodyPr/>
+          <a:lstStyle/>
+          <a:p>
+            <a:pPr marL="0" lvl="0" indent="0" algn="l" rtl="0">
+              <a:spcBef>
+                <a:spcPts val="0"/>
+              </a:spcBef>
+              <a:spcAft>
+                <a:spcPts val="0"/>
+              </a:spcAft>
+              <a:buNone/>
+            </a:pPr>
+            <a:fld id="{00000000-1234-1234-1234-123412341234}" type="slidenum">
+              <a:rPr lang="fr-FR" smtClean="0"/>
+              <a:t>13</a:t>
+            </a:fld>
+            <a:endParaRPr lang="fr-FR"/>
+          </a:p>
+        </p:txBody>
+      </p:sp>
     </p:spTree>
     <p:extLst>
       <p:ext uri="{BB962C8B-B14F-4D97-AF65-F5344CB8AC3E}">
-        <p14:creationId xmlns:p14="http://schemas.microsoft.com/office/powerpoint/2010/main" val="2834392708"/>
+        <p14:creationId xmlns:p14="http://schemas.microsoft.com/office/powerpoint/2010/main" val="3831152574"/>
       </p:ext>
     </p:extLst>
   </p:cSld>
@@ -6212,7 +6733,7 @@
           <p:cNvPr id="2" name="Titre 1">
             <a:extLst>
               <a:ext uri="{FF2B5EF4-FFF2-40B4-BE49-F238E27FC236}">
-                <a16:creationId xmlns:a16="http://schemas.microsoft.com/office/drawing/2014/main" id="{A339F5C1-5F32-4AA0-ACCD-3BD05D005633}"/>
+                <a16:creationId xmlns:a16="http://schemas.microsoft.com/office/drawing/2014/main" id="{5DFF09F4-D54B-4BF6-8FA9-DC253D7B4EDA}"/>
               </a:ext>
             </a:extLst>
           </p:cNvPr>
@@ -6237,7 +6758,7 @@
           <p:cNvPr id="3" name="Image 2">
             <a:extLst>
               <a:ext uri="{FF2B5EF4-FFF2-40B4-BE49-F238E27FC236}">
-                <a16:creationId xmlns:a16="http://schemas.microsoft.com/office/drawing/2014/main" id="{A8FDA937-1A1F-4ADD-BACC-7A85EE24E0EB}"/>
+                <a16:creationId xmlns:a16="http://schemas.microsoft.com/office/drawing/2014/main" id="{FDD254F8-03D0-4407-BFF5-DED1403AD835}"/>
               </a:ext>
             </a:extLst>
           </p:cNvPr>
@@ -6254,18 +6775,56 @@
         </p:blipFill>
         <p:spPr>
           <a:xfrm>
-            <a:off x="676075" y="1549347"/>
-            <a:ext cx="7791850" cy="2044805"/>
+            <a:off x="1222203" y="241180"/>
+            <a:ext cx="6699594" cy="4661140"/>
           </a:xfrm>
           <a:prstGeom prst="rect">
             <a:avLst/>
           </a:prstGeom>
         </p:spPr>
       </p:pic>
+      <p:sp>
+        <p:nvSpPr>
+          <p:cNvPr id="4" name="Espace réservé du numéro de diapositive 3">
+            <a:extLst>
+              <a:ext uri="{FF2B5EF4-FFF2-40B4-BE49-F238E27FC236}">
+                <a16:creationId xmlns:a16="http://schemas.microsoft.com/office/drawing/2014/main" id="{4CA5287C-489D-4A50-940A-49424A967098}"/>
+              </a:ext>
+            </a:extLst>
+          </p:cNvPr>
+          <p:cNvSpPr>
+            <a:spLocks noGrp="1"/>
+          </p:cNvSpPr>
+          <p:nvPr>
+            <p:ph type="sldNum" idx="12"/>
+          </p:nvPr>
+        </p:nvSpPr>
+        <p:spPr/>
+        <p:txBody>
+          <a:bodyPr/>
+          <a:lstStyle/>
+          <a:p>
+            <a:pPr marL="0" lvl="0" indent="0" algn="l" rtl="0">
+              <a:spcBef>
+                <a:spcPts val="0"/>
+              </a:spcBef>
+              <a:spcAft>
+                <a:spcPts val="0"/>
+              </a:spcAft>
+              <a:buNone/>
+            </a:pPr>
+            <a:fld id="{00000000-1234-1234-1234-123412341234}" type="slidenum">
+              <a:rPr lang="fr-FR" smtClean="0"/>
+              <a:t>14</a:t>
+            </a:fld>
+            <a:endParaRPr lang="fr-FR"/>
+          </a:p>
+        </p:txBody>
+      </p:sp>
     </p:spTree>
     <p:extLst>
       <p:ext uri="{BB962C8B-B14F-4D97-AF65-F5344CB8AC3E}">
-        <p14:creationId xmlns:p14="http://schemas.microsoft.com/office/powerpoint/2010/main" val="2762028863"/>
+        <p14:creationId xmlns:p14="http://schemas.microsoft.com/office/powerpoint/2010/main" val="933252074"/>
       </p:ext>
     </p:extLst>
   </p:cSld>
@@ -6297,7 +6856,7 @@
           <p:cNvPr id="2" name="Titre 1">
             <a:extLst>
               <a:ext uri="{FF2B5EF4-FFF2-40B4-BE49-F238E27FC236}">
-                <a16:creationId xmlns:a16="http://schemas.microsoft.com/office/drawing/2014/main" id="{42B501BD-06CD-44C6-97BA-DC6F5BFB77F8}"/>
+                <a16:creationId xmlns:a16="http://schemas.microsoft.com/office/drawing/2014/main" id="{D9DA2074-7AB9-40BC-A73B-4DB3F1469453}"/>
               </a:ext>
             </a:extLst>
           </p:cNvPr>
@@ -6322,7 +6881,7 @@
           <p:cNvPr id="3" name="Image 2">
             <a:extLst>
               <a:ext uri="{FF2B5EF4-FFF2-40B4-BE49-F238E27FC236}">
-                <a16:creationId xmlns:a16="http://schemas.microsoft.com/office/drawing/2014/main" id="{C343E1E4-6379-437C-BA99-F8829E915C24}"/>
+                <a16:creationId xmlns:a16="http://schemas.microsoft.com/office/drawing/2014/main" id="{9E31F377-43DC-483D-AEAA-355FB7C105EF}"/>
               </a:ext>
             </a:extLst>
           </p:cNvPr>
@@ -6339,18 +6898,56 @@
         </p:blipFill>
         <p:spPr>
           <a:xfrm>
-            <a:off x="730052" y="1536647"/>
-            <a:ext cx="7683895" cy="2070206"/>
+            <a:off x="69489" y="1097279"/>
+            <a:ext cx="8393740" cy="2754088"/>
           </a:xfrm>
           <a:prstGeom prst="rect">
             <a:avLst/>
           </a:prstGeom>
         </p:spPr>
       </p:pic>
+      <p:sp>
+        <p:nvSpPr>
+          <p:cNvPr id="4" name="Espace réservé du numéro de diapositive 3">
+            <a:extLst>
+              <a:ext uri="{FF2B5EF4-FFF2-40B4-BE49-F238E27FC236}">
+                <a16:creationId xmlns:a16="http://schemas.microsoft.com/office/drawing/2014/main" id="{0D16995F-1148-4980-A172-D1DB03378054}"/>
+              </a:ext>
+            </a:extLst>
+          </p:cNvPr>
+          <p:cNvSpPr>
+            <a:spLocks noGrp="1"/>
+          </p:cNvSpPr>
+          <p:nvPr>
+            <p:ph type="sldNum" idx="12"/>
+          </p:nvPr>
+        </p:nvSpPr>
+        <p:spPr/>
+        <p:txBody>
+          <a:bodyPr/>
+          <a:lstStyle/>
+          <a:p>
+            <a:pPr marL="0" lvl="0" indent="0" algn="l" rtl="0">
+              <a:spcBef>
+                <a:spcPts val="0"/>
+              </a:spcBef>
+              <a:spcAft>
+                <a:spcPts val="0"/>
+              </a:spcAft>
+              <a:buNone/>
+            </a:pPr>
+            <a:fld id="{00000000-1234-1234-1234-123412341234}" type="slidenum">
+              <a:rPr lang="fr-FR" smtClean="0"/>
+              <a:t>15</a:t>
+            </a:fld>
+            <a:endParaRPr lang="fr-FR"/>
+          </a:p>
+        </p:txBody>
+      </p:sp>
     </p:spTree>
     <p:extLst>
       <p:ext uri="{BB962C8B-B14F-4D97-AF65-F5344CB8AC3E}">
-        <p14:creationId xmlns:p14="http://schemas.microsoft.com/office/powerpoint/2010/main" val="2941582622"/>
+        <p14:creationId xmlns:p14="http://schemas.microsoft.com/office/powerpoint/2010/main" val="2834392708"/>
       </p:ext>
     </p:extLst>
   </p:cSld>
@@ -6382,7 +6979,7 @@
           <p:cNvPr id="2" name="Titre 1">
             <a:extLst>
               <a:ext uri="{FF2B5EF4-FFF2-40B4-BE49-F238E27FC236}">
-                <a16:creationId xmlns:a16="http://schemas.microsoft.com/office/drawing/2014/main" id="{71CC46DB-B96B-41B3-8163-2669D8D95977}"/>
+                <a16:creationId xmlns:a16="http://schemas.microsoft.com/office/drawing/2014/main" id="{A339F5C1-5F32-4AA0-ACCD-3BD05D005633}"/>
               </a:ext>
             </a:extLst>
           </p:cNvPr>
@@ -6407,7 +7004,7 @@
           <p:cNvPr id="3" name="Image 2">
             <a:extLst>
               <a:ext uri="{FF2B5EF4-FFF2-40B4-BE49-F238E27FC236}">
-                <a16:creationId xmlns:a16="http://schemas.microsoft.com/office/drawing/2014/main" id="{77816EF2-7384-4837-B717-DD33AF9528CC}"/>
+                <a16:creationId xmlns:a16="http://schemas.microsoft.com/office/drawing/2014/main" id="{A8FDA937-1A1F-4ADD-BACC-7A85EE24E0EB}"/>
               </a:ext>
             </a:extLst>
           </p:cNvPr>
@@ -6424,18 +7021,56 @@
         </p:blipFill>
         <p:spPr>
           <a:xfrm>
-            <a:off x="698301" y="1482669"/>
-            <a:ext cx="7747398" cy="2178162"/>
+            <a:off x="141091" y="1383527"/>
+            <a:ext cx="8423717" cy="2210625"/>
           </a:xfrm>
           <a:prstGeom prst="rect">
             <a:avLst/>
           </a:prstGeom>
         </p:spPr>
       </p:pic>
+      <p:sp>
+        <p:nvSpPr>
+          <p:cNvPr id="4" name="Espace réservé du numéro de diapositive 3">
+            <a:extLst>
+              <a:ext uri="{FF2B5EF4-FFF2-40B4-BE49-F238E27FC236}">
+                <a16:creationId xmlns:a16="http://schemas.microsoft.com/office/drawing/2014/main" id="{8CA7B49D-B8A9-4595-B6A1-05DDC54B377C}"/>
+              </a:ext>
+            </a:extLst>
+          </p:cNvPr>
+          <p:cNvSpPr>
+            <a:spLocks noGrp="1"/>
+          </p:cNvSpPr>
+          <p:nvPr>
+            <p:ph type="sldNum" idx="12"/>
+          </p:nvPr>
+        </p:nvSpPr>
+        <p:spPr/>
+        <p:txBody>
+          <a:bodyPr/>
+          <a:lstStyle/>
+          <a:p>
+            <a:pPr marL="0" lvl="0" indent="0" algn="l" rtl="0">
+              <a:spcBef>
+                <a:spcPts val="0"/>
+              </a:spcBef>
+              <a:spcAft>
+                <a:spcPts val="0"/>
+              </a:spcAft>
+              <a:buNone/>
+            </a:pPr>
+            <a:fld id="{00000000-1234-1234-1234-123412341234}" type="slidenum">
+              <a:rPr lang="fr-FR" smtClean="0"/>
+              <a:t>16</a:t>
+            </a:fld>
+            <a:endParaRPr lang="fr-FR"/>
+          </a:p>
+        </p:txBody>
+      </p:sp>
     </p:spTree>
     <p:extLst>
       <p:ext uri="{BB962C8B-B14F-4D97-AF65-F5344CB8AC3E}">
-        <p14:creationId xmlns:p14="http://schemas.microsoft.com/office/powerpoint/2010/main" val="1072548764"/>
+        <p14:creationId xmlns:p14="http://schemas.microsoft.com/office/powerpoint/2010/main" val="2762028863"/>
       </p:ext>
     </p:extLst>
   </p:cSld>
@@ -6467,7 +7102,7 @@
           <p:cNvPr id="2" name="Titre 1">
             <a:extLst>
               <a:ext uri="{FF2B5EF4-FFF2-40B4-BE49-F238E27FC236}">
-                <a16:creationId xmlns:a16="http://schemas.microsoft.com/office/drawing/2014/main" id="{A0915AB0-FD41-487E-9C0F-29FD2D5577A5}"/>
+                <a16:creationId xmlns:a16="http://schemas.microsoft.com/office/drawing/2014/main" id="{42B501BD-06CD-44C6-97BA-DC6F5BFB77F8}"/>
               </a:ext>
             </a:extLst>
           </p:cNvPr>
@@ -6492,7 +7127,7 @@
           <p:cNvPr id="3" name="Image 2">
             <a:extLst>
               <a:ext uri="{FF2B5EF4-FFF2-40B4-BE49-F238E27FC236}">
-                <a16:creationId xmlns:a16="http://schemas.microsoft.com/office/drawing/2014/main" id="{79AB59C3-1E5A-4C04-BD97-5AB0309C87BD}"/>
+                <a16:creationId xmlns:a16="http://schemas.microsoft.com/office/drawing/2014/main" id="{C343E1E4-6379-437C-BA99-F8829E915C24}"/>
               </a:ext>
             </a:extLst>
           </p:cNvPr>
@@ -6509,18 +7144,56 @@
         </p:blipFill>
         <p:spPr>
           <a:xfrm>
-            <a:off x="550239" y="1775791"/>
-            <a:ext cx="7784224" cy="2129886"/>
+            <a:off x="43674" y="1351722"/>
+            <a:ext cx="8370273" cy="2255131"/>
           </a:xfrm>
           <a:prstGeom prst="rect">
             <a:avLst/>
           </a:prstGeom>
         </p:spPr>
       </p:pic>
+      <p:sp>
+        <p:nvSpPr>
+          <p:cNvPr id="4" name="Espace réservé du numéro de diapositive 3">
+            <a:extLst>
+              <a:ext uri="{FF2B5EF4-FFF2-40B4-BE49-F238E27FC236}">
+                <a16:creationId xmlns:a16="http://schemas.microsoft.com/office/drawing/2014/main" id="{356BDD9F-2491-4051-B665-A3A16846EC22}"/>
+              </a:ext>
+            </a:extLst>
+          </p:cNvPr>
+          <p:cNvSpPr>
+            <a:spLocks noGrp="1"/>
+          </p:cNvSpPr>
+          <p:nvPr>
+            <p:ph type="sldNum" idx="12"/>
+          </p:nvPr>
+        </p:nvSpPr>
+        <p:spPr/>
+        <p:txBody>
+          <a:bodyPr/>
+          <a:lstStyle/>
+          <a:p>
+            <a:pPr marL="0" lvl="0" indent="0" algn="l" rtl="0">
+              <a:spcBef>
+                <a:spcPts val="0"/>
+              </a:spcBef>
+              <a:spcAft>
+                <a:spcPts val="0"/>
+              </a:spcAft>
+              <a:buNone/>
+            </a:pPr>
+            <a:fld id="{00000000-1234-1234-1234-123412341234}" type="slidenum">
+              <a:rPr lang="fr-FR" smtClean="0"/>
+              <a:t>17</a:t>
+            </a:fld>
+            <a:endParaRPr lang="fr-FR"/>
+          </a:p>
+        </p:txBody>
+      </p:sp>
     </p:spTree>
     <p:extLst>
       <p:ext uri="{BB962C8B-B14F-4D97-AF65-F5344CB8AC3E}">
-        <p14:creationId xmlns:p14="http://schemas.microsoft.com/office/powerpoint/2010/main" val="4044351721"/>
+        <p14:creationId xmlns:p14="http://schemas.microsoft.com/office/powerpoint/2010/main" val="2941582622"/>
       </p:ext>
     </p:extLst>
   </p:cSld>
@@ -6552,7 +7225,7 @@
           <p:cNvPr id="2" name="Titre 1">
             <a:extLst>
               <a:ext uri="{FF2B5EF4-FFF2-40B4-BE49-F238E27FC236}">
-                <a16:creationId xmlns:a16="http://schemas.microsoft.com/office/drawing/2014/main" id="{4C68D1F3-6440-4B58-98B7-E2AB3C82F1B9}"/>
+                <a16:creationId xmlns:a16="http://schemas.microsoft.com/office/drawing/2014/main" id="{71CC46DB-B96B-41B3-8163-2669D8D95977}"/>
               </a:ext>
             </a:extLst>
           </p:cNvPr>
@@ -6574,10 +7247,10 @@
       </p:sp>
       <p:pic>
         <p:nvPicPr>
-          <p:cNvPr id="4" name="Image 3">
-            <a:extLst>
-              <a:ext uri="{FF2B5EF4-FFF2-40B4-BE49-F238E27FC236}">
-                <a16:creationId xmlns:a16="http://schemas.microsoft.com/office/drawing/2014/main" id="{8CA8BD71-AB9A-46E8-AC3C-6060AE71F36B}"/>
+          <p:cNvPr id="3" name="Image 2">
+            <a:extLst>
+              <a:ext uri="{FF2B5EF4-FFF2-40B4-BE49-F238E27FC236}">
+                <a16:creationId xmlns:a16="http://schemas.microsoft.com/office/drawing/2014/main" id="{77816EF2-7384-4837-B717-DD33AF9528CC}"/>
               </a:ext>
             </a:extLst>
           </p:cNvPr>
@@ -6594,18 +7267,56 @@
         </p:blipFill>
         <p:spPr>
           <a:xfrm>
-            <a:off x="253778" y="1130226"/>
-            <a:ext cx="8636444" cy="2883048"/>
+            <a:off x="366436" y="1296063"/>
+            <a:ext cx="8411128" cy="2364768"/>
           </a:xfrm>
           <a:prstGeom prst="rect">
             <a:avLst/>
           </a:prstGeom>
         </p:spPr>
       </p:pic>
+      <p:sp>
+        <p:nvSpPr>
+          <p:cNvPr id="4" name="Espace réservé du numéro de diapositive 3">
+            <a:extLst>
+              <a:ext uri="{FF2B5EF4-FFF2-40B4-BE49-F238E27FC236}">
+                <a16:creationId xmlns:a16="http://schemas.microsoft.com/office/drawing/2014/main" id="{E306DFD0-7369-447C-96F5-88A77C8039B8}"/>
+              </a:ext>
+            </a:extLst>
+          </p:cNvPr>
+          <p:cNvSpPr>
+            <a:spLocks noGrp="1"/>
+          </p:cNvSpPr>
+          <p:nvPr>
+            <p:ph type="sldNum" idx="12"/>
+          </p:nvPr>
+        </p:nvSpPr>
+        <p:spPr/>
+        <p:txBody>
+          <a:bodyPr/>
+          <a:lstStyle/>
+          <a:p>
+            <a:pPr marL="0" lvl="0" indent="0" algn="l" rtl="0">
+              <a:spcBef>
+                <a:spcPts val="0"/>
+              </a:spcBef>
+              <a:spcAft>
+                <a:spcPts val="0"/>
+              </a:spcAft>
+              <a:buNone/>
+            </a:pPr>
+            <a:fld id="{00000000-1234-1234-1234-123412341234}" type="slidenum">
+              <a:rPr lang="fr-FR" smtClean="0"/>
+              <a:t>18</a:t>
+            </a:fld>
+            <a:endParaRPr lang="fr-FR"/>
+          </a:p>
+        </p:txBody>
+      </p:sp>
     </p:spTree>
     <p:extLst>
       <p:ext uri="{BB962C8B-B14F-4D97-AF65-F5344CB8AC3E}">
-        <p14:creationId xmlns:p14="http://schemas.microsoft.com/office/powerpoint/2010/main" val="484931126"/>
+        <p14:creationId xmlns:p14="http://schemas.microsoft.com/office/powerpoint/2010/main" val="1072548764"/>
       </p:ext>
     </p:extLst>
   </p:cSld>
@@ -6632,37 +7343,12 @@
           <a:chExt cx="0" cy="0"/>
         </a:xfrm>
       </p:grpSpPr>
-      <p:sp>
-        <p:nvSpPr>
-          <p:cNvPr id="2" name="Titre 1">
-            <a:extLst>
-              <a:ext uri="{FF2B5EF4-FFF2-40B4-BE49-F238E27FC236}">
-                <a16:creationId xmlns:a16="http://schemas.microsoft.com/office/drawing/2014/main" id="{20E76EC5-4358-402A-BE59-22FBEA3CEE4B}"/>
-              </a:ext>
-            </a:extLst>
-          </p:cNvPr>
-          <p:cNvSpPr>
-            <a:spLocks noGrp="1"/>
-          </p:cNvSpPr>
-          <p:nvPr>
-            <p:ph type="title"/>
-          </p:nvPr>
-        </p:nvSpPr>
-        <p:spPr/>
-        <p:txBody>
-          <a:bodyPr/>
-          <a:lstStyle/>
-          <a:p>
-            <a:endParaRPr lang="fr-FR"/>
-          </a:p>
-        </p:txBody>
-      </p:sp>
       <p:pic>
         <p:nvPicPr>
           <p:cNvPr id="3" name="Image 2">
             <a:extLst>
               <a:ext uri="{FF2B5EF4-FFF2-40B4-BE49-F238E27FC236}">
-                <a16:creationId xmlns:a16="http://schemas.microsoft.com/office/drawing/2014/main" id="{BE3EB5C2-13E3-4801-996F-36AA96A73284}"/>
+                <a16:creationId xmlns:a16="http://schemas.microsoft.com/office/drawing/2014/main" id="{A60654AB-03D0-4BDD-B907-EB65A6373C09}"/>
               </a:ext>
             </a:extLst>
           </p:cNvPr>
@@ -6679,18 +7365,86 @@
         </p:blipFill>
         <p:spPr>
           <a:xfrm>
-            <a:off x="3193775" y="308080"/>
-            <a:ext cx="3301910" cy="4346959"/>
+            <a:off x="577155" y="3563238"/>
+            <a:ext cx="7989690" cy="658241"/>
           </a:xfrm>
           <a:prstGeom prst="rect">
             <a:avLst/>
           </a:prstGeom>
         </p:spPr>
       </p:pic>
+      <p:pic>
+        <p:nvPicPr>
+          <p:cNvPr id="2" name="Image 1">
+            <a:extLst>
+              <a:ext uri="{FF2B5EF4-FFF2-40B4-BE49-F238E27FC236}">
+                <a16:creationId xmlns:a16="http://schemas.microsoft.com/office/drawing/2014/main" id="{ED8CF578-CE6D-47A9-9B49-7C1528384C0E}"/>
+              </a:ext>
+            </a:extLst>
+          </p:cNvPr>
+          <p:cNvPicPr>
+            <a:picLocks noChangeAspect="1"/>
+          </p:cNvPicPr>
+          <p:nvPr/>
+        </p:nvPicPr>
+        <p:blipFill>
+          <a:blip r:embed="rId3"/>
+          <a:stretch>
+            <a:fillRect/>
+          </a:stretch>
+        </p:blipFill>
+        <p:spPr>
+          <a:xfrm>
+            <a:off x="2413393" y="1030878"/>
+            <a:ext cx="4317214" cy="2280118"/>
+          </a:xfrm>
+          <a:prstGeom prst="rect">
+            <a:avLst/>
+          </a:prstGeom>
+        </p:spPr>
+      </p:pic>
+      <p:sp>
+        <p:nvSpPr>
+          <p:cNvPr id="6" name="Espace réservé du numéro de diapositive 5">
+            <a:extLst>
+              <a:ext uri="{FF2B5EF4-FFF2-40B4-BE49-F238E27FC236}">
+                <a16:creationId xmlns:a16="http://schemas.microsoft.com/office/drawing/2014/main" id="{00CCC349-FBC2-437E-8A2C-AC2EA76DE9D5}"/>
+              </a:ext>
+            </a:extLst>
+          </p:cNvPr>
+          <p:cNvSpPr>
+            <a:spLocks noGrp="1"/>
+          </p:cNvSpPr>
+          <p:nvPr>
+            <p:ph type="sldNum" idx="12"/>
+          </p:nvPr>
+        </p:nvSpPr>
+        <p:spPr/>
+        <p:txBody>
+          <a:bodyPr/>
+          <a:lstStyle/>
+          <a:p>
+            <a:pPr marL="0" lvl="0" indent="0" algn="l" rtl="0">
+              <a:spcBef>
+                <a:spcPts val="0"/>
+              </a:spcBef>
+              <a:spcAft>
+                <a:spcPts val="0"/>
+              </a:spcAft>
+              <a:buNone/>
+            </a:pPr>
+            <a:fld id="{00000000-1234-1234-1234-123412341234}" type="slidenum">
+              <a:rPr lang="fr-FR" smtClean="0"/>
+              <a:t>19</a:t>
+            </a:fld>
+            <a:endParaRPr lang="fr-FR"/>
+          </a:p>
+        </p:txBody>
+      </p:sp>
     </p:spTree>
     <p:extLst>
       <p:ext uri="{BB962C8B-B14F-4D97-AF65-F5344CB8AC3E}">
-        <p14:creationId xmlns:p14="http://schemas.microsoft.com/office/powerpoint/2010/main" val="1735338986"/>
+        <p14:creationId xmlns:p14="http://schemas.microsoft.com/office/powerpoint/2010/main" val="4044351721"/>
       </p:ext>
     </p:extLst>
   </p:cSld>
@@ -6722,7 +7476,7 @@
           <p:cNvPr id="2" name="Titre 1">
             <a:extLst>
               <a:ext uri="{FF2B5EF4-FFF2-40B4-BE49-F238E27FC236}">
-                <a16:creationId xmlns:a16="http://schemas.microsoft.com/office/drawing/2014/main" id="{C13C6C82-6134-4E47-BBB0-800B152E94CA}"/>
+                <a16:creationId xmlns:a16="http://schemas.microsoft.com/office/drawing/2014/main" id="{5477AC4F-632A-4BFC-BACB-1D32A995D332}"/>
               </a:ext>
             </a:extLst>
           </p:cNvPr>
@@ -6738,22 +7492,345 @@
           <a:bodyPr/>
           <a:lstStyle/>
           <a:p>
+            <a:endParaRPr lang="fr-FR"/>
+          </a:p>
+        </p:txBody>
+      </p:sp>
+      <p:sp>
+        <p:nvSpPr>
+          <p:cNvPr id="3" name="Espace réservé du numéro de diapositive 2">
+            <a:extLst>
+              <a:ext uri="{FF2B5EF4-FFF2-40B4-BE49-F238E27FC236}">
+                <a16:creationId xmlns:a16="http://schemas.microsoft.com/office/drawing/2014/main" id="{56665DFD-4E4D-4F3E-9FDA-8E5A45D89000}"/>
+              </a:ext>
+            </a:extLst>
+          </p:cNvPr>
+          <p:cNvSpPr>
+            <a:spLocks noGrp="1"/>
+          </p:cNvSpPr>
+          <p:nvPr>
+            <p:ph type="sldNum" idx="12"/>
+          </p:nvPr>
+        </p:nvSpPr>
+        <p:spPr/>
+        <p:txBody>
+          <a:bodyPr/>
+          <a:lstStyle/>
+          <a:p>
+            <a:pPr marL="0" lvl="0" indent="0" algn="l" rtl="0">
+              <a:spcBef>
+                <a:spcPts val="0"/>
+              </a:spcBef>
+              <a:spcAft>
+                <a:spcPts val="0"/>
+              </a:spcAft>
+              <a:buNone/>
+            </a:pPr>
+            <a:fld id="{00000000-1234-1234-1234-123412341234}" type="slidenum">
+              <a:rPr lang="fr-FR" smtClean="0"/>
+              <a:t>2</a:t>
+            </a:fld>
+            <a:endParaRPr lang="fr-FR"/>
+          </a:p>
+        </p:txBody>
+      </p:sp>
+      <p:sp>
+        <p:nvSpPr>
+          <p:cNvPr id="5" name="Titre 1">
+            <a:extLst>
+              <a:ext uri="{FF2B5EF4-FFF2-40B4-BE49-F238E27FC236}">
+                <a16:creationId xmlns:a16="http://schemas.microsoft.com/office/drawing/2014/main" id="{15B4CAF7-6165-422B-B0F8-D66AA102A4DA}"/>
+              </a:ext>
+            </a:extLst>
+          </p:cNvPr>
+          <p:cNvSpPr txBox="1">
+            <a:spLocks/>
+          </p:cNvSpPr>
+          <p:nvPr/>
+        </p:nvSpPr>
+        <p:spPr>
+          <a:xfrm>
+            <a:off x="137528" y="1309050"/>
+            <a:ext cx="8520600" cy="841800"/>
+          </a:xfrm>
+          <a:prstGeom prst="rect">
+            <a:avLst/>
+          </a:prstGeom>
+          <a:noFill/>
+          <a:ln>
+            <a:noFill/>
+          </a:ln>
+        </p:spPr>
+        <p:txBody>
+          <a:bodyPr spcFirstLastPara="1" wrap="square" lIns="91425" tIns="91425" rIns="91425" bIns="91425" anchor="ctr" anchorCtr="0">
+            <a:noAutofit/>
+          </a:bodyPr>
+          <a:lstStyle>
+            <a:defPPr marR="0" lvl="0" algn="l" rtl="0">
+              <a:lnSpc>
+                <a:spcPct val="100000"/>
+              </a:lnSpc>
+              <a:spcBef>
+                <a:spcPts val="0"/>
+              </a:spcBef>
+              <a:spcAft>
+                <a:spcPts val="0"/>
+              </a:spcAft>
+            </a:defPPr>
+            <a:lvl1pPr marR="0" lvl="0" algn="ctr" rtl="0">
+              <a:lnSpc>
+                <a:spcPct val="100000"/>
+              </a:lnSpc>
+              <a:spcBef>
+                <a:spcPts val="0"/>
+              </a:spcBef>
+              <a:spcAft>
+                <a:spcPts val="0"/>
+              </a:spcAft>
+              <a:buClr>
+                <a:schemeClr val="dk1"/>
+              </a:buClr>
+              <a:buSzPts val="3600"/>
+              <a:buFont typeface="Fira Sans Extra Condensed Medium"/>
+              <a:buNone/>
+              <a:defRPr sz="3600" b="0" i="0" u="none" strike="noStrike" cap="none">
+                <a:solidFill>
+                  <a:schemeClr val="dk1"/>
+                </a:solidFill>
+                <a:latin typeface="Fira Sans Extra Condensed Medium"/>
+                <a:ea typeface="Fira Sans Extra Condensed Medium"/>
+                <a:cs typeface="Fira Sans Extra Condensed Medium"/>
+                <a:sym typeface="Fira Sans Extra Condensed Medium"/>
+              </a:defRPr>
+            </a:lvl1pPr>
+            <a:lvl2pPr marR="0" lvl="1" algn="ctr" rtl="0">
+              <a:lnSpc>
+                <a:spcPct val="100000"/>
+              </a:lnSpc>
+              <a:spcBef>
+                <a:spcPts val="0"/>
+              </a:spcBef>
+              <a:spcAft>
+                <a:spcPts val="0"/>
+              </a:spcAft>
+              <a:buClr>
+                <a:schemeClr val="dk1"/>
+              </a:buClr>
+              <a:buSzPts val="3600"/>
+              <a:buFont typeface="Fira Sans Extra Condensed Medium"/>
+              <a:buNone/>
+              <a:defRPr sz="3600" b="0" i="0" u="none" strike="noStrike" cap="none">
+                <a:solidFill>
+                  <a:schemeClr val="dk1"/>
+                </a:solidFill>
+                <a:latin typeface="Fira Sans Extra Condensed Medium"/>
+                <a:ea typeface="Fira Sans Extra Condensed Medium"/>
+                <a:cs typeface="Fira Sans Extra Condensed Medium"/>
+                <a:sym typeface="Fira Sans Extra Condensed Medium"/>
+              </a:defRPr>
+            </a:lvl2pPr>
+            <a:lvl3pPr marR="0" lvl="2" algn="ctr" rtl="0">
+              <a:lnSpc>
+                <a:spcPct val="100000"/>
+              </a:lnSpc>
+              <a:spcBef>
+                <a:spcPts val="0"/>
+              </a:spcBef>
+              <a:spcAft>
+                <a:spcPts val="0"/>
+              </a:spcAft>
+              <a:buClr>
+                <a:schemeClr val="dk1"/>
+              </a:buClr>
+              <a:buSzPts val="3600"/>
+              <a:buFont typeface="Fira Sans Extra Condensed Medium"/>
+              <a:buNone/>
+              <a:defRPr sz="3600" b="0" i="0" u="none" strike="noStrike" cap="none">
+                <a:solidFill>
+                  <a:schemeClr val="dk1"/>
+                </a:solidFill>
+                <a:latin typeface="Fira Sans Extra Condensed Medium"/>
+                <a:ea typeface="Fira Sans Extra Condensed Medium"/>
+                <a:cs typeface="Fira Sans Extra Condensed Medium"/>
+                <a:sym typeface="Fira Sans Extra Condensed Medium"/>
+              </a:defRPr>
+            </a:lvl3pPr>
+            <a:lvl4pPr marR="0" lvl="3" algn="ctr" rtl="0">
+              <a:lnSpc>
+                <a:spcPct val="100000"/>
+              </a:lnSpc>
+              <a:spcBef>
+                <a:spcPts val="0"/>
+              </a:spcBef>
+              <a:spcAft>
+                <a:spcPts val="0"/>
+              </a:spcAft>
+              <a:buClr>
+                <a:schemeClr val="dk1"/>
+              </a:buClr>
+              <a:buSzPts val="3600"/>
+              <a:buFont typeface="Fira Sans Extra Condensed Medium"/>
+              <a:buNone/>
+              <a:defRPr sz="3600" b="0" i="0" u="none" strike="noStrike" cap="none">
+                <a:solidFill>
+                  <a:schemeClr val="dk1"/>
+                </a:solidFill>
+                <a:latin typeface="Fira Sans Extra Condensed Medium"/>
+                <a:ea typeface="Fira Sans Extra Condensed Medium"/>
+                <a:cs typeface="Fira Sans Extra Condensed Medium"/>
+                <a:sym typeface="Fira Sans Extra Condensed Medium"/>
+              </a:defRPr>
+            </a:lvl4pPr>
+            <a:lvl5pPr marR="0" lvl="4" algn="ctr" rtl="0">
+              <a:lnSpc>
+                <a:spcPct val="100000"/>
+              </a:lnSpc>
+              <a:spcBef>
+                <a:spcPts val="0"/>
+              </a:spcBef>
+              <a:spcAft>
+                <a:spcPts val="0"/>
+              </a:spcAft>
+              <a:buClr>
+                <a:schemeClr val="dk1"/>
+              </a:buClr>
+              <a:buSzPts val="3600"/>
+              <a:buFont typeface="Fira Sans Extra Condensed Medium"/>
+              <a:buNone/>
+              <a:defRPr sz="3600" b="0" i="0" u="none" strike="noStrike" cap="none">
+                <a:solidFill>
+                  <a:schemeClr val="dk1"/>
+                </a:solidFill>
+                <a:latin typeface="Fira Sans Extra Condensed Medium"/>
+                <a:ea typeface="Fira Sans Extra Condensed Medium"/>
+                <a:cs typeface="Fira Sans Extra Condensed Medium"/>
+                <a:sym typeface="Fira Sans Extra Condensed Medium"/>
+              </a:defRPr>
+            </a:lvl5pPr>
+            <a:lvl6pPr marR="0" lvl="5" algn="ctr" rtl="0">
+              <a:lnSpc>
+                <a:spcPct val="100000"/>
+              </a:lnSpc>
+              <a:spcBef>
+                <a:spcPts val="0"/>
+              </a:spcBef>
+              <a:spcAft>
+                <a:spcPts val="0"/>
+              </a:spcAft>
+              <a:buClr>
+                <a:schemeClr val="dk1"/>
+              </a:buClr>
+              <a:buSzPts val="3600"/>
+              <a:buFont typeface="Fira Sans Extra Condensed Medium"/>
+              <a:buNone/>
+              <a:defRPr sz="3600" b="0" i="0" u="none" strike="noStrike" cap="none">
+                <a:solidFill>
+                  <a:schemeClr val="dk1"/>
+                </a:solidFill>
+                <a:latin typeface="Fira Sans Extra Condensed Medium"/>
+                <a:ea typeface="Fira Sans Extra Condensed Medium"/>
+                <a:cs typeface="Fira Sans Extra Condensed Medium"/>
+                <a:sym typeface="Fira Sans Extra Condensed Medium"/>
+              </a:defRPr>
+            </a:lvl6pPr>
+            <a:lvl7pPr marR="0" lvl="6" algn="ctr" rtl="0">
+              <a:lnSpc>
+                <a:spcPct val="100000"/>
+              </a:lnSpc>
+              <a:spcBef>
+                <a:spcPts val="0"/>
+              </a:spcBef>
+              <a:spcAft>
+                <a:spcPts val="0"/>
+              </a:spcAft>
+              <a:buClr>
+                <a:schemeClr val="dk1"/>
+              </a:buClr>
+              <a:buSzPts val="3600"/>
+              <a:buFont typeface="Fira Sans Extra Condensed Medium"/>
+              <a:buNone/>
+              <a:defRPr sz="3600" b="0" i="0" u="none" strike="noStrike" cap="none">
+                <a:solidFill>
+                  <a:schemeClr val="dk1"/>
+                </a:solidFill>
+                <a:latin typeface="Fira Sans Extra Condensed Medium"/>
+                <a:ea typeface="Fira Sans Extra Condensed Medium"/>
+                <a:cs typeface="Fira Sans Extra Condensed Medium"/>
+                <a:sym typeface="Fira Sans Extra Condensed Medium"/>
+              </a:defRPr>
+            </a:lvl7pPr>
+            <a:lvl8pPr marR="0" lvl="7" algn="ctr" rtl="0">
+              <a:lnSpc>
+                <a:spcPct val="100000"/>
+              </a:lnSpc>
+              <a:spcBef>
+                <a:spcPts val="0"/>
+              </a:spcBef>
+              <a:spcAft>
+                <a:spcPts val="0"/>
+              </a:spcAft>
+              <a:buClr>
+                <a:schemeClr val="dk1"/>
+              </a:buClr>
+              <a:buSzPts val="3600"/>
+              <a:buFont typeface="Fira Sans Extra Condensed Medium"/>
+              <a:buNone/>
+              <a:defRPr sz="3600" b="0" i="0" u="none" strike="noStrike" cap="none">
+                <a:solidFill>
+                  <a:schemeClr val="dk1"/>
+                </a:solidFill>
+                <a:latin typeface="Fira Sans Extra Condensed Medium"/>
+                <a:ea typeface="Fira Sans Extra Condensed Medium"/>
+                <a:cs typeface="Fira Sans Extra Condensed Medium"/>
+                <a:sym typeface="Fira Sans Extra Condensed Medium"/>
+              </a:defRPr>
+            </a:lvl8pPr>
+            <a:lvl9pPr marR="0" lvl="8" algn="ctr" rtl="0">
+              <a:lnSpc>
+                <a:spcPct val="100000"/>
+              </a:lnSpc>
+              <a:spcBef>
+                <a:spcPts val="0"/>
+              </a:spcBef>
+              <a:spcAft>
+                <a:spcPts val="0"/>
+              </a:spcAft>
+              <a:buClr>
+                <a:schemeClr val="dk1"/>
+              </a:buClr>
+              <a:buSzPts val="3600"/>
+              <a:buFont typeface="Fira Sans Extra Condensed Medium"/>
+              <a:buNone/>
+              <a:defRPr sz="3600" b="0" i="0" u="none" strike="noStrike" cap="none">
+                <a:solidFill>
+                  <a:schemeClr val="dk1"/>
+                </a:solidFill>
+                <a:latin typeface="Fira Sans Extra Condensed Medium"/>
+                <a:ea typeface="Fira Sans Extra Condensed Medium"/>
+                <a:cs typeface="Fira Sans Extra Condensed Medium"/>
+                <a:sym typeface="Fira Sans Extra Condensed Medium"/>
+              </a:defRPr>
+            </a:lvl9pPr>
+          </a:lstStyle>
+          <a:p>
             <a:r>
               <a:rPr lang="fr-FR" dirty="0"/>
-              <a:t>Les portes </a:t>
+              <a:t>Les portes logiques </a:t>
             </a:r>
+            <a:br>
+              <a:rPr lang="fr-FR" dirty="0"/>
+            </a:br>
             <a:r>
-              <a:rPr lang="fr-FR" dirty="0" err="1"/>
-              <a:t>reversibles</a:t>
+              <a:rPr lang="fr-FR" dirty="0"/>
+              <a:t>réversibles</a:t>
             </a:r>
-            <a:endParaRPr lang="fr-FR" dirty="0"/>
           </a:p>
         </p:txBody>
       </p:sp>
     </p:spTree>
     <p:extLst>
       <p:ext uri="{BB962C8B-B14F-4D97-AF65-F5344CB8AC3E}">
-        <p14:creationId xmlns:p14="http://schemas.microsoft.com/office/powerpoint/2010/main" val="1133589159"/>
+        <p14:creationId xmlns:p14="http://schemas.microsoft.com/office/powerpoint/2010/main" val="3208381016"/>
       </p:ext>
     </p:extLst>
   </p:cSld>
@@ -6780,37 +7857,12 @@
           <a:chExt cx="0" cy="0"/>
         </a:xfrm>
       </p:grpSpPr>
-      <p:sp>
-        <p:nvSpPr>
-          <p:cNvPr id="2" name="Titre 1">
-            <a:extLst>
-              <a:ext uri="{FF2B5EF4-FFF2-40B4-BE49-F238E27FC236}">
-                <a16:creationId xmlns:a16="http://schemas.microsoft.com/office/drawing/2014/main" id="{5B34FD97-BDD3-449A-89F1-9D07EBCB7469}"/>
-              </a:ext>
-            </a:extLst>
-          </p:cNvPr>
-          <p:cNvSpPr>
-            <a:spLocks noGrp="1"/>
-          </p:cNvSpPr>
-          <p:nvPr>
-            <p:ph type="title"/>
-          </p:nvPr>
-        </p:nvSpPr>
-        <p:spPr/>
-        <p:txBody>
-          <a:bodyPr/>
-          <a:lstStyle/>
-          <a:p>
-            <a:endParaRPr lang="fr-FR"/>
-          </a:p>
-        </p:txBody>
-      </p:sp>
       <p:pic>
         <p:nvPicPr>
           <p:cNvPr id="3" name="Image 2">
             <a:extLst>
               <a:ext uri="{FF2B5EF4-FFF2-40B4-BE49-F238E27FC236}">
-                <a16:creationId xmlns:a16="http://schemas.microsoft.com/office/drawing/2014/main" id="{786A994A-DF46-40F8-B0EC-EA5799C78E86}"/>
+                <a16:creationId xmlns:a16="http://schemas.microsoft.com/office/drawing/2014/main" id="{54BAF996-D997-46F6-B92A-AC05E2C0655D}"/>
               </a:ext>
             </a:extLst>
           </p:cNvPr>
@@ -6827,18 +7879,56 @@
         </p:blipFill>
         <p:spPr>
           <a:xfrm>
-            <a:off x="1847710" y="819060"/>
-            <a:ext cx="5448580" cy="3505380"/>
+            <a:off x="361733" y="1469968"/>
+            <a:ext cx="8420533" cy="2203563"/>
           </a:xfrm>
           <a:prstGeom prst="rect">
             <a:avLst/>
           </a:prstGeom>
         </p:spPr>
       </p:pic>
+      <p:sp>
+        <p:nvSpPr>
+          <p:cNvPr id="5" name="Espace réservé du numéro de diapositive 4">
+            <a:extLst>
+              <a:ext uri="{FF2B5EF4-FFF2-40B4-BE49-F238E27FC236}">
+                <a16:creationId xmlns:a16="http://schemas.microsoft.com/office/drawing/2014/main" id="{0B547C81-FDFD-452E-A4E3-31734B973620}"/>
+              </a:ext>
+            </a:extLst>
+          </p:cNvPr>
+          <p:cNvSpPr>
+            <a:spLocks noGrp="1"/>
+          </p:cNvSpPr>
+          <p:nvPr>
+            <p:ph type="sldNum" idx="12"/>
+          </p:nvPr>
+        </p:nvSpPr>
+        <p:spPr/>
+        <p:txBody>
+          <a:bodyPr/>
+          <a:lstStyle/>
+          <a:p>
+            <a:pPr marL="0" lvl="0" indent="0" algn="l" rtl="0">
+              <a:spcBef>
+                <a:spcPts val="0"/>
+              </a:spcBef>
+              <a:spcAft>
+                <a:spcPts val="0"/>
+              </a:spcAft>
+              <a:buNone/>
+            </a:pPr>
+            <a:fld id="{00000000-1234-1234-1234-123412341234}" type="slidenum">
+              <a:rPr lang="fr-FR" smtClean="0"/>
+              <a:t>20</a:t>
+            </a:fld>
+            <a:endParaRPr lang="fr-FR"/>
+          </a:p>
+        </p:txBody>
+      </p:sp>
     </p:spTree>
     <p:extLst>
       <p:ext uri="{BB962C8B-B14F-4D97-AF65-F5344CB8AC3E}">
-        <p14:creationId xmlns:p14="http://schemas.microsoft.com/office/powerpoint/2010/main" val="1477863677"/>
+        <p14:creationId xmlns:p14="http://schemas.microsoft.com/office/powerpoint/2010/main" val="484931126"/>
       </p:ext>
     </p:extLst>
   </p:cSld>
@@ -6867,10 +7957,10 @@
       </p:grpSpPr>
       <p:sp>
         <p:nvSpPr>
-          <p:cNvPr id="2" name="Titre 1">
-            <a:extLst>
-              <a:ext uri="{FF2B5EF4-FFF2-40B4-BE49-F238E27FC236}">
-                <a16:creationId xmlns:a16="http://schemas.microsoft.com/office/drawing/2014/main" id="{F79AB054-EB8E-4D4C-AA09-03B74E3D4428}"/>
+          <p:cNvPr id="3" name="Espace réservé du numéro de diapositive 2">
+            <a:extLst>
+              <a:ext uri="{FF2B5EF4-FFF2-40B4-BE49-F238E27FC236}">
+                <a16:creationId xmlns:a16="http://schemas.microsoft.com/office/drawing/2014/main" id="{123DDF6C-4682-4236-B11B-4BD95AFB2812}"/>
               </a:ext>
             </a:extLst>
           </p:cNvPr>
@@ -6878,7 +7968,7 @@
             <a:spLocks noGrp="1"/>
           </p:cNvSpPr>
           <p:nvPr>
-            <p:ph type="title"/>
+            <p:ph type="sldNum" idx="12"/>
           </p:nvPr>
         </p:nvSpPr>
         <p:spPr/>
@@ -6886,16 +7976,29 @@
           <a:bodyPr/>
           <a:lstStyle/>
           <a:p>
+            <a:pPr marL="0" lvl="0" indent="0" algn="l" rtl="0">
+              <a:spcBef>
+                <a:spcPts val="0"/>
+              </a:spcBef>
+              <a:spcAft>
+                <a:spcPts val="0"/>
+              </a:spcAft>
+              <a:buNone/>
+            </a:pPr>
+            <a:fld id="{00000000-1234-1234-1234-123412341234}" type="slidenum">
+              <a:rPr lang="fr-FR" smtClean="0"/>
+              <a:t>21</a:t>
+            </a:fld>
             <a:endParaRPr lang="fr-FR"/>
           </a:p>
         </p:txBody>
       </p:sp>
       <p:pic>
         <p:nvPicPr>
-          <p:cNvPr id="3" name="Image 2">
-            <a:extLst>
-              <a:ext uri="{FF2B5EF4-FFF2-40B4-BE49-F238E27FC236}">
-                <a16:creationId xmlns:a16="http://schemas.microsoft.com/office/drawing/2014/main" id="{2A5E5EC5-AFFF-4E49-B181-509C3F231EC1}"/>
+          <p:cNvPr id="5" name="Image 4">
+            <a:extLst>
+              <a:ext uri="{FF2B5EF4-FFF2-40B4-BE49-F238E27FC236}">
+                <a16:creationId xmlns:a16="http://schemas.microsoft.com/office/drawing/2014/main" id="{3A97BDEA-A5F0-4A94-B80D-8ECB0A330250}"/>
               </a:ext>
             </a:extLst>
           </p:cNvPr>
@@ -6912,8 +8015,8 @@
         </p:blipFill>
         <p:spPr>
           <a:xfrm>
-            <a:off x="3220940" y="412398"/>
-            <a:ext cx="2702119" cy="4318704"/>
+            <a:off x="434762" y="1009569"/>
+            <a:ext cx="8274475" cy="3124361"/>
           </a:xfrm>
           <a:prstGeom prst="rect">
             <a:avLst/>
@@ -6923,7 +8026,7 @@
     </p:spTree>
     <p:extLst>
       <p:ext uri="{BB962C8B-B14F-4D97-AF65-F5344CB8AC3E}">
-        <p14:creationId xmlns:p14="http://schemas.microsoft.com/office/powerpoint/2010/main" val="3786591810"/>
+        <p14:creationId xmlns:p14="http://schemas.microsoft.com/office/powerpoint/2010/main" val="1388006989"/>
       </p:ext>
     </p:extLst>
   </p:cSld>
@@ -6950,37 +8053,12 @@
           <a:chExt cx="0" cy="0"/>
         </a:xfrm>
       </p:grpSpPr>
-      <p:sp>
-        <p:nvSpPr>
-          <p:cNvPr id="2" name="Titre 1">
-            <a:extLst>
-              <a:ext uri="{FF2B5EF4-FFF2-40B4-BE49-F238E27FC236}">
-                <a16:creationId xmlns:a16="http://schemas.microsoft.com/office/drawing/2014/main" id="{CA4FAF3D-B737-45A1-B9CF-E2104C9AC7D5}"/>
-              </a:ext>
-            </a:extLst>
-          </p:cNvPr>
-          <p:cNvSpPr>
-            <a:spLocks noGrp="1"/>
-          </p:cNvSpPr>
-          <p:nvPr>
-            <p:ph type="title"/>
-          </p:nvPr>
-        </p:nvSpPr>
-        <p:spPr/>
-        <p:txBody>
-          <a:bodyPr/>
-          <a:lstStyle/>
-          <a:p>
-            <a:endParaRPr lang="fr-FR"/>
-          </a:p>
-        </p:txBody>
-      </p:sp>
       <p:pic>
         <p:nvPicPr>
-          <p:cNvPr id="3" name="Image 2">
-            <a:extLst>
-              <a:ext uri="{FF2B5EF4-FFF2-40B4-BE49-F238E27FC236}">
-                <a16:creationId xmlns:a16="http://schemas.microsoft.com/office/drawing/2014/main" id="{5E954318-E770-4122-94A0-F9ECD2EC787F}"/>
+          <p:cNvPr id="4" name="Image 3">
+            <a:extLst>
+              <a:ext uri="{FF2B5EF4-FFF2-40B4-BE49-F238E27FC236}">
+                <a16:creationId xmlns:a16="http://schemas.microsoft.com/office/drawing/2014/main" id="{070DC2FF-D2D1-4026-AADE-6A8361B4A7A7}"/>
               </a:ext>
             </a:extLst>
           </p:cNvPr>
@@ -6997,14 +8075,82 @@
         </p:blipFill>
         <p:spPr>
           <a:xfrm>
-            <a:off x="63895" y="1717792"/>
-            <a:ext cx="9016209" cy="1707916"/>
+            <a:off x="2516617" y="532738"/>
+            <a:ext cx="4110766" cy="2153632"/>
           </a:xfrm>
           <a:prstGeom prst="rect">
             <a:avLst/>
           </a:prstGeom>
         </p:spPr>
       </p:pic>
+      <p:pic>
+        <p:nvPicPr>
+          <p:cNvPr id="2" name="Image 1">
+            <a:extLst>
+              <a:ext uri="{FF2B5EF4-FFF2-40B4-BE49-F238E27FC236}">
+                <a16:creationId xmlns:a16="http://schemas.microsoft.com/office/drawing/2014/main" id="{8BA82EFC-5506-4D1A-A60E-E052311A02ED}"/>
+              </a:ext>
+            </a:extLst>
+          </p:cNvPr>
+          <p:cNvPicPr>
+            <a:picLocks noChangeAspect="1"/>
+          </p:cNvPicPr>
+          <p:nvPr/>
+        </p:nvPicPr>
+        <p:blipFill>
+          <a:blip r:embed="rId3"/>
+          <a:stretch>
+            <a:fillRect/>
+          </a:stretch>
+        </p:blipFill>
+        <p:spPr>
+          <a:xfrm>
+            <a:off x="577155" y="3563238"/>
+            <a:ext cx="7989690" cy="658241"/>
+          </a:xfrm>
+          <a:prstGeom prst="rect">
+            <a:avLst/>
+          </a:prstGeom>
+        </p:spPr>
+      </p:pic>
+      <p:sp>
+        <p:nvSpPr>
+          <p:cNvPr id="3" name="Espace réservé du numéro de diapositive 2">
+            <a:extLst>
+              <a:ext uri="{FF2B5EF4-FFF2-40B4-BE49-F238E27FC236}">
+                <a16:creationId xmlns:a16="http://schemas.microsoft.com/office/drawing/2014/main" id="{13CFBF62-6925-4315-8D0F-E9A89D948591}"/>
+              </a:ext>
+            </a:extLst>
+          </p:cNvPr>
+          <p:cNvSpPr>
+            <a:spLocks noGrp="1"/>
+          </p:cNvSpPr>
+          <p:nvPr>
+            <p:ph type="sldNum" idx="12"/>
+          </p:nvPr>
+        </p:nvSpPr>
+        <p:spPr/>
+        <p:txBody>
+          <a:bodyPr/>
+          <a:lstStyle/>
+          <a:p>
+            <a:pPr marL="0" lvl="0" indent="0" algn="l" rtl="0">
+              <a:spcBef>
+                <a:spcPts val="0"/>
+              </a:spcBef>
+              <a:spcAft>
+                <a:spcPts val="0"/>
+              </a:spcAft>
+              <a:buNone/>
+            </a:pPr>
+            <a:fld id="{00000000-1234-1234-1234-123412341234}" type="slidenum">
+              <a:rPr lang="fr-FR" smtClean="0"/>
+              <a:t>22</a:t>
+            </a:fld>
+            <a:endParaRPr lang="fr-FR"/>
+          </a:p>
+        </p:txBody>
+      </p:sp>
     </p:spTree>
     <p:extLst>
       <p:ext uri="{BB962C8B-B14F-4D97-AF65-F5344CB8AC3E}">
@@ -7051,21 +8197,66 @@
             <p:ph type="title"/>
           </p:nvPr>
         </p:nvSpPr>
-        <p:spPr/>
+        <p:spPr>
+          <a:xfrm>
+            <a:off x="11099622" y="2150850"/>
+            <a:ext cx="8520600" cy="841800"/>
+          </a:xfrm>
+        </p:spPr>
         <p:txBody>
-          <a:bodyPr/>
+          <a:bodyPr>
+            <a:normAutofit fontScale="90000"/>
+          </a:bodyPr>
           <a:lstStyle/>
           <a:p>
-            <a:endParaRPr lang="fr-FR"/>
+            <a:br>
+              <a:rPr lang="fr-FR" dirty="0"/>
+            </a:br>
+            <a:endParaRPr lang="fr-FR" dirty="0"/>
+          </a:p>
+        </p:txBody>
+      </p:sp>
+      <p:sp>
+        <p:nvSpPr>
+          <p:cNvPr id="6" name="ZoneTexte 5">
+            <a:extLst>
+              <a:ext uri="{FF2B5EF4-FFF2-40B4-BE49-F238E27FC236}">
+                <a16:creationId xmlns:a16="http://schemas.microsoft.com/office/drawing/2014/main" id="{E7F540EE-FAD2-4746-9F62-B51360B7AE91}"/>
+              </a:ext>
+            </a:extLst>
+          </p:cNvPr>
+          <p:cNvSpPr txBox="1"/>
+          <p:nvPr/>
+        </p:nvSpPr>
+        <p:spPr>
+          <a:xfrm>
+            <a:off x="4010343" y="2722401"/>
+            <a:ext cx="45719" cy="430887"/>
+          </a:xfrm>
+          <a:prstGeom prst="rect">
+            <a:avLst/>
+          </a:prstGeom>
+          <a:noFill/>
+        </p:spPr>
+        <p:txBody>
+          <a:bodyPr wrap="square" lIns="0" tIns="0" rIns="0" bIns="0" rtlCol="0">
+            <a:spAutoFit/>
+          </a:bodyPr>
+          <a:lstStyle/>
+          <a:p>
+            <a:endParaRPr lang="fr-FR" dirty="0"/>
+          </a:p>
+          <a:p>
+            <a:endParaRPr lang="fr-FR" dirty="0"/>
           </a:p>
         </p:txBody>
       </p:sp>
       <p:pic>
         <p:nvPicPr>
-          <p:cNvPr id="3" name="Image 2">
-            <a:extLst>
-              <a:ext uri="{FF2B5EF4-FFF2-40B4-BE49-F238E27FC236}">
-                <a16:creationId xmlns:a16="http://schemas.microsoft.com/office/drawing/2014/main" id="{E408A448-513A-4F1E-BF86-717AC287854B}"/>
+          <p:cNvPr id="5" name="Image 4">
+            <a:extLst>
+              <a:ext uri="{FF2B5EF4-FFF2-40B4-BE49-F238E27FC236}">
+                <a16:creationId xmlns:a16="http://schemas.microsoft.com/office/drawing/2014/main" id="{CFBB5AC8-4497-4BC9-A0C9-1381C3DC5635}"/>
               </a:ext>
             </a:extLst>
           </p:cNvPr>
@@ -7075,21 +8266,89 @@
           <p:nvPr/>
         </p:nvPicPr>
         <p:blipFill>
-          <a:blip r:embed="rId2"/>
+          <a:blip r:embed="rId3"/>
           <a:stretch>
             <a:fillRect/>
           </a:stretch>
         </p:blipFill>
         <p:spPr>
           <a:xfrm>
-            <a:off x="536254" y="2150850"/>
-            <a:ext cx="7020770" cy="605059"/>
+            <a:off x="352327" y="1495419"/>
+            <a:ext cx="8520600" cy="655431"/>
           </a:xfrm>
           <a:prstGeom prst="rect">
             <a:avLst/>
           </a:prstGeom>
         </p:spPr>
       </p:pic>
+      <p:pic>
+        <p:nvPicPr>
+          <p:cNvPr id="7" name="Image 6">
+            <a:extLst>
+              <a:ext uri="{FF2B5EF4-FFF2-40B4-BE49-F238E27FC236}">
+                <a16:creationId xmlns:a16="http://schemas.microsoft.com/office/drawing/2014/main" id="{5921C3CE-963F-4F2C-9AF7-803DA55BBF39}"/>
+              </a:ext>
+            </a:extLst>
+          </p:cNvPr>
+          <p:cNvPicPr>
+            <a:picLocks noChangeAspect="1"/>
+          </p:cNvPicPr>
+          <p:nvPr/>
+        </p:nvPicPr>
+        <p:blipFill>
+          <a:blip r:embed="rId4"/>
+          <a:stretch>
+            <a:fillRect/>
+          </a:stretch>
+        </p:blipFill>
+        <p:spPr>
+          <a:xfrm>
+            <a:off x="352327" y="2351779"/>
+            <a:ext cx="8266940" cy="741244"/>
+          </a:xfrm>
+          <a:prstGeom prst="rect">
+            <a:avLst/>
+          </a:prstGeom>
+        </p:spPr>
+      </p:pic>
+      <p:sp>
+        <p:nvSpPr>
+          <p:cNvPr id="3" name="Espace réservé du numéro de diapositive 2">
+            <a:extLst>
+              <a:ext uri="{FF2B5EF4-FFF2-40B4-BE49-F238E27FC236}">
+                <a16:creationId xmlns:a16="http://schemas.microsoft.com/office/drawing/2014/main" id="{CB5E8E4E-2FAA-440E-B88C-73A03EAD30EB}"/>
+              </a:ext>
+            </a:extLst>
+          </p:cNvPr>
+          <p:cNvSpPr>
+            <a:spLocks noGrp="1"/>
+          </p:cNvSpPr>
+          <p:nvPr>
+            <p:ph type="sldNum" idx="12"/>
+          </p:nvPr>
+        </p:nvSpPr>
+        <p:spPr/>
+        <p:txBody>
+          <a:bodyPr/>
+          <a:lstStyle/>
+          <a:p>
+            <a:pPr marL="0" lvl="0" indent="0" algn="l" rtl="0">
+              <a:spcBef>
+                <a:spcPts val="0"/>
+              </a:spcBef>
+              <a:spcAft>
+                <a:spcPts val="0"/>
+              </a:spcAft>
+              <a:buNone/>
+            </a:pPr>
+            <a:fld id="{00000000-1234-1234-1234-123412341234}" type="slidenum">
+              <a:rPr lang="fr-FR" smtClean="0"/>
+              <a:t>23</a:t>
+            </a:fld>
+            <a:endParaRPr lang="fr-FR"/>
+          </a:p>
+        </p:txBody>
+      </p:sp>
     </p:spTree>
     <p:extLst>
       <p:ext uri="{BB962C8B-B14F-4D97-AF65-F5344CB8AC3E}">
@@ -7120,37 +8379,12 @@
           <a:chExt cx="0" cy="0"/>
         </a:xfrm>
       </p:grpSpPr>
-      <p:sp>
-        <p:nvSpPr>
-          <p:cNvPr id="2" name="Titre 1">
-            <a:extLst>
-              <a:ext uri="{FF2B5EF4-FFF2-40B4-BE49-F238E27FC236}">
-                <a16:creationId xmlns:a16="http://schemas.microsoft.com/office/drawing/2014/main" id="{C3187F01-60F8-4FBF-BB4A-7C7F31E5B0FB}"/>
-              </a:ext>
-            </a:extLst>
-          </p:cNvPr>
-          <p:cNvSpPr>
-            <a:spLocks noGrp="1"/>
-          </p:cNvSpPr>
-          <p:nvPr>
-            <p:ph type="title"/>
-          </p:nvPr>
-        </p:nvSpPr>
-        <p:spPr/>
-        <p:txBody>
-          <a:bodyPr/>
-          <a:lstStyle/>
-          <a:p>
-            <a:endParaRPr lang="fr-FR"/>
-          </a:p>
-        </p:txBody>
-      </p:sp>
       <p:pic>
         <p:nvPicPr>
-          <p:cNvPr id="3" name="Image 2">
-            <a:extLst>
-              <a:ext uri="{FF2B5EF4-FFF2-40B4-BE49-F238E27FC236}">
-                <a16:creationId xmlns:a16="http://schemas.microsoft.com/office/drawing/2014/main" id="{7AFB6375-C7ED-4A70-94D2-25E34C9C1D7D}"/>
+          <p:cNvPr id="4" name="Image 3">
+            <a:extLst>
+              <a:ext uri="{FF2B5EF4-FFF2-40B4-BE49-F238E27FC236}">
+                <a16:creationId xmlns:a16="http://schemas.microsoft.com/office/drawing/2014/main" id="{077CA924-E5BD-43B4-89D4-42D532F19A68}"/>
               </a:ext>
             </a:extLst>
           </p:cNvPr>
@@ -7167,14 +8401,112 @@
         </p:blipFill>
         <p:spPr>
           <a:xfrm>
-            <a:off x="0" y="1484244"/>
-            <a:ext cx="9210107" cy="1948943"/>
+            <a:off x="2847471" y="772667"/>
+            <a:ext cx="3449057" cy="1423154"/>
           </a:xfrm>
           <a:prstGeom prst="rect">
             <a:avLst/>
           </a:prstGeom>
         </p:spPr>
       </p:pic>
+      <p:pic>
+        <p:nvPicPr>
+          <p:cNvPr id="5" name="Image 4">
+            <a:extLst>
+              <a:ext uri="{FF2B5EF4-FFF2-40B4-BE49-F238E27FC236}">
+                <a16:creationId xmlns:a16="http://schemas.microsoft.com/office/drawing/2014/main" id="{191C881C-7744-4A19-9D70-A3A93DDDD3C0}"/>
+              </a:ext>
+            </a:extLst>
+          </p:cNvPr>
+          <p:cNvPicPr>
+            <a:picLocks noChangeAspect="1"/>
+          </p:cNvPicPr>
+          <p:nvPr/>
+        </p:nvPicPr>
+        <p:blipFill>
+          <a:blip r:embed="rId3"/>
+          <a:stretch>
+            <a:fillRect/>
+          </a:stretch>
+        </p:blipFill>
+        <p:spPr>
+          <a:xfrm>
+            <a:off x="1594646" y="2312498"/>
+            <a:ext cx="5931673" cy="518503"/>
+          </a:xfrm>
+          <a:prstGeom prst="rect">
+            <a:avLst/>
+          </a:prstGeom>
+        </p:spPr>
+      </p:pic>
+      <p:pic>
+        <p:nvPicPr>
+          <p:cNvPr id="6" name="Image 5">
+            <a:extLst>
+              <a:ext uri="{FF2B5EF4-FFF2-40B4-BE49-F238E27FC236}">
+                <a16:creationId xmlns:a16="http://schemas.microsoft.com/office/drawing/2014/main" id="{B4B3108C-B1F8-4226-9C89-254DADDBB7F4}"/>
+              </a:ext>
+            </a:extLst>
+          </p:cNvPr>
+          <p:cNvPicPr>
+            <a:picLocks noChangeAspect="1"/>
+          </p:cNvPicPr>
+          <p:nvPr/>
+        </p:nvPicPr>
+        <p:blipFill>
+          <a:blip r:embed="rId4"/>
+          <a:stretch>
+            <a:fillRect/>
+          </a:stretch>
+        </p:blipFill>
+        <p:spPr>
+          <a:xfrm>
+            <a:off x="3057920" y="3192644"/>
+            <a:ext cx="3005127" cy="1178189"/>
+          </a:xfrm>
+          <a:prstGeom prst="rect">
+            <a:avLst/>
+          </a:prstGeom>
+        </p:spPr>
+      </p:pic>
+      <p:sp>
+        <p:nvSpPr>
+          <p:cNvPr id="2" name="Espace réservé du numéro de diapositive 1">
+            <a:extLst>
+              <a:ext uri="{FF2B5EF4-FFF2-40B4-BE49-F238E27FC236}">
+                <a16:creationId xmlns:a16="http://schemas.microsoft.com/office/drawing/2014/main" id="{1DF5B962-F50F-47BD-A9FC-21605EFE01E0}"/>
+              </a:ext>
+            </a:extLst>
+          </p:cNvPr>
+          <p:cNvSpPr>
+            <a:spLocks noGrp="1"/>
+          </p:cNvSpPr>
+          <p:nvPr>
+            <p:ph type="sldNum" idx="12"/>
+          </p:nvPr>
+        </p:nvSpPr>
+        <p:spPr/>
+        <p:txBody>
+          <a:bodyPr/>
+          <a:lstStyle/>
+          <a:p>
+            <a:pPr marL="0" lvl="0" indent="0" algn="l" rtl="0">
+              <a:spcBef>
+                <a:spcPts val="0"/>
+              </a:spcBef>
+              <a:spcAft>
+                <a:spcPts val="0"/>
+              </a:spcAft>
+              <a:buNone/>
+            </a:pPr>
+            <a:fld id="{00000000-1234-1234-1234-123412341234}" type="slidenum">
+              <a:rPr lang="fr-FR" smtClean="0"/>
+              <a:t>24</a:t>
+            </a:fld>
+            <a:endParaRPr lang="fr-FR"/>
+          </a:p>
+        </p:txBody>
+      </p:sp>
     </p:spTree>
     <p:extLst>
       <p:ext uri="{BB962C8B-B14F-4D97-AF65-F5344CB8AC3E}">
@@ -7260,6 +8592,44 @@
           </a:prstGeom>
         </p:spPr>
       </p:pic>
+      <p:sp>
+        <p:nvSpPr>
+          <p:cNvPr id="4" name="Espace réservé du numéro de diapositive 3">
+            <a:extLst>
+              <a:ext uri="{FF2B5EF4-FFF2-40B4-BE49-F238E27FC236}">
+                <a16:creationId xmlns:a16="http://schemas.microsoft.com/office/drawing/2014/main" id="{CD8D609B-6F72-4C87-B75F-E92F761FA4C1}"/>
+              </a:ext>
+            </a:extLst>
+          </p:cNvPr>
+          <p:cNvSpPr>
+            <a:spLocks noGrp="1"/>
+          </p:cNvSpPr>
+          <p:nvPr>
+            <p:ph type="sldNum" idx="12"/>
+          </p:nvPr>
+        </p:nvSpPr>
+        <p:spPr/>
+        <p:txBody>
+          <a:bodyPr/>
+          <a:lstStyle/>
+          <a:p>
+            <a:pPr marL="0" lvl="0" indent="0" algn="l" rtl="0">
+              <a:spcBef>
+                <a:spcPts val="0"/>
+              </a:spcBef>
+              <a:spcAft>
+                <a:spcPts val="0"/>
+              </a:spcAft>
+              <a:buNone/>
+            </a:pPr>
+            <a:fld id="{00000000-1234-1234-1234-123412341234}" type="slidenum">
+              <a:rPr lang="fr-FR" smtClean="0"/>
+              <a:t>25</a:t>
+            </a:fld>
+            <a:endParaRPr lang="fr-FR"/>
+          </a:p>
+        </p:txBody>
+      </p:sp>
     </p:spTree>
     <p:extLst>
       <p:ext uri="{BB962C8B-B14F-4D97-AF65-F5344CB8AC3E}">
@@ -7290,31 +8660,6 @@
           <a:chExt cx="0" cy="0"/>
         </a:xfrm>
       </p:grpSpPr>
-      <p:sp>
-        <p:nvSpPr>
-          <p:cNvPr id="2" name="Titre 1">
-            <a:extLst>
-              <a:ext uri="{FF2B5EF4-FFF2-40B4-BE49-F238E27FC236}">
-                <a16:creationId xmlns:a16="http://schemas.microsoft.com/office/drawing/2014/main" id="{C88ABA16-1D9E-4B2C-BCB6-1ED3BC0FCE9A}"/>
-              </a:ext>
-            </a:extLst>
-          </p:cNvPr>
-          <p:cNvSpPr>
-            <a:spLocks noGrp="1"/>
-          </p:cNvSpPr>
-          <p:nvPr>
-            <p:ph type="title"/>
-          </p:nvPr>
-        </p:nvSpPr>
-        <p:spPr/>
-        <p:txBody>
-          <a:bodyPr/>
-          <a:lstStyle/>
-          <a:p>
-            <a:endParaRPr lang="fr-FR"/>
-          </a:p>
-        </p:txBody>
-      </p:sp>
       <p:pic>
         <p:nvPicPr>
           <p:cNvPr id="3" name="Image 2">
@@ -7337,7 +8682,7 @@
         </p:blipFill>
         <p:spPr>
           <a:xfrm>
-            <a:off x="1742363" y="177717"/>
+            <a:off x="1742363" y="74350"/>
             <a:ext cx="4632548" cy="2394033"/>
           </a:xfrm>
           <a:prstGeom prst="rect">
@@ -7367,14 +8712,52 @@
         </p:blipFill>
         <p:spPr>
           <a:xfrm>
-            <a:off x="835952" y="2696637"/>
-            <a:ext cx="6915505" cy="1632034"/>
+            <a:off x="-11167" y="2838616"/>
+            <a:ext cx="9013559" cy="2127167"/>
           </a:xfrm>
           <a:prstGeom prst="rect">
             <a:avLst/>
           </a:prstGeom>
         </p:spPr>
       </p:pic>
+      <p:sp>
+        <p:nvSpPr>
+          <p:cNvPr id="2" name="Espace réservé du numéro de diapositive 1">
+            <a:extLst>
+              <a:ext uri="{FF2B5EF4-FFF2-40B4-BE49-F238E27FC236}">
+                <a16:creationId xmlns:a16="http://schemas.microsoft.com/office/drawing/2014/main" id="{572E95DE-7AFA-4949-943A-218B06C67288}"/>
+              </a:ext>
+            </a:extLst>
+          </p:cNvPr>
+          <p:cNvSpPr>
+            <a:spLocks noGrp="1"/>
+          </p:cNvSpPr>
+          <p:nvPr>
+            <p:ph type="sldNum" idx="12"/>
+          </p:nvPr>
+        </p:nvSpPr>
+        <p:spPr/>
+        <p:txBody>
+          <a:bodyPr/>
+          <a:lstStyle/>
+          <a:p>
+            <a:pPr marL="0" lvl="0" indent="0" algn="l" rtl="0">
+              <a:spcBef>
+                <a:spcPts val="0"/>
+              </a:spcBef>
+              <a:spcAft>
+                <a:spcPts val="0"/>
+              </a:spcAft>
+              <a:buNone/>
+            </a:pPr>
+            <a:fld id="{00000000-1234-1234-1234-123412341234}" type="slidenum">
+              <a:rPr lang="fr-FR" smtClean="0"/>
+              <a:t>26</a:t>
+            </a:fld>
+            <a:endParaRPr lang="fr-FR"/>
+          </a:p>
+        </p:txBody>
+      </p:sp>
     </p:spTree>
     <p:extLst>
       <p:ext uri="{BB962C8B-B14F-4D97-AF65-F5344CB8AC3E}">
@@ -7452,7 +8835,7 @@
         </p:blipFill>
         <p:spPr>
           <a:xfrm>
-            <a:off x="163849" y="132235"/>
+            <a:off x="190679" y="1374733"/>
             <a:ext cx="4632548" cy="2394033"/>
           </a:xfrm>
           <a:prstGeom prst="rect">
@@ -7462,10 +8845,10 @@
       </p:pic>
       <p:pic>
         <p:nvPicPr>
-          <p:cNvPr id="4" name="Image 3">
-            <a:extLst>
-              <a:ext uri="{FF2B5EF4-FFF2-40B4-BE49-F238E27FC236}">
-                <a16:creationId xmlns:a16="http://schemas.microsoft.com/office/drawing/2014/main" id="{5A33D588-C8B6-4317-8425-DF5B87B3DD74}"/>
+          <p:cNvPr id="5" name="Image 4">
+            <a:extLst>
+              <a:ext uri="{FF2B5EF4-FFF2-40B4-BE49-F238E27FC236}">
+                <a16:creationId xmlns:a16="http://schemas.microsoft.com/office/drawing/2014/main" id="{3EAB6A59-BF4B-4697-84CA-F2C4AE2E9CAF}"/>
               </a:ext>
             </a:extLst>
           </p:cNvPr>
@@ -7482,44 +8865,52 @@
         </p:blipFill>
         <p:spPr>
           <a:xfrm>
-            <a:off x="140369" y="2762897"/>
-            <a:ext cx="6915505" cy="1632034"/>
+            <a:off x="5367130" y="383945"/>
+            <a:ext cx="2921267" cy="4620912"/>
           </a:xfrm>
           <a:prstGeom prst="rect">
             <a:avLst/>
           </a:prstGeom>
         </p:spPr>
       </p:pic>
-      <p:pic>
-        <p:nvPicPr>
-          <p:cNvPr id="5" name="Image 4">
-            <a:extLst>
-              <a:ext uri="{FF2B5EF4-FFF2-40B4-BE49-F238E27FC236}">
-                <a16:creationId xmlns:a16="http://schemas.microsoft.com/office/drawing/2014/main" id="{3EAB6A59-BF4B-4697-84CA-F2C4AE2E9CAF}"/>
-              </a:ext>
-            </a:extLst>
-          </p:cNvPr>
-          <p:cNvPicPr>
-            <a:picLocks noChangeAspect="1"/>
-          </p:cNvPicPr>
-          <p:nvPr/>
-        </p:nvPicPr>
-        <p:blipFill>
-          <a:blip r:embed="rId4"/>
-          <a:stretch>
-            <a:fillRect/>
-          </a:stretch>
-        </p:blipFill>
-        <p:spPr>
-          <a:xfrm>
-            <a:off x="6978217" y="799439"/>
-            <a:ext cx="2095608" cy="3314870"/>
-          </a:xfrm>
-          <a:prstGeom prst="rect">
-            <a:avLst/>
-          </a:prstGeom>
-        </p:spPr>
-      </p:pic>
+      <p:sp>
+        <p:nvSpPr>
+          <p:cNvPr id="4" name="Espace réservé du numéro de diapositive 3">
+            <a:extLst>
+              <a:ext uri="{FF2B5EF4-FFF2-40B4-BE49-F238E27FC236}">
+                <a16:creationId xmlns:a16="http://schemas.microsoft.com/office/drawing/2014/main" id="{DCD88B21-2B83-4169-BF16-2930DB0D8554}"/>
+              </a:ext>
+            </a:extLst>
+          </p:cNvPr>
+          <p:cNvSpPr>
+            <a:spLocks noGrp="1"/>
+          </p:cNvSpPr>
+          <p:nvPr>
+            <p:ph type="sldNum" idx="12"/>
+          </p:nvPr>
+        </p:nvSpPr>
+        <p:spPr/>
+        <p:txBody>
+          <a:bodyPr/>
+          <a:lstStyle/>
+          <a:p>
+            <a:pPr marL="0" lvl="0" indent="0" algn="l" rtl="0">
+              <a:spcBef>
+                <a:spcPts val="0"/>
+              </a:spcBef>
+              <a:spcAft>
+                <a:spcPts val="0"/>
+              </a:spcAft>
+              <a:buNone/>
+            </a:pPr>
+            <a:fld id="{00000000-1234-1234-1234-123412341234}" type="slidenum">
+              <a:rPr lang="fr-FR" smtClean="0"/>
+              <a:t>27</a:t>
+            </a:fld>
+            <a:endParaRPr lang="fr-FR"/>
+          </a:p>
+        </p:txBody>
+      </p:sp>
     </p:spTree>
     <p:extLst>
       <p:ext uri="{BB962C8B-B14F-4D97-AF65-F5344CB8AC3E}">
@@ -7597,14 +8988,52 @@
         </p:blipFill>
         <p:spPr>
           <a:xfrm>
-            <a:off x="2736755" y="1965294"/>
-            <a:ext cx="3670489" cy="1212912"/>
+            <a:off x="1086780" y="1785138"/>
+            <a:ext cx="7308292" cy="2415023"/>
           </a:xfrm>
           <a:prstGeom prst="rect">
             <a:avLst/>
           </a:prstGeom>
         </p:spPr>
       </p:pic>
+      <p:sp>
+        <p:nvSpPr>
+          <p:cNvPr id="4" name="Espace réservé du numéro de diapositive 3">
+            <a:extLst>
+              <a:ext uri="{FF2B5EF4-FFF2-40B4-BE49-F238E27FC236}">
+                <a16:creationId xmlns:a16="http://schemas.microsoft.com/office/drawing/2014/main" id="{D0165BA8-EFAD-439C-86A8-974AFFC593D8}"/>
+              </a:ext>
+            </a:extLst>
+          </p:cNvPr>
+          <p:cNvSpPr>
+            <a:spLocks noGrp="1"/>
+          </p:cNvSpPr>
+          <p:nvPr>
+            <p:ph type="sldNum" idx="12"/>
+          </p:nvPr>
+        </p:nvSpPr>
+        <p:spPr/>
+        <p:txBody>
+          <a:bodyPr/>
+          <a:lstStyle/>
+          <a:p>
+            <a:pPr marL="0" lvl="0" indent="0" algn="l" rtl="0">
+              <a:spcBef>
+                <a:spcPts val="0"/>
+              </a:spcBef>
+              <a:spcAft>
+                <a:spcPts val="0"/>
+              </a:spcAft>
+              <a:buNone/>
+            </a:pPr>
+            <a:fld id="{00000000-1234-1234-1234-123412341234}" type="slidenum">
+              <a:rPr lang="fr-FR" smtClean="0"/>
+              <a:t>28</a:t>
+            </a:fld>
+            <a:endParaRPr lang="fr-FR"/>
+          </a:p>
+        </p:txBody>
+      </p:sp>
     </p:spTree>
     <p:extLst>
       <p:ext uri="{BB962C8B-B14F-4D97-AF65-F5344CB8AC3E}">
@@ -7682,8 +9111,8 @@
         </p:blipFill>
         <p:spPr>
           <a:xfrm>
-            <a:off x="2339187" y="933217"/>
-            <a:ext cx="3670489" cy="1212912"/>
+            <a:off x="1425058" y="465897"/>
+            <a:ext cx="5098970" cy="1684953"/>
           </a:xfrm>
           <a:prstGeom prst="rect">
             <a:avLst/>
@@ -7712,14 +9141,52 @@
         </p:blipFill>
         <p:spPr>
           <a:xfrm>
-            <a:off x="2742434" y="2847627"/>
-            <a:ext cx="2863997" cy="1574881"/>
+            <a:off x="1825819" y="2385392"/>
+            <a:ext cx="4297448" cy="2363120"/>
           </a:xfrm>
           <a:prstGeom prst="rect">
             <a:avLst/>
           </a:prstGeom>
         </p:spPr>
       </p:pic>
+      <p:sp>
+        <p:nvSpPr>
+          <p:cNvPr id="5" name="Espace réservé du numéro de diapositive 4">
+            <a:extLst>
+              <a:ext uri="{FF2B5EF4-FFF2-40B4-BE49-F238E27FC236}">
+                <a16:creationId xmlns:a16="http://schemas.microsoft.com/office/drawing/2014/main" id="{6B33E85C-FE31-4162-BBE9-D08487DBA69B}"/>
+              </a:ext>
+            </a:extLst>
+          </p:cNvPr>
+          <p:cNvSpPr>
+            <a:spLocks noGrp="1"/>
+          </p:cNvSpPr>
+          <p:nvPr>
+            <p:ph type="sldNum" idx="12"/>
+          </p:nvPr>
+        </p:nvSpPr>
+        <p:spPr/>
+        <p:txBody>
+          <a:bodyPr/>
+          <a:lstStyle/>
+          <a:p>
+            <a:pPr marL="0" lvl="0" indent="0" algn="l" rtl="0">
+              <a:spcBef>
+                <a:spcPts val="0"/>
+              </a:spcBef>
+              <a:spcAft>
+                <a:spcPts val="0"/>
+              </a:spcAft>
+              <a:buNone/>
+            </a:pPr>
+            <a:fld id="{00000000-1234-1234-1234-123412341234}" type="slidenum">
+              <a:rPr lang="fr-FR" smtClean="0"/>
+              <a:t>29</a:t>
+            </a:fld>
+            <a:endParaRPr lang="fr-FR"/>
+          </a:p>
+        </p:txBody>
+      </p:sp>
     </p:spTree>
     <p:extLst>
       <p:ext uri="{BB962C8B-B14F-4D97-AF65-F5344CB8AC3E}">
@@ -7755,7 +9222,7 @@
           <p:cNvPr id="2" name="Titre 1">
             <a:extLst>
               <a:ext uri="{FF2B5EF4-FFF2-40B4-BE49-F238E27FC236}">
-                <a16:creationId xmlns:a16="http://schemas.microsoft.com/office/drawing/2014/main" id="{3962AE6F-273B-4204-BE5C-BB599D848C63}"/>
+                <a16:creationId xmlns:a16="http://schemas.microsoft.com/office/drawing/2014/main" id="{C13C6C82-6134-4E47-BBB0-800B152E94CA}"/>
               </a:ext>
             </a:extLst>
           </p:cNvPr>
@@ -7766,21 +9233,403 @@
             <p:ph type="title"/>
           </p:nvPr>
         </p:nvSpPr>
+        <p:spPr>
+          <a:xfrm>
+            <a:off x="-1967043" y="1113078"/>
+            <a:ext cx="8520600" cy="841800"/>
+          </a:xfrm>
+        </p:spPr>
+        <p:txBody>
+          <a:bodyPr/>
+          <a:lstStyle/>
+          <a:p>
+            <a:r>
+              <a:rPr lang="fr-FR" dirty="0"/>
+              <a:t>Les portes logiques </a:t>
+            </a:r>
+            <a:br>
+              <a:rPr lang="fr-FR" dirty="0"/>
+            </a:br>
+            <a:r>
+              <a:rPr lang="fr-FR" dirty="0"/>
+              <a:t>non-réversibles</a:t>
+            </a:r>
+          </a:p>
+        </p:txBody>
+      </p:sp>
+      <p:sp>
+        <p:nvSpPr>
+          <p:cNvPr id="3" name="Espace réservé du numéro de diapositive 2">
+            <a:extLst>
+              <a:ext uri="{FF2B5EF4-FFF2-40B4-BE49-F238E27FC236}">
+                <a16:creationId xmlns:a16="http://schemas.microsoft.com/office/drawing/2014/main" id="{D21F7EE3-1447-4ABB-A53A-6A3F617087AB}"/>
+              </a:ext>
+            </a:extLst>
+          </p:cNvPr>
+          <p:cNvSpPr>
+            <a:spLocks noGrp="1"/>
+          </p:cNvSpPr>
+          <p:nvPr>
+            <p:ph type="sldNum" idx="12"/>
+          </p:nvPr>
+        </p:nvSpPr>
         <p:spPr/>
         <p:txBody>
           <a:bodyPr/>
           <a:lstStyle/>
           <a:p>
+            <a:pPr marL="0" lvl="0" indent="0" algn="l" rtl="0">
+              <a:spcBef>
+                <a:spcPts val="0"/>
+              </a:spcBef>
+              <a:spcAft>
+                <a:spcPts val="0"/>
+              </a:spcAft>
+              <a:buNone/>
+            </a:pPr>
+            <a:fld id="{00000000-1234-1234-1234-123412341234}" type="slidenum">
+              <a:rPr lang="fr-FR" smtClean="0"/>
+              <a:t>3</a:t>
+            </a:fld>
             <a:endParaRPr lang="fr-FR"/>
           </a:p>
         </p:txBody>
       </p:sp>
+      <p:sp>
+        <p:nvSpPr>
+          <p:cNvPr id="4" name="Titre 1">
+            <a:extLst>
+              <a:ext uri="{FF2B5EF4-FFF2-40B4-BE49-F238E27FC236}">
+                <a16:creationId xmlns:a16="http://schemas.microsoft.com/office/drawing/2014/main" id="{54184718-703A-4DD7-84F8-5A25DCE5E958}"/>
+              </a:ext>
+            </a:extLst>
+          </p:cNvPr>
+          <p:cNvSpPr txBox="1">
+            <a:spLocks/>
+          </p:cNvSpPr>
+          <p:nvPr/>
+        </p:nvSpPr>
+        <p:spPr>
+          <a:xfrm>
+            <a:off x="2750099" y="1113078"/>
+            <a:ext cx="8520600" cy="841800"/>
+          </a:xfrm>
+          <a:prstGeom prst="rect">
+            <a:avLst/>
+          </a:prstGeom>
+          <a:noFill/>
+          <a:ln>
+            <a:noFill/>
+          </a:ln>
+        </p:spPr>
+        <p:txBody>
+          <a:bodyPr spcFirstLastPara="1" wrap="square" lIns="91425" tIns="91425" rIns="91425" bIns="91425" anchor="ctr" anchorCtr="0">
+            <a:noAutofit/>
+          </a:bodyPr>
+          <a:lstStyle>
+            <a:defPPr marR="0" lvl="0" algn="l" rtl="0">
+              <a:lnSpc>
+                <a:spcPct val="100000"/>
+              </a:lnSpc>
+              <a:spcBef>
+                <a:spcPts val="0"/>
+              </a:spcBef>
+              <a:spcAft>
+                <a:spcPts val="0"/>
+              </a:spcAft>
+            </a:defPPr>
+            <a:lvl1pPr marR="0" lvl="0" algn="ctr" rtl="0">
+              <a:lnSpc>
+                <a:spcPct val="100000"/>
+              </a:lnSpc>
+              <a:spcBef>
+                <a:spcPts val="0"/>
+              </a:spcBef>
+              <a:spcAft>
+                <a:spcPts val="0"/>
+              </a:spcAft>
+              <a:buClr>
+                <a:schemeClr val="dk1"/>
+              </a:buClr>
+              <a:buSzPts val="3600"/>
+              <a:buFont typeface="Fira Sans Extra Condensed Medium"/>
+              <a:buNone/>
+              <a:defRPr sz="3600" b="0" i="0" u="none" strike="noStrike" cap="none">
+                <a:solidFill>
+                  <a:schemeClr val="dk1"/>
+                </a:solidFill>
+                <a:latin typeface="Fira Sans Extra Condensed Medium"/>
+                <a:ea typeface="Fira Sans Extra Condensed Medium"/>
+                <a:cs typeface="Fira Sans Extra Condensed Medium"/>
+                <a:sym typeface="Fira Sans Extra Condensed Medium"/>
+              </a:defRPr>
+            </a:lvl1pPr>
+            <a:lvl2pPr marR="0" lvl="1" algn="ctr" rtl="0">
+              <a:lnSpc>
+                <a:spcPct val="100000"/>
+              </a:lnSpc>
+              <a:spcBef>
+                <a:spcPts val="0"/>
+              </a:spcBef>
+              <a:spcAft>
+                <a:spcPts val="0"/>
+              </a:spcAft>
+              <a:buClr>
+                <a:schemeClr val="dk1"/>
+              </a:buClr>
+              <a:buSzPts val="3600"/>
+              <a:buFont typeface="Fira Sans Extra Condensed Medium"/>
+              <a:buNone/>
+              <a:defRPr sz="3600" b="0" i="0" u="none" strike="noStrike" cap="none">
+                <a:solidFill>
+                  <a:schemeClr val="dk1"/>
+                </a:solidFill>
+                <a:latin typeface="Fira Sans Extra Condensed Medium"/>
+                <a:ea typeface="Fira Sans Extra Condensed Medium"/>
+                <a:cs typeface="Fira Sans Extra Condensed Medium"/>
+                <a:sym typeface="Fira Sans Extra Condensed Medium"/>
+              </a:defRPr>
+            </a:lvl2pPr>
+            <a:lvl3pPr marR="0" lvl="2" algn="ctr" rtl="0">
+              <a:lnSpc>
+                <a:spcPct val="100000"/>
+              </a:lnSpc>
+              <a:spcBef>
+                <a:spcPts val="0"/>
+              </a:spcBef>
+              <a:spcAft>
+                <a:spcPts val="0"/>
+              </a:spcAft>
+              <a:buClr>
+                <a:schemeClr val="dk1"/>
+              </a:buClr>
+              <a:buSzPts val="3600"/>
+              <a:buFont typeface="Fira Sans Extra Condensed Medium"/>
+              <a:buNone/>
+              <a:defRPr sz="3600" b="0" i="0" u="none" strike="noStrike" cap="none">
+                <a:solidFill>
+                  <a:schemeClr val="dk1"/>
+                </a:solidFill>
+                <a:latin typeface="Fira Sans Extra Condensed Medium"/>
+                <a:ea typeface="Fira Sans Extra Condensed Medium"/>
+                <a:cs typeface="Fira Sans Extra Condensed Medium"/>
+                <a:sym typeface="Fira Sans Extra Condensed Medium"/>
+              </a:defRPr>
+            </a:lvl3pPr>
+            <a:lvl4pPr marR="0" lvl="3" algn="ctr" rtl="0">
+              <a:lnSpc>
+                <a:spcPct val="100000"/>
+              </a:lnSpc>
+              <a:spcBef>
+                <a:spcPts val="0"/>
+              </a:spcBef>
+              <a:spcAft>
+                <a:spcPts val="0"/>
+              </a:spcAft>
+              <a:buClr>
+                <a:schemeClr val="dk1"/>
+              </a:buClr>
+              <a:buSzPts val="3600"/>
+              <a:buFont typeface="Fira Sans Extra Condensed Medium"/>
+              <a:buNone/>
+              <a:defRPr sz="3600" b="0" i="0" u="none" strike="noStrike" cap="none">
+                <a:solidFill>
+                  <a:schemeClr val="dk1"/>
+                </a:solidFill>
+                <a:latin typeface="Fira Sans Extra Condensed Medium"/>
+                <a:ea typeface="Fira Sans Extra Condensed Medium"/>
+                <a:cs typeface="Fira Sans Extra Condensed Medium"/>
+                <a:sym typeface="Fira Sans Extra Condensed Medium"/>
+              </a:defRPr>
+            </a:lvl4pPr>
+            <a:lvl5pPr marR="0" lvl="4" algn="ctr" rtl="0">
+              <a:lnSpc>
+                <a:spcPct val="100000"/>
+              </a:lnSpc>
+              <a:spcBef>
+                <a:spcPts val="0"/>
+              </a:spcBef>
+              <a:spcAft>
+                <a:spcPts val="0"/>
+              </a:spcAft>
+              <a:buClr>
+                <a:schemeClr val="dk1"/>
+              </a:buClr>
+              <a:buSzPts val="3600"/>
+              <a:buFont typeface="Fira Sans Extra Condensed Medium"/>
+              <a:buNone/>
+              <a:defRPr sz="3600" b="0" i="0" u="none" strike="noStrike" cap="none">
+                <a:solidFill>
+                  <a:schemeClr val="dk1"/>
+                </a:solidFill>
+                <a:latin typeface="Fira Sans Extra Condensed Medium"/>
+                <a:ea typeface="Fira Sans Extra Condensed Medium"/>
+                <a:cs typeface="Fira Sans Extra Condensed Medium"/>
+                <a:sym typeface="Fira Sans Extra Condensed Medium"/>
+              </a:defRPr>
+            </a:lvl5pPr>
+            <a:lvl6pPr marR="0" lvl="5" algn="ctr" rtl="0">
+              <a:lnSpc>
+                <a:spcPct val="100000"/>
+              </a:lnSpc>
+              <a:spcBef>
+                <a:spcPts val="0"/>
+              </a:spcBef>
+              <a:spcAft>
+                <a:spcPts val="0"/>
+              </a:spcAft>
+              <a:buClr>
+                <a:schemeClr val="dk1"/>
+              </a:buClr>
+              <a:buSzPts val="3600"/>
+              <a:buFont typeface="Fira Sans Extra Condensed Medium"/>
+              <a:buNone/>
+              <a:defRPr sz="3600" b="0" i="0" u="none" strike="noStrike" cap="none">
+                <a:solidFill>
+                  <a:schemeClr val="dk1"/>
+                </a:solidFill>
+                <a:latin typeface="Fira Sans Extra Condensed Medium"/>
+                <a:ea typeface="Fira Sans Extra Condensed Medium"/>
+                <a:cs typeface="Fira Sans Extra Condensed Medium"/>
+                <a:sym typeface="Fira Sans Extra Condensed Medium"/>
+              </a:defRPr>
+            </a:lvl6pPr>
+            <a:lvl7pPr marR="0" lvl="6" algn="ctr" rtl="0">
+              <a:lnSpc>
+                <a:spcPct val="100000"/>
+              </a:lnSpc>
+              <a:spcBef>
+                <a:spcPts val="0"/>
+              </a:spcBef>
+              <a:spcAft>
+                <a:spcPts val="0"/>
+              </a:spcAft>
+              <a:buClr>
+                <a:schemeClr val="dk1"/>
+              </a:buClr>
+              <a:buSzPts val="3600"/>
+              <a:buFont typeface="Fira Sans Extra Condensed Medium"/>
+              <a:buNone/>
+              <a:defRPr sz="3600" b="0" i="0" u="none" strike="noStrike" cap="none">
+                <a:solidFill>
+                  <a:schemeClr val="dk1"/>
+                </a:solidFill>
+                <a:latin typeface="Fira Sans Extra Condensed Medium"/>
+                <a:ea typeface="Fira Sans Extra Condensed Medium"/>
+                <a:cs typeface="Fira Sans Extra Condensed Medium"/>
+                <a:sym typeface="Fira Sans Extra Condensed Medium"/>
+              </a:defRPr>
+            </a:lvl7pPr>
+            <a:lvl8pPr marR="0" lvl="7" algn="ctr" rtl="0">
+              <a:lnSpc>
+                <a:spcPct val="100000"/>
+              </a:lnSpc>
+              <a:spcBef>
+                <a:spcPts val="0"/>
+              </a:spcBef>
+              <a:spcAft>
+                <a:spcPts val="0"/>
+              </a:spcAft>
+              <a:buClr>
+                <a:schemeClr val="dk1"/>
+              </a:buClr>
+              <a:buSzPts val="3600"/>
+              <a:buFont typeface="Fira Sans Extra Condensed Medium"/>
+              <a:buNone/>
+              <a:defRPr sz="3600" b="0" i="0" u="none" strike="noStrike" cap="none">
+                <a:solidFill>
+                  <a:schemeClr val="dk1"/>
+                </a:solidFill>
+                <a:latin typeface="Fira Sans Extra Condensed Medium"/>
+                <a:ea typeface="Fira Sans Extra Condensed Medium"/>
+                <a:cs typeface="Fira Sans Extra Condensed Medium"/>
+                <a:sym typeface="Fira Sans Extra Condensed Medium"/>
+              </a:defRPr>
+            </a:lvl8pPr>
+            <a:lvl9pPr marR="0" lvl="8" algn="ctr" rtl="0">
+              <a:lnSpc>
+                <a:spcPct val="100000"/>
+              </a:lnSpc>
+              <a:spcBef>
+                <a:spcPts val="0"/>
+              </a:spcBef>
+              <a:spcAft>
+                <a:spcPts val="0"/>
+              </a:spcAft>
+              <a:buClr>
+                <a:schemeClr val="dk1"/>
+              </a:buClr>
+              <a:buSzPts val="3600"/>
+              <a:buFont typeface="Fira Sans Extra Condensed Medium"/>
+              <a:buNone/>
+              <a:defRPr sz="3600" b="0" i="0" u="none" strike="noStrike" cap="none">
+                <a:solidFill>
+                  <a:schemeClr val="dk1"/>
+                </a:solidFill>
+                <a:latin typeface="Fira Sans Extra Condensed Medium"/>
+                <a:ea typeface="Fira Sans Extra Condensed Medium"/>
+                <a:cs typeface="Fira Sans Extra Condensed Medium"/>
+                <a:sym typeface="Fira Sans Extra Condensed Medium"/>
+              </a:defRPr>
+            </a:lvl9pPr>
+          </a:lstStyle>
+          <a:p>
+            <a:r>
+              <a:rPr lang="fr-FR" dirty="0"/>
+              <a:t>Les portes logiques </a:t>
+            </a:r>
+            <a:br>
+              <a:rPr lang="fr-FR" dirty="0"/>
+            </a:br>
+            <a:r>
+              <a:rPr lang="fr-FR" dirty="0"/>
+              <a:t>réversibles</a:t>
+            </a:r>
+          </a:p>
+        </p:txBody>
+      </p:sp>
+      <p:cxnSp>
+        <p:nvCxnSpPr>
+          <p:cNvPr id="6" name="Connecteur droit 5">
+            <a:extLst>
+              <a:ext uri="{FF2B5EF4-FFF2-40B4-BE49-F238E27FC236}">
+                <a16:creationId xmlns:a16="http://schemas.microsoft.com/office/drawing/2014/main" id="{511225F2-703F-4672-B27E-D7307055F02E}"/>
+              </a:ext>
+            </a:extLst>
+          </p:cNvPr>
+          <p:cNvCxnSpPr/>
+          <p:nvPr/>
+        </p:nvCxnSpPr>
+        <p:spPr>
+          <a:xfrm>
+            <a:off x="4669436" y="2286000"/>
+            <a:ext cx="0" cy="2574017"/>
+          </a:xfrm>
+          <a:prstGeom prst="line">
+            <a:avLst/>
+          </a:prstGeom>
+        </p:spPr>
+        <p:style>
+          <a:lnRef idx="1">
+            <a:schemeClr val="dk1"/>
+          </a:lnRef>
+          <a:fillRef idx="0">
+            <a:schemeClr val="dk1"/>
+          </a:fillRef>
+          <a:effectRef idx="0">
+            <a:schemeClr val="dk1"/>
+          </a:effectRef>
+          <a:fontRef idx="minor">
+            <a:schemeClr val="tx1"/>
+          </a:fontRef>
+        </p:style>
+      </p:cxnSp>
       <p:pic>
         <p:nvPicPr>
-          <p:cNvPr id="3" name="Image 2">
-            <a:extLst>
-              <a:ext uri="{FF2B5EF4-FFF2-40B4-BE49-F238E27FC236}">
-                <a16:creationId xmlns:a16="http://schemas.microsoft.com/office/drawing/2014/main" id="{FF7BB22D-E6BA-4A3B-B5C3-034AD97DD17E}"/>
+          <p:cNvPr id="8" name="Image 7">
+            <a:extLst>
+              <a:ext uri="{FF2B5EF4-FFF2-40B4-BE49-F238E27FC236}">
+                <a16:creationId xmlns:a16="http://schemas.microsoft.com/office/drawing/2014/main" id="{A5E5C36C-F23A-41C5-85C5-2EEE9A13ADA3}"/>
               </a:ext>
             </a:extLst>
           </p:cNvPr>
@@ -7797,18 +9646,186 @@
         </p:blipFill>
         <p:spPr>
           <a:xfrm>
-            <a:off x="0" y="833976"/>
-            <a:ext cx="9144000" cy="3475548"/>
+            <a:off x="1558977" y="2707832"/>
+            <a:ext cx="1828800" cy="657225"/>
           </a:xfrm>
           <a:prstGeom prst="rect">
             <a:avLst/>
           </a:prstGeom>
         </p:spPr>
       </p:pic>
+      <p:pic>
+        <p:nvPicPr>
+          <p:cNvPr id="10" name="Image 9" descr="Une image contenant dessin&#10;&#10;Description générée automatiquement">
+            <a:extLst>
+              <a:ext uri="{FF2B5EF4-FFF2-40B4-BE49-F238E27FC236}">
+                <a16:creationId xmlns:a16="http://schemas.microsoft.com/office/drawing/2014/main" id="{41550CDB-A3FE-4822-BA24-B2EA6F320A15}"/>
+              </a:ext>
+            </a:extLst>
+          </p:cNvPr>
+          <p:cNvPicPr>
+            <a:picLocks noChangeAspect="1"/>
+          </p:cNvPicPr>
+          <p:nvPr/>
+        </p:nvPicPr>
+        <p:blipFill>
+          <a:blip r:embed="rId3"/>
+          <a:stretch>
+            <a:fillRect/>
+          </a:stretch>
+        </p:blipFill>
+        <p:spPr>
+          <a:xfrm>
+            <a:off x="1558977" y="3789398"/>
+            <a:ext cx="1828800" cy="657225"/>
+          </a:xfrm>
+          <a:prstGeom prst="rect">
+            <a:avLst/>
+          </a:prstGeom>
+        </p:spPr>
+      </p:pic>
+      <p:pic>
+        <p:nvPicPr>
+          <p:cNvPr id="12" name="Image 11">
+            <a:extLst>
+              <a:ext uri="{FF2B5EF4-FFF2-40B4-BE49-F238E27FC236}">
+                <a16:creationId xmlns:a16="http://schemas.microsoft.com/office/drawing/2014/main" id="{29E2F356-D90D-4FE2-98F0-926AE270B4C3}"/>
+              </a:ext>
+            </a:extLst>
+          </p:cNvPr>
+          <p:cNvPicPr>
+            <a:picLocks noChangeAspect="1"/>
+          </p:cNvPicPr>
+          <p:nvPr/>
+        </p:nvPicPr>
+        <p:blipFill>
+          <a:blip r:embed="rId4"/>
+          <a:stretch>
+            <a:fillRect/>
+          </a:stretch>
+        </p:blipFill>
+        <p:spPr>
+          <a:xfrm>
+            <a:off x="6095999" y="3206305"/>
+            <a:ext cx="1828800" cy="657225"/>
+          </a:xfrm>
+          <a:prstGeom prst="rect">
+            <a:avLst/>
+          </a:prstGeom>
+        </p:spPr>
+      </p:pic>
+      <p:sp>
+        <p:nvSpPr>
+          <p:cNvPr id="13" name="ZoneTexte 12">
+            <a:extLst>
+              <a:ext uri="{FF2B5EF4-FFF2-40B4-BE49-F238E27FC236}">
+                <a16:creationId xmlns:a16="http://schemas.microsoft.com/office/drawing/2014/main" id="{745ACAC5-4931-48A8-A04C-A0B4577FA1E4}"/>
+              </a:ext>
+            </a:extLst>
+          </p:cNvPr>
+          <p:cNvSpPr txBox="1"/>
+          <p:nvPr/>
+        </p:nvSpPr>
+        <p:spPr>
+          <a:xfrm>
+            <a:off x="715537" y="2927013"/>
+            <a:ext cx="564578" cy="523220"/>
+          </a:xfrm>
+          <a:prstGeom prst="rect">
+            <a:avLst/>
+          </a:prstGeom>
+          <a:noFill/>
+        </p:spPr>
+        <p:txBody>
+          <a:bodyPr wrap="none" rtlCol="0">
+            <a:spAutoFit/>
+          </a:bodyPr>
+          <a:lstStyle/>
+          <a:p>
+            <a:r>
+              <a:rPr lang="fr-FR" dirty="0"/>
+              <a:t>AND</a:t>
+            </a:r>
+          </a:p>
+          <a:p>
+            <a:endParaRPr lang="fr-FR" dirty="0"/>
+          </a:p>
+        </p:txBody>
+      </p:sp>
+      <p:sp>
+        <p:nvSpPr>
+          <p:cNvPr id="14" name="ZoneTexte 13">
+            <a:extLst>
+              <a:ext uri="{FF2B5EF4-FFF2-40B4-BE49-F238E27FC236}">
+                <a16:creationId xmlns:a16="http://schemas.microsoft.com/office/drawing/2014/main" id="{7ED0204D-3E70-4092-85C4-F7F0B0646F0C}"/>
+              </a:ext>
+            </a:extLst>
+          </p:cNvPr>
+          <p:cNvSpPr txBox="1"/>
+          <p:nvPr/>
+        </p:nvSpPr>
+        <p:spPr>
+          <a:xfrm>
+            <a:off x="614598" y="4030422"/>
+            <a:ext cx="776842" cy="307777"/>
+          </a:xfrm>
+          <a:prstGeom prst="rect">
+            <a:avLst/>
+          </a:prstGeom>
+          <a:noFill/>
+        </p:spPr>
+        <p:txBody>
+          <a:bodyPr wrap="square" rtlCol="0">
+            <a:spAutoFit/>
+          </a:bodyPr>
+          <a:lstStyle/>
+          <a:p>
+            <a:r>
+              <a:rPr lang="fr-FR" dirty="0"/>
+              <a:t>OR</a:t>
+            </a:r>
+          </a:p>
+        </p:txBody>
+      </p:sp>
+      <p:sp>
+        <p:nvSpPr>
+          <p:cNvPr id="15" name="ZoneTexte 14">
+            <a:extLst>
+              <a:ext uri="{FF2B5EF4-FFF2-40B4-BE49-F238E27FC236}">
+                <a16:creationId xmlns:a16="http://schemas.microsoft.com/office/drawing/2014/main" id="{008E60A2-33F7-4727-ADA7-A26F8F179B1A}"/>
+              </a:ext>
+            </a:extLst>
+          </p:cNvPr>
+          <p:cNvSpPr txBox="1"/>
+          <p:nvPr/>
+        </p:nvSpPr>
+        <p:spPr>
+          <a:xfrm>
+            <a:off x="5074182" y="3365057"/>
+            <a:ext cx="709376" cy="307777"/>
+          </a:xfrm>
+          <a:prstGeom prst="rect">
+            <a:avLst/>
+          </a:prstGeom>
+          <a:noFill/>
+        </p:spPr>
+        <p:txBody>
+          <a:bodyPr wrap="square" rtlCol="0">
+            <a:spAutoFit/>
+          </a:bodyPr>
+          <a:lstStyle/>
+          <a:p>
+            <a:r>
+              <a:rPr lang="fr-FR" dirty="0"/>
+              <a:t>NOT</a:t>
+            </a:r>
+          </a:p>
+        </p:txBody>
+      </p:sp>
     </p:spTree>
     <p:extLst>
       <p:ext uri="{BB962C8B-B14F-4D97-AF65-F5344CB8AC3E}">
-        <p14:creationId xmlns:p14="http://schemas.microsoft.com/office/powerpoint/2010/main" val="807497125"/>
+        <p14:creationId xmlns:p14="http://schemas.microsoft.com/office/powerpoint/2010/main" val="1133589159"/>
       </p:ext>
     </p:extLst>
   </p:cSld>
@@ -7882,14 +9899,52 @@
         </p:blipFill>
         <p:spPr>
           <a:xfrm>
-            <a:off x="2120349" y="1459577"/>
-            <a:ext cx="4407954" cy="2224346"/>
+            <a:off x="746697" y="641422"/>
+            <a:ext cx="7650606" cy="3860656"/>
           </a:xfrm>
           <a:prstGeom prst="rect">
             <a:avLst/>
           </a:prstGeom>
         </p:spPr>
       </p:pic>
+      <p:sp>
+        <p:nvSpPr>
+          <p:cNvPr id="4" name="Espace réservé du numéro de diapositive 3">
+            <a:extLst>
+              <a:ext uri="{FF2B5EF4-FFF2-40B4-BE49-F238E27FC236}">
+                <a16:creationId xmlns:a16="http://schemas.microsoft.com/office/drawing/2014/main" id="{B7A7A91D-3C78-43F3-93C3-4E1849626697}"/>
+              </a:ext>
+            </a:extLst>
+          </p:cNvPr>
+          <p:cNvSpPr>
+            <a:spLocks noGrp="1"/>
+          </p:cNvSpPr>
+          <p:nvPr>
+            <p:ph type="sldNum" idx="12"/>
+          </p:nvPr>
+        </p:nvSpPr>
+        <p:spPr/>
+        <p:txBody>
+          <a:bodyPr/>
+          <a:lstStyle/>
+          <a:p>
+            <a:pPr marL="0" lvl="0" indent="0" algn="l" rtl="0">
+              <a:spcBef>
+                <a:spcPts val="0"/>
+              </a:spcBef>
+              <a:spcAft>
+                <a:spcPts val="0"/>
+              </a:spcAft>
+              <a:buNone/>
+            </a:pPr>
+            <a:fld id="{00000000-1234-1234-1234-123412341234}" type="slidenum">
+              <a:rPr lang="fr-FR" smtClean="0"/>
+              <a:t>30</a:t>
+            </a:fld>
+            <a:endParaRPr lang="fr-FR"/>
+          </a:p>
+        </p:txBody>
+      </p:sp>
     </p:spTree>
     <p:extLst>
       <p:ext uri="{BB962C8B-B14F-4D97-AF65-F5344CB8AC3E}">
@@ -7975,6 +10030,44 @@
           </a:prstGeom>
         </p:spPr>
       </p:pic>
+      <p:sp>
+        <p:nvSpPr>
+          <p:cNvPr id="3" name="Espace réservé du numéro de diapositive 2">
+            <a:extLst>
+              <a:ext uri="{FF2B5EF4-FFF2-40B4-BE49-F238E27FC236}">
+                <a16:creationId xmlns:a16="http://schemas.microsoft.com/office/drawing/2014/main" id="{E641D90C-9DF0-4855-9F00-C60CB5FDFA19}"/>
+              </a:ext>
+            </a:extLst>
+          </p:cNvPr>
+          <p:cNvSpPr>
+            <a:spLocks noGrp="1"/>
+          </p:cNvSpPr>
+          <p:nvPr>
+            <p:ph type="sldNum" idx="12"/>
+          </p:nvPr>
+        </p:nvSpPr>
+        <p:spPr/>
+        <p:txBody>
+          <a:bodyPr/>
+          <a:lstStyle/>
+          <a:p>
+            <a:pPr marL="0" lvl="0" indent="0" algn="l" rtl="0">
+              <a:spcBef>
+                <a:spcPts val="0"/>
+              </a:spcBef>
+              <a:spcAft>
+                <a:spcPts val="0"/>
+              </a:spcAft>
+              <a:buNone/>
+            </a:pPr>
+            <a:fld id="{00000000-1234-1234-1234-123412341234}" type="slidenum">
+              <a:rPr lang="fr-FR" smtClean="0"/>
+              <a:t>31</a:t>
+            </a:fld>
+            <a:endParaRPr lang="fr-FR"/>
+          </a:p>
+        </p:txBody>
+      </p:sp>
     </p:spTree>
     <p:extLst>
       <p:ext uri="{BB962C8B-B14F-4D97-AF65-F5344CB8AC3E}">
@@ -8010,7 +10103,7 @@
           <p:cNvPr id="2" name="Titre 1">
             <a:extLst>
               <a:ext uri="{FF2B5EF4-FFF2-40B4-BE49-F238E27FC236}">
-                <a16:creationId xmlns:a16="http://schemas.microsoft.com/office/drawing/2014/main" id="{9CEF7014-9A58-4DBA-85C9-2D8E921CE9D0}"/>
+                <a16:creationId xmlns:a16="http://schemas.microsoft.com/office/drawing/2014/main" id="{CAA333E2-8C46-43CF-BD99-4B9216558633}"/>
               </a:ext>
             </a:extLst>
           </p:cNvPr>
@@ -8032,10 +10125,10 @@
       </p:sp>
       <p:pic>
         <p:nvPicPr>
-          <p:cNvPr id="3" name="Image 2">
-            <a:extLst>
-              <a:ext uri="{FF2B5EF4-FFF2-40B4-BE49-F238E27FC236}">
-                <a16:creationId xmlns:a16="http://schemas.microsoft.com/office/drawing/2014/main" id="{7C602895-222F-4957-B18D-FFF6ABD7E2C6}"/>
+          <p:cNvPr id="4" name="Image 3">
+            <a:extLst>
+              <a:ext uri="{FF2B5EF4-FFF2-40B4-BE49-F238E27FC236}">
+                <a16:creationId xmlns:a16="http://schemas.microsoft.com/office/drawing/2014/main" id="{FEA90398-2670-44D1-8FEB-1A8EA6D5D621}"/>
               </a:ext>
             </a:extLst>
           </p:cNvPr>
@@ -8052,18 +10145,110 @@
         </p:blipFill>
         <p:spPr>
           <a:xfrm>
-            <a:off x="1009297" y="1821059"/>
-            <a:ext cx="7125405" cy="1501381"/>
+            <a:off x="470248" y="1712742"/>
+            <a:ext cx="8203503" cy="2559816"/>
           </a:xfrm>
           <a:prstGeom prst="rect">
             <a:avLst/>
           </a:prstGeom>
         </p:spPr>
       </p:pic>
+      <p:sp>
+        <p:nvSpPr>
+          <p:cNvPr id="3" name="Rectangle 2">
+            <a:extLst>
+              <a:ext uri="{FF2B5EF4-FFF2-40B4-BE49-F238E27FC236}">
+                <a16:creationId xmlns:a16="http://schemas.microsoft.com/office/drawing/2014/main" id="{700FDEF0-373C-4E12-B296-F3A6358524A1}"/>
+              </a:ext>
+            </a:extLst>
+          </p:cNvPr>
+          <p:cNvSpPr/>
+          <p:nvPr/>
+        </p:nvSpPr>
+        <p:spPr>
+          <a:xfrm>
+            <a:off x="5347607" y="3363686"/>
+            <a:ext cx="3326144" cy="751114"/>
+          </a:xfrm>
+          <a:prstGeom prst="rect">
+            <a:avLst/>
+          </a:prstGeom>
+          <a:solidFill>
+            <a:schemeClr val="bg1"/>
+          </a:solidFill>
+          <a:ln>
+            <a:solidFill>
+              <a:schemeClr val="bg1"/>
+            </a:solidFill>
+          </a:ln>
+        </p:spPr>
+        <p:style>
+          <a:lnRef idx="2">
+            <a:schemeClr val="accent1">
+              <a:shade val="50000"/>
+            </a:schemeClr>
+          </a:lnRef>
+          <a:fillRef idx="1">
+            <a:schemeClr val="accent1"/>
+          </a:fillRef>
+          <a:effectRef idx="0">
+            <a:schemeClr val="accent1"/>
+          </a:effectRef>
+          <a:fontRef idx="minor">
+            <a:schemeClr val="lt1"/>
+          </a:fontRef>
+        </p:style>
+        <p:txBody>
+          <a:bodyPr rtlCol="0" anchor="ctr"/>
+          <a:lstStyle/>
+          <a:p>
+            <a:pPr algn="ctr"/>
+            <a:endParaRPr lang="fr-FR"/>
+          </a:p>
+        </p:txBody>
+      </p:sp>
+      <p:sp>
+        <p:nvSpPr>
+          <p:cNvPr id="5" name="Espace réservé du numéro de diapositive 4">
+            <a:extLst>
+              <a:ext uri="{FF2B5EF4-FFF2-40B4-BE49-F238E27FC236}">
+                <a16:creationId xmlns:a16="http://schemas.microsoft.com/office/drawing/2014/main" id="{100866D2-37CB-4775-8F80-AB4C8C8D5BEC}"/>
+              </a:ext>
+            </a:extLst>
+          </p:cNvPr>
+          <p:cNvSpPr>
+            <a:spLocks noGrp="1"/>
+          </p:cNvSpPr>
+          <p:nvPr>
+            <p:ph type="sldNum" idx="12"/>
+          </p:nvPr>
+        </p:nvSpPr>
+        <p:spPr/>
+        <p:txBody>
+          <a:bodyPr/>
+          <a:lstStyle/>
+          <a:p>
+            <a:pPr marL="0" lvl="0" indent="0" algn="l" rtl="0">
+              <a:spcBef>
+                <a:spcPts val="0"/>
+              </a:spcBef>
+              <a:spcAft>
+                <a:spcPts val="0"/>
+              </a:spcAft>
+              <a:buNone/>
+            </a:pPr>
+            <a:fld id="{00000000-1234-1234-1234-123412341234}" type="slidenum">
+              <a:rPr lang="fr-FR" smtClean="0"/>
+              <a:t>32</a:t>
+            </a:fld>
+            <a:endParaRPr lang="fr-FR"/>
+          </a:p>
+        </p:txBody>
+      </p:sp>
     </p:spTree>
     <p:extLst>
       <p:ext uri="{BB962C8B-B14F-4D97-AF65-F5344CB8AC3E}">
-        <p14:creationId xmlns:p14="http://schemas.microsoft.com/office/powerpoint/2010/main" val="3969945076"/>
+        <p14:creationId xmlns:p14="http://schemas.microsoft.com/office/powerpoint/2010/main" val="626801929"/>
       </p:ext>
     </p:extLst>
   </p:cSld>
@@ -8095,7 +10280,7 @@
           <p:cNvPr id="2" name="Titre 1">
             <a:extLst>
               <a:ext uri="{FF2B5EF4-FFF2-40B4-BE49-F238E27FC236}">
-                <a16:creationId xmlns:a16="http://schemas.microsoft.com/office/drawing/2014/main" id="{A60E5E5D-0FF1-4C3C-9A26-C224BD80C476}"/>
+                <a16:creationId xmlns:a16="http://schemas.microsoft.com/office/drawing/2014/main" id="{9CEF7014-9A58-4DBA-85C9-2D8E921CE9D0}"/>
               </a:ext>
             </a:extLst>
           </p:cNvPr>
@@ -8120,7 +10305,7 @@
           <p:cNvPr id="3" name="Image 2">
             <a:extLst>
               <a:ext uri="{FF2B5EF4-FFF2-40B4-BE49-F238E27FC236}">
-                <a16:creationId xmlns:a16="http://schemas.microsoft.com/office/drawing/2014/main" id="{E9ADD1AD-C342-47E6-B68F-8C597AA68E4A}"/>
+                <a16:creationId xmlns:a16="http://schemas.microsoft.com/office/drawing/2014/main" id="{7C602895-222F-4957-B18D-FFF6ABD7E2C6}"/>
               </a:ext>
             </a:extLst>
           </p:cNvPr>
@@ -8137,18 +10322,290 @@
         </p:blipFill>
         <p:spPr>
           <a:xfrm>
-            <a:off x="1504792" y="1133401"/>
-            <a:ext cx="6134415" cy="2876698"/>
+            <a:off x="485030" y="2014305"/>
+            <a:ext cx="7774824" cy="1638219"/>
           </a:xfrm>
           <a:prstGeom prst="rect">
             <a:avLst/>
           </a:prstGeom>
         </p:spPr>
       </p:pic>
+      <p:sp>
+        <p:nvSpPr>
+          <p:cNvPr id="7" name="ZoneTexte 6">
+            <a:extLst>
+              <a:ext uri="{FF2B5EF4-FFF2-40B4-BE49-F238E27FC236}">
+                <a16:creationId xmlns:a16="http://schemas.microsoft.com/office/drawing/2014/main" id="{2FB216EA-A050-4D1F-87BD-B5194B7E20FD}"/>
+              </a:ext>
+            </a:extLst>
+          </p:cNvPr>
+          <p:cNvSpPr txBox="1"/>
+          <p:nvPr/>
+        </p:nvSpPr>
+        <p:spPr>
+          <a:xfrm>
+            <a:off x="2689411" y="1077539"/>
+            <a:ext cx="1360075" cy="400110"/>
+          </a:xfrm>
+          <a:prstGeom prst="rect">
+            <a:avLst/>
+          </a:prstGeom>
+          <a:noFill/>
+        </p:spPr>
+        <p:txBody>
+          <a:bodyPr wrap="square" rtlCol="0">
+            <a:spAutoFit/>
+          </a:bodyPr>
+          <a:lstStyle/>
+          <a:p>
+            <a:r>
+              <a:rPr lang="fr-FR" sz="2000" dirty="0"/>
+              <a:t>Constant</a:t>
+            </a:r>
+          </a:p>
+        </p:txBody>
+      </p:sp>
+      <p:cxnSp>
+        <p:nvCxnSpPr>
+          <p:cNvPr id="9" name="Connecteur droit avec flèche 8">
+            <a:extLst>
+              <a:ext uri="{FF2B5EF4-FFF2-40B4-BE49-F238E27FC236}">
+                <a16:creationId xmlns:a16="http://schemas.microsoft.com/office/drawing/2014/main" id="{8512B648-4A7F-4E34-A244-70CE43F4426B}"/>
+              </a:ext>
+            </a:extLst>
+          </p:cNvPr>
+          <p:cNvCxnSpPr/>
+          <p:nvPr/>
+        </p:nvCxnSpPr>
+        <p:spPr>
+          <a:xfrm flipH="1">
+            <a:off x="2804672" y="1552175"/>
+            <a:ext cx="230521" cy="432000"/>
+          </a:xfrm>
+          <a:prstGeom prst="straightConnector1">
+            <a:avLst/>
+          </a:prstGeom>
+          <a:ln>
+            <a:solidFill>
+              <a:schemeClr val="tx1"/>
+            </a:solidFill>
+            <a:tailEnd type="triangle"/>
+          </a:ln>
+        </p:spPr>
+        <p:style>
+          <a:lnRef idx="1">
+            <a:schemeClr val="dk1"/>
+          </a:lnRef>
+          <a:fillRef idx="0">
+            <a:schemeClr val="dk1"/>
+          </a:fillRef>
+          <a:effectRef idx="0">
+            <a:schemeClr val="dk1"/>
+          </a:effectRef>
+          <a:fontRef idx="minor">
+            <a:schemeClr val="tx1"/>
+          </a:fontRef>
+        </p:style>
+      </p:cxnSp>
+      <p:cxnSp>
+        <p:nvCxnSpPr>
+          <p:cNvPr id="11" name="Connecteur droit avec flèche 10">
+            <a:extLst>
+              <a:ext uri="{FF2B5EF4-FFF2-40B4-BE49-F238E27FC236}">
+                <a16:creationId xmlns:a16="http://schemas.microsoft.com/office/drawing/2014/main" id="{86F3BF0D-B292-4947-9B2F-727C2BBD32BB}"/>
+              </a:ext>
+            </a:extLst>
+          </p:cNvPr>
+          <p:cNvCxnSpPr/>
+          <p:nvPr/>
+        </p:nvCxnSpPr>
+        <p:spPr>
+          <a:xfrm>
+            <a:off x="3519287" y="1552175"/>
+            <a:ext cx="268942" cy="432000"/>
+          </a:xfrm>
+          <a:prstGeom prst="straightConnector1">
+            <a:avLst/>
+          </a:prstGeom>
+          <a:ln>
+            <a:tailEnd type="triangle"/>
+          </a:ln>
+        </p:spPr>
+        <p:style>
+          <a:lnRef idx="1">
+            <a:schemeClr val="dk1"/>
+          </a:lnRef>
+          <a:fillRef idx="0">
+            <a:schemeClr val="dk1"/>
+          </a:fillRef>
+          <a:effectRef idx="0">
+            <a:schemeClr val="dk1"/>
+          </a:effectRef>
+          <a:fontRef idx="minor">
+            <a:schemeClr val="tx1"/>
+          </a:fontRef>
+        </p:style>
+      </p:cxnSp>
+      <p:sp>
+        <p:nvSpPr>
+          <p:cNvPr id="12" name="ZoneTexte 11">
+            <a:extLst>
+              <a:ext uri="{FF2B5EF4-FFF2-40B4-BE49-F238E27FC236}">
+                <a16:creationId xmlns:a16="http://schemas.microsoft.com/office/drawing/2014/main" id="{901BAF97-824D-49F6-9EAC-EC708C54AD7C}"/>
+              </a:ext>
+            </a:extLst>
+          </p:cNvPr>
+          <p:cNvSpPr txBox="1"/>
+          <p:nvPr/>
+        </p:nvSpPr>
+        <p:spPr>
+          <a:xfrm>
+            <a:off x="5678501" y="1077539"/>
+            <a:ext cx="1413863" cy="400110"/>
+          </a:xfrm>
+          <a:prstGeom prst="rect">
+            <a:avLst/>
+          </a:prstGeom>
+          <a:noFill/>
+        </p:spPr>
+        <p:txBody>
+          <a:bodyPr wrap="square" rtlCol="0">
+            <a:spAutoFit/>
+          </a:bodyPr>
+          <a:lstStyle/>
+          <a:p>
+            <a:r>
+              <a:rPr lang="fr-FR" sz="2000" dirty="0" err="1"/>
+              <a:t>Balanced</a:t>
+            </a:r>
+            <a:endParaRPr lang="fr-FR" sz="2000" dirty="0"/>
+          </a:p>
+        </p:txBody>
+      </p:sp>
+      <p:cxnSp>
+        <p:nvCxnSpPr>
+          <p:cNvPr id="14" name="Connecteur droit avec flèche 13">
+            <a:extLst>
+              <a:ext uri="{FF2B5EF4-FFF2-40B4-BE49-F238E27FC236}">
+                <a16:creationId xmlns:a16="http://schemas.microsoft.com/office/drawing/2014/main" id="{EBD35A74-D2B9-470E-98D1-FD7A31A388CB}"/>
+              </a:ext>
+            </a:extLst>
+          </p:cNvPr>
+          <p:cNvCxnSpPr>
+            <a:cxnSpLocks/>
+          </p:cNvCxnSpPr>
+          <p:nvPr/>
+        </p:nvCxnSpPr>
+        <p:spPr>
+          <a:xfrm flipH="1">
+            <a:off x="5647766" y="1614194"/>
+            <a:ext cx="368832" cy="369981"/>
+          </a:xfrm>
+          <a:prstGeom prst="straightConnector1">
+            <a:avLst/>
+          </a:prstGeom>
+          <a:ln>
+            <a:tailEnd type="triangle"/>
+          </a:ln>
+        </p:spPr>
+        <p:style>
+          <a:lnRef idx="1">
+            <a:schemeClr val="dk1"/>
+          </a:lnRef>
+          <a:fillRef idx="0">
+            <a:schemeClr val="dk1"/>
+          </a:fillRef>
+          <a:effectRef idx="0">
+            <a:schemeClr val="dk1"/>
+          </a:effectRef>
+          <a:fontRef idx="minor">
+            <a:schemeClr val="tx1"/>
+          </a:fontRef>
+        </p:style>
+      </p:cxnSp>
+      <p:cxnSp>
+        <p:nvCxnSpPr>
+          <p:cNvPr id="16" name="Connecteur droit avec flèche 15">
+            <a:extLst>
+              <a:ext uri="{FF2B5EF4-FFF2-40B4-BE49-F238E27FC236}">
+                <a16:creationId xmlns:a16="http://schemas.microsoft.com/office/drawing/2014/main" id="{08E53B66-3CB3-4412-A4DE-E300A2848318}"/>
+              </a:ext>
+            </a:extLst>
+          </p:cNvPr>
+          <p:cNvCxnSpPr>
+            <a:cxnSpLocks/>
+          </p:cNvCxnSpPr>
+          <p:nvPr/>
+        </p:nvCxnSpPr>
+        <p:spPr>
+          <a:xfrm>
+            <a:off x="6485324" y="1552175"/>
+            <a:ext cx="407254" cy="432000"/>
+          </a:xfrm>
+          <a:prstGeom prst="straightConnector1">
+            <a:avLst/>
+          </a:prstGeom>
+          <a:ln>
+            <a:tailEnd type="triangle"/>
+          </a:ln>
+        </p:spPr>
+        <p:style>
+          <a:lnRef idx="1">
+            <a:schemeClr val="dk1"/>
+          </a:lnRef>
+          <a:fillRef idx="0">
+            <a:schemeClr val="dk1"/>
+          </a:fillRef>
+          <a:effectRef idx="0">
+            <a:schemeClr val="dk1"/>
+          </a:effectRef>
+          <a:fontRef idx="minor">
+            <a:schemeClr val="tx1"/>
+          </a:fontRef>
+        </p:style>
+      </p:cxnSp>
+      <p:sp>
+        <p:nvSpPr>
+          <p:cNvPr id="4" name="Espace réservé du numéro de diapositive 3">
+            <a:extLst>
+              <a:ext uri="{FF2B5EF4-FFF2-40B4-BE49-F238E27FC236}">
+                <a16:creationId xmlns:a16="http://schemas.microsoft.com/office/drawing/2014/main" id="{6B476100-543D-47F9-BC1F-5B1B77FDCF20}"/>
+              </a:ext>
+            </a:extLst>
+          </p:cNvPr>
+          <p:cNvSpPr>
+            <a:spLocks noGrp="1"/>
+          </p:cNvSpPr>
+          <p:nvPr>
+            <p:ph type="sldNum" idx="12"/>
+          </p:nvPr>
+        </p:nvSpPr>
+        <p:spPr/>
+        <p:txBody>
+          <a:bodyPr/>
+          <a:lstStyle/>
+          <a:p>
+            <a:pPr marL="0" lvl="0" indent="0" algn="l" rtl="0">
+              <a:spcBef>
+                <a:spcPts val="0"/>
+              </a:spcBef>
+              <a:spcAft>
+                <a:spcPts val="0"/>
+              </a:spcAft>
+              <a:buNone/>
+            </a:pPr>
+            <a:fld id="{00000000-1234-1234-1234-123412341234}" type="slidenum">
+              <a:rPr lang="fr-FR" smtClean="0"/>
+              <a:t>33</a:t>
+            </a:fld>
+            <a:endParaRPr lang="fr-FR"/>
+          </a:p>
+        </p:txBody>
+      </p:sp>
     </p:spTree>
     <p:extLst>
       <p:ext uri="{BB962C8B-B14F-4D97-AF65-F5344CB8AC3E}">
-        <p14:creationId xmlns:p14="http://schemas.microsoft.com/office/powerpoint/2010/main" val="2833916400"/>
+        <p14:creationId xmlns:p14="http://schemas.microsoft.com/office/powerpoint/2010/main" val="3969945076"/>
       </p:ext>
     </p:extLst>
   </p:cSld>
@@ -8180,7 +10637,7 @@
           <p:cNvPr id="2" name="Titre 1">
             <a:extLst>
               <a:ext uri="{FF2B5EF4-FFF2-40B4-BE49-F238E27FC236}">
-                <a16:creationId xmlns:a16="http://schemas.microsoft.com/office/drawing/2014/main" id="{A4F0332A-F85F-42D4-AC42-4024E16226AB}"/>
+                <a16:creationId xmlns:a16="http://schemas.microsoft.com/office/drawing/2014/main" id="{A60E5E5D-0FF1-4C3C-9A26-C224BD80C476}"/>
               </a:ext>
             </a:extLst>
           </p:cNvPr>
@@ -8205,7 +10662,7 @@
           <p:cNvPr id="3" name="Image 2">
             <a:extLst>
               <a:ext uri="{FF2B5EF4-FFF2-40B4-BE49-F238E27FC236}">
-                <a16:creationId xmlns:a16="http://schemas.microsoft.com/office/drawing/2014/main" id="{274F9C85-1CAB-4A28-88BB-C6CE2B6A67A4}"/>
+                <a16:creationId xmlns:a16="http://schemas.microsoft.com/office/drawing/2014/main" id="{E9ADD1AD-C342-47E6-B68F-8C597AA68E4A}"/>
               </a:ext>
             </a:extLst>
           </p:cNvPr>
@@ -8222,18 +10679,56 @@
         </p:blipFill>
         <p:spPr>
           <a:xfrm>
-            <a:off x="357452" y="940904"/>
-            <a:ext cx="8429095" cy="3025294"/>
+            <a:off x="1504792" y="1133401"/>
+            <a:ext cx="6134415" cy="2876698"/>
           </a:xfrm>
           <a:prstGeom prst="rect">
             <a:avLst/>
           </a:prstGeom>
         </p:spPr>
       </p:pic>
+      <p:sp>
+        <p:nvSpPr>
+          <p:cNvPr id="4" name="Espace réservé du numéro de diapositive 3">
+            <a:extLst>
+              <a:ext uri="{FF2B5EF4-FFF2-40B4-BE49-F238E27FC236}">
+                <a16:creationId xmlns:a16="http://schemas.microsoft.com/office/drawing/2014/main" id="{6B821146-6CBC-49DE-91F2-A1D715DF1C7C}"/>
+              </a:ext>
+            </a:extLst>
+          </p:cNvPr>
+          <p:cNvSpPr>
+            <a:spLocks noGrp="1"/>
+          </p:cNvSpPr>
+          <p:nvPr>
+            <p:ph type="sldNum" idx="12"/>
+          </p:nvPr>
+        </p:nvSpPr>
+        <p:spPr/>
+        <p:txBody>
+          <a:bodyPr/>
+          <a:lstStyle/>
+          <a:p>
+            <a:pPr marL="0" lvl="0" indent="0" algn="l" rtl="0">
+              <a:spcBef>
+                <a:spcPts val="0"/>
+              </a:spcBef>
+              <a:spcAft>
+                <a:spcPts val="0"/>
+              </a:spcAft>
+              <a:buNone/>
+            </a:pPr>
+            <a:fld id="{00000000-1234-1234-1234-123412341234}" type="slidenum">
+              <a:rPr lang="fr-FR" smtClean="0"/>
+              <a:t>34</a:t>
+            </a:fld>
+            <a:endParaRPr lang="fr-FR"/>
+          </a:p>
+        </p:txBody>
+      </p:sp>
     </p:spTree>
     <p:extLst>
       <p:ext uri="{BB962C8B-B14F-4D97-AF65-F5344CB8AC3E}">
-        <p14:creationId xmlns:p14="http://schemas.microsoft.com/office/powerpoint/2010/main" val="2633660111"/>
+        <p14:creationId xmlns:p14="http://schemas.microsoft.com/office/powerpoint/2010/main" val="2833916400"/>
       </p:ext>
     </p:extLst>
   </p:cSld>
@@ -8265,7 +10760,7 @@
           <p:cNvPr id="2" name="Titre 1">
             <a:extLst>
               <a:ext uri="{FF2B5EF4-FFF2-40B4-BE49-F238E27FC236}">
-                <a16:creationId xmlns:a16="http://schemas.microsoft.com/office/drawing/2014/main" id="{582BEE0D-B229-4E28-8597-E653376BE34C}"/>
+                <a16:creationId xmlns:a16="http://schemas.microsoft.com/office/drawing/2014/main" id="{A4F0332A-F85F-42D4-AC42-4024E16226AB}"/>
               </a:ext>
             </a:extLst>
           </p:cNvPr>
@@ -8290,7 +10785,7 @@
           <p:cNvPr id="3" name="Image 2">
             <a:extLst>
               <a:ext uri="{FF2B5EF4-FFF2-40B4-BE49-F238E27FC236}">
-                <a16:creationId xmlns:a16="http://schemas.microsoft.com/office/drawing/2014/main" id="{A6EED52F-01E4-4624-84B9-46449D359CFE}"/>
+                <a16:creationId xmlns:a16="http://schemas.microsoft.com/office/drawing/2014/main" id="{274F9C85-1CAB-4A28-88BB-C6CE2B6A67A4}"/>
               </a:ext>
             </a:extLst>
           </p:cNvPr>
@@ -8307,18 +10802,56 @@
         </p:blipFill>
         <p:spPr>
           <a:xfrm>
-            <a:off x="1117719" y="1073426"/>
-            <a:ext cx="6908562" cy="2694073"/>
+            <a:off x="101205" y="1004907"/>
+            <a:ext cx="8731095" cy="3133685"/>
           </a:xfrm>
           <a:prstGeom prst="rect">
             <a:avLst/>
           </a:prstGeom>
         </p:spPr>
       </p:pic>
+      <p:sp>
+        <p:nvSpPr>
+          <p:cNvPr id="4" name="Espace réservé du numéro de diapositive 3">
+            <a:extLst>
+              <a:ext uri="{FF2B5EF4-FFF2-40B4-BE49-F238E27FC236}">
+                <a16:creationId xmlns:a16="http://schemas.microsoft.com/office/drawing/2014/main" id="{D48EEFBB-D59A-4021-9F49-7C5F4BE49743}"/>
+              </a:ext>
+            </a:extLst>
+          </p:cNvPr>
+          <p:cNvSpPr>
+            <a:spLocks noGrp="1"/>
+          </p:cNvSpPr>
+          <p:nvPr>
+            <p:ph type="sldNum" idx="12"/>
+          </p:nvPr>
+        </p:nvSpPr>
+        <p:spPr/>
+        <p:txBody>
+          <a:bodyPr/>
+          <a:lstStyle/>
+          <a:p>
+            <a:pPr marL="0" lvl="0" indent="0" algn="l" rtl="0">
+              <a:spcBef>
+                <a:spcPts val="0"/>
+              </a:spcBef>
+              <a:spcAft>
+                <a:spcPts val="0"/>
+              </a:spcAft>
+              <a:buNone/>
+            </a:pPr>
+            <a:fld id="{00000000-1234-1234-1234-123412341234}" type="slidenum">
+              <a:rPr lang="fr-FR" smtClean="0"/>
+              <a:t>35</a:t>
+            </a:fld>
+            <a:endParaRPr lang="fr-FR"/>
+          </a:p>
+        </p:txBody>
+      </p:sp>
     </p:spTree>
     <p:extLst>
       <p:ext uri="{BB962C8B-B14F-4D97-AF65-F5344CB8AC3E}">
-        <p14:creationId xmlns:p14="http://schemas.microsoft.com/office/powerpoint/2010/main" val="3388976574"/>
+        <p14:creationId xmlns:p14="http://schemas.microsoft.com/office/powerpoint/2010/main" val="2633660111"/>
       </p:ext>
     </p:extLst>
   </p:cSld>
@@ -8350,7 +10883,7 @@
           <p:cNvPr id="2" name="Titre 1">
             <a:extLst>
               <a:ext uri="{FF2B5EF4-FFF2-40B4-BE49-F238E27FC236}">
-                <a16:creationId xmlns:a16="http://schemas.microsoft.com/office/drawing/2014/main" id="{60D89F33-A180-4226-BB45-0EA18A2F3591}"/>
+                <a16:creationId xmlns:a16="http://schemas.microsoft.com/office/drawing/2014/main" id="{582BEE0D-B229-4E28-8597-E653376BE34C}"/>
               </a:ext>
             </a:extLst>
           </p:cNvPr>
@@ -8375,7 +10908,7 @@
           <p:cNvPr id="3" name="Image 2">
             <a:extLst>
               <a:ext uri="{FF2B5EF4-FFF2-40B4-BE49-F238E27FC236}">
-                <a16:creationId xmlns:a16="http://schemas.microsoft.com/office/drawing/2014/main" id="{6049AA18-C426-4F9E-9C4C-AAA8F74CB6B0}"/>
+                <a16:creationId xmlns:a16="http://schemas.microsoft.com/office/drawing/2014/main" id="{A6EED52F-01E4-4624-84B9-46449D359CFE}"/>
               </a:ext>
             </a:extLst>
           </p:cNvPr>
@@ -8392,18 +10925,56 @@
         </p:blipFill>
         <p:spPr>
           <a:xfrm>
-            <a:off x="2691905" y="756486"/>
-            <a:ext cx="3760190" cy="3630527"/>
+            <a:off x="1117719" y="1073426"/>
+            <a:ext cx="6908562" cy="2694073"/>
           </a:xfrm>
           <a:prstGeom prst="rect">
             <a:avLst/>
           </a:prstGeom>
         </p:spPr>
       </p:pic>
+      <p:sp>
+        <p:nvSpPr>
+          <p:cNvPr id="4" name="Espace réservé du numéro de diapositive 3">
+            <a:extLst>
+              <a:ext uri="{FF2B5EF4-FFF2-40B4-BE49-F238E27FC236}">
+                <a16:creationId xmlns:a16="http://schemas.microsoft.com/office/drawing/2014/main" id="{1424C1EB-DC95-4376-8B4B-A6167AB4C9F0}"/>
+              </a:ext>
+            </a:extLst>
+          </p:cNvPr>
+          <p:cNvSpPr>
+            <a:spLocks noGrp="1"/>
+          </p:cNvSpPr>
+          <p:nvPr>
+            <p:ph type="sldNum" idx="12"/>
+          </p:nvPr>
+        </p:nvSpPr>
+        <p:spPr/>
+        <p:txBody>
+          <a:bodyPr/>
+          <a:lstStyle/>
+          <a:p>
+            <a:pPr marL="0" lvl="0" indent="0" algn="l" rtl="0">
+              <a:spcBef>
+                <a:spcPts val="0"/>
+              </a:spcBef>
+              <a:spcAft>
+                <a:spcPts val="0"/>
+              </a:spcAft>
+              <a:buNone/>
+            </a:pPr>
+            <a:fld id="{00000000-1234-1234-1234-123412341234}" type="slidenum">
+              <a:rPr lang="fr-FR" smtClean="0"/>
+              <a:t>36</a:t>
+            </a:fld>
+            <a:endParaRPr lang="fr-FR"/>
+          </a:p>
+        </p:txBody>
+      </p:sp>
     </p:spTree>
     <p:extLst>
       <p:ext uri="{BB962C8B-B14F-4D97-AF65-F5344CB8AC3E}">
-        <p14:creationId xmlns:p14="http://schemas.microsoft.com/office/powerpoint/2010/main" val="2539236824"/>
+        <p14:creationId xmlns:p14="http://schemas.microsoft.com/office/powerpoint/2010/main" val="3388976574"/>
       </p:ext>
     </p:extLst>
   </p:cSld>
@@ -8435,6 +11006,159 @@
           <p:cNvPr id="2" name="Titre 1">
             <a:extLst>
               <a:ext uri="{FF2B5EF4-FFF2-40B4-BE49-F238E27FC236}">
+                <a16:creationId xmlns:a16="http://schemas.microsoft.com/office/drawing/2014/main" id="{582BEE0D-B229-4E28-8597-E653376BE34C}"/>
+              </a:ext>
+            </a:extLst>
+          </p:cNvPr>
+          <p:cNvSpPr>
+            <a:spLocks noGrp="1"/>
+          </p:cNvSpPr>
+          <p:nvPr>
+            <p:ph type="title"/>
+          </p:nvPr>
+        </p:nvSpPr>
+        <p:spPr/>
+        <p:txBody>
+          <a:bodyPr/>
+          <a:lstStyle/>
+          <a:p>
+            <a:endParaRPr lang="fr-FR"/>
+          </a:p>
+        </p:txBody>
+      </p:sp>
+      <p:pic>
+        <p:nvPicPr>
+          <p:cNvPr id="3" name="Image 2">
+            <a:extLst>
+              <a:ext uri="{FF2B5EF4-FFF2-40B4-BE49-F238E27FC236}">
+                <a16:creationId xmlns:a16="http://schemas.microsoft.com/office/drawing/2014/main" id="{A6EED52F-01E4-4624-84B9-46449D359CFE}"/>
+              </a:ext>
+            </a:extLst>
+          </p:cNvPr>
+          <p:cNvPicPr>
+            <a:picLocks noChangeAspect="1"/>
+          </p:cNvPicPr>
+          <p:nvPr/>
+        </p:nvPicPr>
+        <p:blipFill>
+          <a:blip r:embed="rId2"/>
+          <a:stretch>
+            <a:fillRect/>
+          </a:stretch>
+        </p:blipFill>
+        <p:spPr>
+          <a:xfrm>
+            <a:off x="1300091" y="206219"/>
+            <a:ext cx="6066064" cy="2365531"/>
+          </a:xfrm>
+          <a:prstGeom prst="rect">
+            <a:avLst/>
+          </a:prstGeom>
+        </p:spPr>
+      </p:pic>
+      <p:pic>
+        <p:nvPicPr>
+          <p:cNvPr id="5" name="Image 4">
+            <a:extLst>
+              <a:ext uri="{FF2B5EF4-FFF2-40B4-BE49-F238E27FC236}">
+                <a16:creationId xmlns:a16="http://schemas.microsoft.com/office/drawing/2014/main" id="{88AA11FB-2953-407B-8542-B726619920CD}"/>
+              </a:ext>
+            </a:extLst>
+          </p:cNvPr>
+          <p:cNvPicPr>
+            <a:picLocks noChangeAspect="1"/>
+          </p:cNvPicPr>
+          <p:nvPr/>
+        </p:nvPicPr>
+        <p:blipFill>
+          <a:blip r:embed="rId3"/>
+          <a:stretch>
+            <a:fillRect/>
+          </a:stretch>
+        </p:blipFill>
+        <p:spPr>
+          <a:xfrm>
+            <a:off x="3004457" y="2571750"/>
+            <a:ext cx="2657331" cy="2565698"/>
+          </a:xfrm>
+          <a:prstGeom prst="rect">
+            <a:avLst/>
+          </a:prstGeom>
+        </p:spPr>
+      </p:pic>
+      <p:sp>
+        <p:nvSpPr>
+          <p:cNvPr id="4" name="Espace réservé du numéro de diapositive 3">
+            <a:extLst>
+              <a:ext uri="{FF2B5EF4-FFF2-40B4-BE49-F238E27FC236}">
+                <a16:creationId xmlns:a16="http://schemas.microsoft.com/office/drawing/2014/main" id="{DD2996ED-C76C-445A-8838-4947329EF221}"/>
+              </a:ext>
+            </a:extLst>
+          </p:cNvPr>
+          <p:cNvSpPr>
+            <a:spLocks noGrp="1"/>
+          </p:cNvSpPr>
+          <p:nvPr>
+            <p:ph type="sldNum" idx="12"/>
+          </p:nvPr>
+        </p:nvSpPr>
+        <p:spPr/>
+        <p:txBody>
+          <a:bodyPr/>
+          <a:lstStyle/>
+          <a:p>
+            <a:pPr marL="0" lvl="0" indent="0" algn="l" rtl="0">
+              <a:spcBef>
+                <a:spcPts val="0"/>
+              </a:spcBef>
+              <a:spcAft>
+                <a:spcPts val="0"/>
+              </a:spcAft>
+              <a:buNone/>
+            </a:pPr>
+            <a:fld id="{00000000-1234-1234-1234-123412341234}" type="slidenum">
+              <a:rPr lang="fr-FR" smtClean="0"/>
+              <a:t>37</a:t>
+            </a:fld>
+            <a:endParaRPr lang="fr-FR"/>
+          </a:p>
+        </p:txBody>
+      </p:sp>
+    </p:spTree>
+    <p:extLst>
+      <p:ext uri="{BB962C8B-B14F-4D97-AF65-F5344CB8AC3E}">
+        <p14:creationId xmlns:p14="http://schemas.microsoft.com/office/powerpoint/2010/main" val="3035506168"/>
+      </p:ext>
+    </p:extLst>
+  </p:cSld>
+  <p:clrMapOvr>
+    <a:masterClrMapping/>
+  </p:clrMapOvr>
+</p:sld>
+</file>
+
+<file path=ppt/slides/slide38.xml><?xml version="1.0" encoding="utf-8"?>
+<p:sld xmlns:a="http://schemas.openxmlformats.org/drawingml/2006/main" xmlns:r="http://schemas.openxmlformats.org/officeDocument/2006/relationships" xmlns:p="http://schemas.openxmlformats.org/presentationml/2006/main">
+  <p:cSld>
+    <p:spTree>
+      <p:nvGrpSpPr>
+        <p:cNvPr id="1" name=""/>
+        <p:cNvGrpSpPr/>
+        <p:nvPr/>
+      </p:nvGrpSpPr>
+      <p:grpSpPr>
+        <a:xfrm>
+          <a:off x="0" y="0"/>
+          <a:ext cx="0" cy="0"/>
+          <a:chOff x="0" y="0"/>
+          <a:chExt cx="0" cy="0"/>
+        </a:xfrm>
+      </p:grpSpPr>
+      <p:sp>
+        <p:nvSpPr>
+          <p:cNvPr id="2" name="Titre 1">
+            <a:extLst>
+              <a:ext uri="{FF2B5EF4-FFF2-40B4-BE49-F238E27FC236}">
                 <a16:creationId xmlns:a16="http://schemas.microsoft.com/office/drawing/2014/main" id="{5E39B73D-A312-4C94-944D-68F5D1DAE627}"/>
               </a:ext>
             </a:extLst>
@@ -8485,6 +11209,44 @@
           </a:prstGeom>
         </p:spPr>
       </p:pic>
+      <p:sp>
+        <p:nvSpPr>
+          <p:cNvPr id="4" name="Espace réservé du numéro de diapositive 3">
+            <a:extLst>
+              <a:ext uri="{FF2B5EF4-FFF2-40B4-BE49-F238E27FC236}">
+                <a16:creationId xmlns:a16="http://schemas.microsoft.com/office/drawing/2014/main" id="{D6467408-EA94-4711-B529-0E2A89950032}"/>
+              </a:ext>
+            </a:extLst>
+          </p:cNvPr>
+          <p:cNvSpPr>
+            <a:spLocks noGrp="1"/>
+          </p:cNvSpPr>
+          <p:nvPr>
+            <p:ph type="sldNum" idx="12"/>
+          </p:nvPr>
+        </p:nvSpPr>
+        <p:spPr/>
+        <p:txBody>
+          <a:bodyPr/>
+          <a:lstStyle/>
+          <a:p>
+            <a:pPr marL="0" lvl="0" indent="0" algn="l" rtl="0">
+              <a:spcBef>
+                <a:spcPts val="0"/>
+              </a:spcBef>
+              <a:spcAft>
+                <a:spcPts val="0"/>
+              </a:spcAft>
+              <a:buNone/>
+            </a:pPr>
+            <a:fld id="{00000000-1234-1234-1234-123412341234}" type="slidenum">
+              <a:rPr lang="fr-FR" smtClean="0"/>
+              <a:t>38</a:t>
+            </a:fld>
+            <a:endParaRPr lang="fr-FR"/>
+          </a:p>
+        </p:txBody>
+      </p:sp>
     </p:spTree>
     <p:extLst>
       <p:ext uri="{BB962C8B-B14F-4D97-AF65-F5344CB8AC3E}">
@@ -8570,10 +11332,94 @@
           </a:prstGeom>
         </p:spPr>
       </p:pic>
+      <p:sp>
+        <p:nvSpPr>
+          <p:cNvPr id="5" name="Rectangle 4">
+            <a:extLst>
+              <a:ext uri="{FF2B5EF4-FFF2-40B4-BE49-F238E27FC236}">
+                <a16:creationId xmlns:a16="http://schemas.microsoft.com/office/drawing/2014/main" id="{F91EB65D-CD2D-4655-8E8F-905094493B74}"/>
+              </a:ext>
+            </a:extLst>
+          </p:cNvPr>
+          <p:cNvSpPr/>
+          <p:nvPr/>
+        </p:nvSpPr>
+        <p:spPr>
+          <a:xfrm>
+            <a:off x="5390866" y="3695312"/>
+            <a:ext cx="682388" cy="518615"/>
+          </a:xfrm>
+          <a:prstGeom prst="rect">
+            <a:avLst/>
+          </a:prstGeom>
+        </p:spPr>
+        <p:style>
+          <a:lnRef idx="2">
+            <a:schemeClr val="accent1">
+              <a:shade val="50000"/>
+            </a:schemeClr>
+          </a:lnRef>
+          <a:fillRef idx="1">
+            <a:schemeClr val="accent1"/>
+          </a:fillRef>
+          <a:effectRef idx="0">
+            <a:schemeClr val="accent1"/>
+          </a:effectRef>
+          <a:fontRef idx="minor">
+            <a:schemeClr val="lt1"/>
+          </a:fontRef>
+        </p:style>
+        <p:txBody>
+          <a:bodyPr rtlCol="0" anchor="ctr"/>
+          <a:lstStyle/>
+          <a:p>
+            <a:pPr algn="ctr"/>
+            <a:endParaRPr lang="fr-FR"/>
+          </a:p>
+        </p:txBody>
+      </p:sp>
+      <p:sp>
+        <p:nvSpPr>
+          <p:cNvPr id="4" name="Espace réservé du numéro de diapositive 3">
+            <a:extLst>
+              <a:ext uri="{FF2B5EF4-FFF2-40B4-BE49-F238E27FC236}">
+                <a16:creationId xmlns:a16="http://schemas.microsoft.com/office/drawing/2014/main" id="{88773C0D-7829-4938-8E00-8A99F407F3A7}"/>
+              </a:ext>
+            </a:extLst>
+          </p:cNvPr>
+          <p:cNvSpPr>
+            <a:spLocks noGrp="1"/>
+          </p:cNvSpPr>
+          <p:nvPr>
+            <p:ph type="sldNum" idx="12"/>
+          </p:nvPr>
+        </p:nvSpPr>
+        <p:spPr/>
+        <p:txBody>
+          <a:bodyPr/>
+          <a:lstStyle/>
+          <a:p>
+            <a:pPr marL="0" lvl="0" indent="0" algn="l" rtl="0">
+              <a:spcBef>
+                <a:spcPts val="0"/>
+              </a:spcBef>
+              <a:spcAft>
+                <a:spcPts val="0"/>
+              </a:spcAft>
+              <a:buNone/>
+            </a:pPr>
+            <a:fld id="{00000000-1234-1234-1234-123412341234}" type="slidenum">
+              <a:rPr lang="fr-FR" smtClean="0"/>
+              <a:t>4</a:t>
+            </a:fld>
+            <a:endParaRPr lang="fr-FR"/>
+          </a:p>
+        </p:txBody>
+      </p:sp>
     </p:spTree>
     <p:extLst>
       <p:ext uri="{BB962C8B-B14F-4D97-AF65-F5344CB8AC3E}">
-        <p14:creationId xmlns:p14="http://schemas.microsoft.com/office/powerpoint/2010/main" val="277781670"/>
+        <p14:creationId xmlns:p14="http://schemas.microsoft.com/office/powerpoint/2010/main" val="807497125"/>
       </p:ext>
     </p:extLst>
   </p:cSld>
@@ -8605,7 +11451,7 @@
           <p:cNvPr id="2" name="Titre 1">
             <a:extLst>
               <a:ext uri="{FF2B5EF4-FFF2-40B4-BE49-F238E27FC236}">
-                <a16:creationId xmlns:a16="http://schemas.microsoft.com/office/drawing/2014/main" id="{57CDB5FB-869B-41BD-A5D4-6B8560A37E5D}"/>
+                <a16:creationId xmlns:a16="http://schemas.microsoft.com/office/drawing/2014/main" id="{3962AE6F-273B-4204-BE5C-BB599D848C63}"/>
               </a:ext>
             </a:extLst>
           </p:cNvPr>
@@ -8630,7 +11476,7 @@
           <p:cNvPr id="3" name="Image 2">
             <a:extLst>
               <a:ext uri="{FF2B5EF4-FFF2-40B4-BE49-F238E27FC236}">
-                <a16:creationId xmlns:a16="http://schemas.microsoft.com/office/drawing/2014/main" id="{19CA39AB-00FB-43FF-A758-463B3EB3D831}"/>
+                <a16:creationId xmlns:a16="http://schemas.microsoft.com/office/drawing/2014/main" id="{FF7BB22D-E6BA-4A3B-B5C3-034AD97DD17E}"/>
               </a:ext>
             </a:extLst>
           </p:cNvPr>
@@ -8647,18 +11493,56 @@
         </p:blipFill>
         <p:spPr>
           <a:xfrm>
-            <a:off x="409361" y="174502"/>
-            <a:ext cx="8325278" cy="4794496"/>
+            <a:off x="0" y="833976"/>
+            <a:ext cx="9144000" cy="3475548"/>
           </a:xfrm>
           <a:prstGeom prst="rect">
             <a:avLst/>
           </a:prstGeom>
         </p:spPr>
       </p:pic>
+      <p:sp>
+        <p:nvSpPr>
+          <p:cNvPr id="4" name="Espace réservé du numéro de diapositive 3">
+            <a:extLst>
+              <a:ext uri="{FF2B5EF4-FFF2-40B4-BE49-F238E27FC236}">
+                <a16:creationId xmlns:a16="http://schemas.microsoft.com/office/drawing/2014/main" id="{134839FC-4A69-4441-8640-DFFA21247163}"/>
+              </a:ext>
+            </a:extLst>
+          </p:cNvPr>
+          <p:cNvSpPr>
+            <a:spLocks noGrp="1"/>
+          </p:cNvSpPr>
+          <p:nvPr>
+            <p:ph type="sldNum" idx="12"/>
+          </p:nvPr>
+        </p:nvSpPr>
+        <p:spPr/>
+        <p:txBody>
+          <a:bodyPr/>
+          <a:lstStyle/>
+          <a:p>
+            <a:pPr marL="0" lvl="0" indent="0" algn="l" rtl="0">
+              <a:spcBef>
+                <a:spcPts val="0"/>
+              </a:spcBef>
+              <a:spcAft>
+                <a:spcPts val="0"/>
+              </a:spcAft>
+              <a:buNone/>
+            </a:pPr>
+            <a:fld id="{00000000-1234-1234-1234-123412341234}" type="slidenum">
+              <a:rPr lang="fr-FR" smtClean="0"/>
+              <a:t>5</a:t>
+            </a:fld>
+            <a:endParaRPr lang="fr-FR"/>
+          </a:p>
+        </p:txBody>
+      </p:sp>
     </p:spTree>
     <p:extLst>
       <p:ext uri="{BB962C8B-B14F-4D97-AF65-F5344CB8AC3E}">
-        <p14:creationId xmlns:p14="http://schemas.microsoft.com/office/powerpoint/2010/main" val="2394971874"/>
+        <p14:creationId xmlns:p14="http://schemas.microsoft.com/office/powerpoint/2010/main" val="277781670"/>
       </p:ext>
     </p:extLst>
   </p:cSld>
@@ -8732,7 +11616,7 @@
         </p:blipFill>
         <p:spPr>
           <a:xfrm>
-            <a:off x="409361" y="174502"/>
+            <a:off x="311700" y="174502"/>
             <a:ext cx="8325278" cy="4794496"/>
           </a:xfrm>
           <a:prstGeom prst="rect">
@@ -8740,10 +11624,140 @@
           </a:prstGeom>
         </p:spPr>
       </p:pic>
+      <p:sp>
+        <p:nvSpPr>
+          <p:cNvPr id="4" name="Rectangle 3">
+            <a:extLst>
+              <a:ext uri="{FF2B5EF4-FFF2-40B4-BE49-F238E27FC236}">
+                <a16:creationId xmlns:a16="http://schemas.microsoft.com/office/drawing/2014/main" id="{315C06C0-46B5-48CC-8D54-FEFE4ECD81C6}"/>
+              </a:ext>
+            </a:extLst>
+          </p:cNvPr>
+          <p:cNvSpPr/>
+          <p:nvPr/>
+        </p:nvSpPr>
+        <p:spPr>
+          <a:xfrm>
+            <a:off x="5923128" y="1951630"/>
+            <a:ext cx="1214650" cy="464024"/>
+          </a:xfrm>
+          <a:prstGeom prst="rect">
+            <a:avLst/>
+          </a:prstGeom>
+        </p:spPr>
+        <p:style>
+          <a:lnRef idx="2">
+            <a:schemeClr val="accent1">
+              <a:shade val="50000"/>
+            </a:schemeClr>
+          </a:lnRef>
+          <a:fillRef idx="1">
+            <a:schemeClr val="accent1"/>
+          </a:fillRef>
+          <a:effectRef idx="0">
+            <a:schemeClr val="accent1"/>
+          </a:effectRef>
+          <a:fontRef idx="minor">
+            <a:schemeClr val="lt1"/>
+          </a:fontRef>
+        </p:style>
+        <p:txBody>
+          <a:bodyPr rtlCol="0" anchor="ctr"/>
+          <a:lstStyle/>
+          <a:p>
+            <a:pPr algn="ctr"/>
+            <a:endParaRPr lang="fr-FR"/>
+          </a:p>
+        </p:txBody>
+      </p:sp>
+      <p:sp>
+        <p:nvSpPr>
+          <p:cNvPr id="5" name="Rectangle 4">
+            <a:extLst>
+              <a:ext uri="{FF2B5EF4-FFF2-40B4-BE49-F238E27FC236}">
+                <a16:creationId xmlns:a16="http://schemas.microsoft.com/office/drawing/2014/main" id="{EE774992-15C9-4E6F-B6BF-2AE567A28CE5}"/>
+              </a:ext>
+            </a:extLst>
+          </p:cNvPr>
+          <p:cNvSpPr/>
+          <p:nvPr/>
+        </p:nvSpPr>
+        <p:spPr>
+          <a:xfrm>
+            <a:off x="6317194" y="3548418"/>
+            <a:ext cx="191183" cy="1160060"/>
+          </a:xfrm>
+          <a:prstGeom prst="rect">
+            <a:avLst/>
+          </a:prstGeom>
+        </p:spPr>
+        <p:style>
+          <a:lnRef idx="2">
+            <a:schemeClr val="accent1">
+              <a:shade val="50000"/>
+            </a:schemeClr>
+          </a:lnRef>
+          <a:fillRef idx="1">
+            <a:schemeClr val="accent1"/>
+          </a:fillRef>
+          <a:effectRef idx="0">
+            <a:schemeClr val="accent1"/>
+          </a:effectRef>
+          <a:fontRef idx="minor">
+            <a:schemeClr val="lt1"/>
+          </a:fontRef>
+        </p:style>
+        <p:txBody>
+          <a:bodyPr rtlCol="0" anchor="ctr"/>
+          <a:lstStyle/>
+          <a:p>
+            <a:pPr algn="ctr"/>
+            <a:endParaRPr lang="fr-FR"/>
+          </a:p>
+        </p:txBody>
+      </p:sp>
+      <p:sp>
+        <p:nvSpPr>
+          <p:cNvPr id="6" name="Espace réservé du numéro de diapositive 5">
+            <a:extLst>
+              <a:ext uri="{FF2B5EF4-FFF2-40B4-BE49-F238E27FC236}">
+                <a16:creationId xmlns:a16="http://schemas.microsoft.com/office/drawing/2014/main" id="{61CAD2BD-DD59-4752-9451-9611AA16A130}"/>
+              </a:ext>
+            </a:extLst>
+          </p:cNvPr>
+          <p:cNvSpPr>
+            <a:spLocks noGrp="1"/>
+          </p:cNvSpPr>
+          <p:nvPr>
+            <p:ph type="sldNum" idx="12"/>
+          </p:nvPr>
+        </p:nvSpPr>
+        <p:spPr/>
+        <p:txBody>
+          <a:bodyPr/>
+          <a:lstStyle/>
+          <a:p>
+            <a:pPr marL="0" lvl="0" indent="0" algn="l" rtl="0">
+              <a:spcBef>
+                <a:spcPts val="0"/>
+              </a:spcBef>
+              <a:spcAft>
+                <a:spcPts val="0"/>
+              </a:spcAft>
+              <a:buNone/>
+            </a:pPr>
+            <a:fld id="{00000000-1234-1234-1234-123412341234}" type="slidenum">
+              <a:rPr lang="fr-FR" smtClean="0"/>
+              <a:t>6</a:t>
+            </a:fld>
+            <a:endParaRPr lang="fr-FR"/>
+          </a:p>
+        </p:txBody>
+      </p:sp>
     </p:spTree>
     <p:extLst>
       <p:ext uri="{BB962C8B-B14F-4D97-AF65-F5344CB8AC3E}">
-        <p14:creationId xmlns:p14="http://schemas.microsoft.com/office/powerpoint/2010/main" val="2727079955"/>
+        <p14:creationId xmlns:p14="http://schemas.microsoft.com/office/powerpoint/2010/main" val="2394971874"/>
       </p:ext>
     </p:extLst>
   </p:cSld>
@@ -8775,7 +11789,7 @@
           <p:cNvPr id="2" name="Titre 1">
             <a:extLst>
               <a:ext uri="{FF2B5EF4-FFF2-40B4-BE49-F238E27FC236}">
-                <a16:creationId xmlns:a16="http://schemas.microsoft.com/office/drawing/2014/main" id="{DB51B128-5110-4419-9E65-128611C03584}"/>
+                <a16:creationId xmlns:a16="http://schemas.microsoft.com/office/drawing/2014/main" id="{57CDB5FB-869B-41BD-A5D4-6B8560A37E5D}"/>
               </a:ext>
             </a:extLst>
           </p:cNvPr>
@@ -8800,7 +11814,7 @@
           <p:cNvPr id="3" name="Image 2">
             <a:extLst>
               <a:ext uri="{FF2B5EF4-FFF2-40B4-BE49-F238E27FC236}">
-                <a16:creationId xmlns:a16="http://schemas.microsoft.com/office/drawing/2014/main" id="{DA1F7A3C-F846-4863-93DA-196E38D11D42}"/>
+                <a16:creationId xmlns:a16="http://schemas.microsoft.com/office/drawing/2014/main" id="{19CA39AB-00FB-43FF-A758-463B3EB3D831}"/>
               </a:ext>
             </a:extLst>
           </p:cNvPr>
@@ -8817,18 +11831,56 @@
         </p:blipFill>
         <p:spPr>
           <a:xfrm>
-            <a:off x="323631" y="1212780"/>
-            <a:ext cx="8496737" cy="2717940"/>
+            <a:off x="409361" y="174502"/>
+            <a:ext cx="8325278" cy="4794496"/>
           </a:xfrm>
           <a:prstGeom prst="rect">
             <a:avLst/>
           </a:prstGeom>
         </p:spPr>
       </p:pic>
+      <p:sp>
+        <p:nvSpPr>
+          <p:cNvPr id="4" name="Espace réservé du numéro de diapositive 3">
+            <a:extLst>
+              <a:ext uri="{FF2B5EF4-FFF2-40B4-BE49-F238E27FC236}">
+                <a16:creationId xmlns:a16="http://schemas.microsoft.com/office/drawing/2014/main" id="{E18E5048-F22F-4456-8DC2-4D14B0C184C8}"/>
+              </a:ext>
+            </a:extLst>
+          </p:cNvPr>
+          <p:cNvSpPr>
+            <a:spLocks noGrp="1"/>
+          </p:cNvSpPr>
+          <p:nvPr>
+            <p:ph type="sldNum" idx="12"/>
+          </p:nvPr>
+        </p:nvSpPr>
+        <p:spPr/>
+        <p:txBody>
+          <a:bodyPr/>
+          <a:lstStyle/>
+          <a:p>
+            <a:pPr marL="0" lvl="0" indent="0" algn="l" rtl="0">
+              <a:spcBef>
+                <a:spcPts val="0"/>
+              </a:spcBef>
+              <a:spcAft>
+                <a:spcPts val="0"/>
+              </a:spcAft>
+              <a:buNone/>
+            </a:pPr>
+            <a:fld id="{00000000-1234-1234-1234-123412341234}" type="slidenum">
+              <a:rPr lang="fr-FR" smtClean="0"/>
+              <a:t>7</a:t>
+            </a:fld>
+            <a:endParaRPr lang="fr-FR"/>
+          </a:p>
+        </p:txBody>
+      </p:sp>
     </p:spTree>
     <p:extLst>
       <p:ext uri="{BB962C8B-B14F-4D97-AF65-F5344CB8AC3E}">
-        <p14:creationId xmlns:p14="http://schemas.microsoft.com/office/powerpoint/2010/main" val="1983115454"/>
+        <p14:creationId xmlns:p14="http://schemas.microsoft.com/office/powerpoint/2010/main" val="2727079955"/>
       </p:ext>
     </p:extLst>
   </p:cSld>
@@ -8876,7 +11928,7 @@
           <a:bodyPr/>
           <a:lstStyle/>
           <a:p>
-            <a:endParaRPr lang="fr-FR" dirty="0"/>
+            <a:endParaRPr lang="fr-FR"/>
           </a:p>
         </p:txBody>
       </p:sp>
@@ -8902,7 +11954,7 @@
         </p:blipFill>
         <p:spPr>
           <a:xfrm>
-            <a:off x="191108" y="0"/>
+            <a:off x="323631" y="1212780"/>
             <a:ext cx="8496737" cy="2717940"/>
           </a:xfrm>
           <a:prstGeom prst="rect">
@@ -8910,70 +11962,94 @@
           </a:prstGeom>
         </p:spPr>
       </p:pic>
-      <p:pic>
-        <p:nvPicPr>
-          <p:cNvPr id="4" name="Image 3">
-            <a:extLst>
-              <a:ext uri="{FF2B5EF4-FFF2-40B4-BE49-F238E27FC236}">
-                <a16:creationId xmlns:a16="http://schemas.microsoft.com/office/drawing/2014/main" id="{D50F81E5-E9B2-4795-9914-9E08571679CC}"/>
-              </a:ext>
-            </a:extLst>
-          </p:cNvPr>
-          <p:cNvPicPr>
-            <a:picLocks noChangeAspect="1"/>
-          </p:cNvPicPr>
+      <p:sp>
+        <p:nvSpPr>
+          <p:cNvPr id="4" name="Rectangle 3">
+            <a:extLst>
+              <a:ext uri="{FF2B5EF4-FFF2-40B4-BE49-F238E27FC236}">
+                <a16:creationId xmlns:a16="http://schemas.microsoft.com/office/drawing/2014/main" id="{6A6819A9-F8B0-40B1-8486-94DB2E1D308B}"/>
+              </a:ext>
+            </a:extLst>
+          </p:cNvPr>
+          <p:cNvSpPr/>
           <p:nvPr/>
-        </p:nvPicPr>
-        <p:blipFill>
-          <a:blip r:embed="rId3"/>
-          <a:stretch>
-            <a:fillRect/>
-          </a:stretch>
-        </p:blipFill>
+        </p:nvSpPr>
         <p:spPr>
           <a:xfrm>
-            <a:off x="4439476" y="930190"/>
-            <a:ext cx="2489328" cy="3283119"/>
+            <a:off x="5991367" y="3384645"/>
+            <a:ext cx="968991" cy="382137"/>
           </a:xfrm>
           <a:prstGeom prst="rect">
             <a:avLst/>
           </a:prstGeom>
         </p:spPr>
-      </p:pic>
-      <p:pic>
-        <p:nvPicPr>
-          <p:cNvPr id="5" name="Image 4">
-            <a:extLst>
-              <a:ext uri="{FF2B5EF4-FFF2-40B4-BE49-F238E27FC236}">
-                <a16:creationId xmlns:a16="http://schemas.microsoft.com/office/drawing/2014/main" id="{608C4A11-5914-4C37-B9D6-1CA2CDD19FD1}"/>
-              </a:ext>
-            </a:extLst>
-          </p:cNvPr>
-          <p:cNvPicPr>
-            <a:picLocks noChangeAspect="1"/>
-          </p:cNvPicPr>
-          <p:nvPr/>
-        </p:nvPicPr>
-        <p:blipFill>
-          <a:blip r:embed="rId4"/>
-          <a:stretch>
-            <a:fillRect/>
-          </a:stretch>
-        </p:blipFill>
-        <p:spPr>
-          <a:xfrm>
-            <a:off x="456155" y="695228"/>
-            <a:ext cx="1600282" cy="469924"/>
-          </a:xfrm>
-          <a:prstGeom prst="rect">
-            <a:avLst/>
-          </a:prstGeom>
-        </p:spPr>
-      </p:pic>
+        <p:style>
+          <a:lnRef idx="2">
+            <a:schemeClr val="accent1">
+              <a:shade val="50000"/>
+            </a:schemeClr>
+          </a:lnRef>
+          <a:fillRef idx="1">
+            <a:schemeClr val="accent1"/>
+          </a:fillRef>
+          <a:effectRef idx="0">
+            <a:schemeClr val="accent1"/>
+          </a:effectRef>
+          <a:fontRef idx="minor">
+            <a:schemeClr val="lt1"/>
+          </a:fontRef>
+        </p:style>
+        <p:txBody>
+          <a:bodyPr rtlCol="0" anchor="ctr"/>
+          <a:lstStyle/>
+          <a:p>
+            <a:pPr algn="ctr"/>
+            <a:endParaRPr lang="fr-FR"/>
+          </a:p>
+        </p:txBody>
+      </p:sp>
+      <p:sp>
+        <p:nvSpPr>
+          <p:cNvPr id="5" name="Espace réservé du numéro de diapositive 4">
+            <a:extLst>
+              <a:ext uri="{FF2B5EF4-FFF2-40B4-BE49-F238E27FC236}">
+                <a16:creationId xmlns:a16="http://schemas.microsoft.com/office/drawing/2014/main" id="{300BE660-053F-45F1-AE60-B4B8DFAB1619}"/>
+              </a:ext>
+            </a:extLst>
+          </p:cNvPr>
+          <p:cNvSpPr>
+            <a:spLocks noGrp="1"/>
+          </p:cNvSpPr>
+          <p:nvPr>
+            <p:ph type="sldNum" idx="12"/>
+          </p:nvPr>
+        </p:nvSpPr>
+        <p:spPr/>
+        <p:txBody>
+          <a:bodyPr/>
+          <a:lstStyle/>
+          <a:p>
+            <a:pPr marL="0" lvl="0" indent="0" algn="l" rtl="0">
+              <a:spcBef>
+                <a:spcPts val="0"/>
+              </a:spcBef>
+              <a:spcAft>
+                <a:spcPts val="0"/>
+              </a:spcAft>
+              <a:buNone/>
+            </a:pPr>
+            <a:fld id="{00000000-1234-1234-1234-123412341234}" type="slidenum">
+              <a:rPr lang="fr-FR" smtClean="0"/>
+              <a:t>8</a:t>
+            </a:fld>
+            <a:endParaRPr lang="fr-FR"/>
+          </a:p>
+        </p:txBody>
+      </p:sp>
     </p:spTree>
     <p:extLst>
       <p:ext uri="{BB962C8B-B14F-4D97-AF65-F5344CB8AC3E}">
-        <p14:creationId xmlns:p14="http://schemas.microsoft.com/office/powerpoint/2010/main" val="3293772475"/>
+        <p14:creationId xmlns:p14="http://schemas.microsoft.com/office/powerpoint/2010/main" val="1983115454"/>
       </p:ext>
     </p:extLst>
   </p:cSld>
@@ -9005,7 +12081,7 @@
           <p:cNvPr id="2" name="Titre 1">
             <a:extLst>
               <a:ext uri="{FF2B5EF4-FFF2-40B4-BE49-F238E27FC236}">
-                <a16:creationId xmlns:a16="http://schemas.microsoft.com/office/drawing/2014/main" id="{1EAD44B7-D3A8-42B5-8FD7-7AC74F842984}"/>
+                <a16:creationId xmlns:a16="http://schemas.microsoft.com/office/drawing/2014/main" id="{DB51B128-5110-4419-9E65-128611C03584}"/>
               </a:ext>
             </a:extLst>
           </p:cNvPr>
@@ -9030,7 +12106,7 @@
           <p:cNvPr id="3" name="Image 2">
             <a:extLst>
               <a:ext uri="{FF2B5EF4-FFF2-40B4-BE49-F238E27FC236}">
-                <a16:creationId xmlns:a16="http://schemas.microsoft.com/office/drawing/2014/main" id="{7C62CBF9-3FEB-431D-974D-D0373482B52E}"/>
+                <a16:creationId xmlns:a16="http://schemas.microsoft.com/office/drawing/2014/main" id="{DA1F7A3C-F846-4863-93DA-196E38D11D42}"/>
               </a:ext>
             </a:extLst>
           </p:cNvPr>
@@ -9047,18 +12123,56 @@
         </p:blipFill>
         <p:spPr>
           <a:xfrm>
-            <a:off x="1105106" y="360679"/>
-            <a:ext cx="6933787" cy="4422142"/>
+            <a:off x="323631" y="1212780"/>
+            <a:ext cx="8496737" cy="2717940"/>
           </a:xfrm>
           <a:prstGeom prst="rect">
             <a:avLst/>
           </a:prstGeom>
         </p:spPr>
       </p:pic>
+      <p:sp>
+        <p:nvSpPr>
+          <p:cNvPr id="4" name="Espace réservé du numéro de diapositive 3">
+            <a:extLst>
+              <a:ext uri="{FF2B5EF4-FFF2-40B4-BE49-F238E27FC236}">
+                <a16:creationId xmlns:a16="http://schemas.microsoft.com/office/drawing/2014/main" id="{6AFD0BFB-796D-4491-BE8E-35439B99998F}"/>
+              </a:ext>
+            </a:extLst>
+          </p:cNvPr>
+          <p:cNvSpPr>
+            <a:spLocks noGrp="1"/>
+          </p:cNvSpPr>
+          <p:nvPr>
+            <p:ph type="sldNum" idx="12"/>
+          </p:nvPr>
+        </p:nvSpPr>
+        <p:spPr/>
+        <p:txBody>
+          <a:bodyPr/>
+          <a:lstStyle/>
+          <a:p>
+            <a:pPr marL="0" lvl="0" indent="0" algn="l" rtl="0">
+              <a:spcBef>
+                <a:spcPts val="0"/>
+              </a:spcBef>
+              <a:spcAft>
+                <a:spcPts val="0"/>
+              </a:spcAft>
+              <a:buNone/>
+            </a:pPr>
+            <a:fld id="{00000000-1234-1234-1234-123412341234}" type="slidenum">
+              <a:rPr lang="fr-FR" smtClean="0"/>
+              <a:t>9</a:t>
+            </a:fld>
+            <a:endParaRPr lang="fr-FR"/>
+          </a:p>
+        </p:txBody>
+      </p:sp>
     </p:spTree>
     <p:extLst>
       <p:ext uri="{BB962C8B-B14F-4D97-AF65-F5344CB8AC3E}">
-        <p14:creationId xmlns:p14="http://schemas.microsoft.com/office/powerpoint/2010/main" val="1477212218"/>
+        <p14:creationId xmlns:p14="http://schemas.microsoft.com/office/powerpoint/2010/main" val="1524320420"/>
       </p:ext>
     </p:extLst>
   </p:cSld>

</xml_diff>